<commit_message>
bisschen Folien gemacht, in Aussarbeitung ein wort eingefügt
</commit_message>
<xml_diff>
--- a/Ausarbeitung/präzi.pptx
+++ b/Ausarbeitung/präzi.pptx
@@ -297,7 +297,7 @@
               <a:pPr>
                 <a:defRPr/>
               </a:pPr>
-              <a:t>12/02/2021</a:t>
+              <a:t>13/02/2021</a:t>
             </a:fld>
             <a:endParaRPr lang="en-GB" dirty="0"/>
           </a:p>
@@ -390,7 +390,7 @@
               <a:pPr>
                 <a:defRPr/>
               </a:pPr>
-              <a:t>‹#›</a:t>
+              <a:t>‹Nr.›</a:t>
             </a:fld>
             <a:endParaRPr lang="en-GB"/>
           </a:p>
@@ -405,6 +405,64 @@
   </p:cSld>
   <p:clrMap bg1="lt1" tx1="dk1" bg2="lt2" tx2="dk2" accent1="accent1" accent2="accent2" accent3="accent3" accent4="accent4" accent5="accent5" accent6="accent6" hlink="hlink" folHlink="folHlink"/>
 </p:handoutMaster>
+</file>
+
+<file path=ppt/ink/ink1.xml><?xml version="1.0" encoding="utf-8"?>
+<inkml:ink xmlns:inkml="http://www.w3.org/2003/InkML">
+  <inkml:definitions>
+    <inkml:context xml:id="ctx0">
+      <inkml:inkSource xml:id="inkSrc0">
+        <inkml:traceFormat>
+          <inkml:channel name="X" type="integer" min="-2.14748E9" max="2.14748E9" units="cm"/>
+          <inkml:channel name="Y" type="integer" min="-2.14748E9" max="2.14748E9" units="cm"/>
+          <inkml:channel name="F" type="integer" max="32767" units="dev"/>
+        </inkml:traceFormat>
+        <inkml:channelProperties>
+          <inkml:channelProperty channel="X" name="resolution" value="1000" units="1/cm"/>
+          <inkml:channelProperty channel="Y" name="resolution" value="1000" units="1/cm"/>
+          <inkml:channelProperty channel="F" name="resolution" value="0" units="1/dev"/>
+        </inkml:channelProperties>
+      </inkml:inkSource>
+      <inkml:timestamp xml:id="ts0" timeString="2021-02-13T11:42:13.903"/>
+    </inkml:context>
+    <inkml:brush xml:id="br0">
+      <inkml:brushProperty name="width" value="0.05" units="cm"/>
+      <inkml:brushProperty name="height" value="0.3" units="cm"/>
+      <inkml:brushProperty name="color" value="#AB008B"/>
+      <inkml:brushProperty name="inkEffects" value="pencil"/>
+    </inkml:brush>
+  </inkml:definitions>
+  <inkml:trace contextRef="#ctx0" brushRef="#br0">9 34 688,'0'0'2244,"-1"-1"441,0 1 283,0-1-208,1 1-1116,-1-1-612,0 1-324,1 0-148,-1 0-64,1 0-40,0 0-75,0 0-233,0-1-432,1-2-533,-1 1-907,0-1-1056,-1-1-368,1 0 87,-1-1 349,1 0 828,-1 1 1524</inkml:trace>
+</inkml:ink>
+</file>
+
+<file path=ppt/ink/ink2.xml><?xml version="1.0" encoding="utf-8"?>
+<inkml:ink xmlns:inkml="http://www.w3.org/2003/InkML">
+  <inkml:definitions>
+    <inkml:context xml:id="ctx0">
+      <inkml:inkSource xml:id="inkSrc0">
+        <inkml:traceFormat>
+          <inkml:channel name="X" type="integer" min="-2.14748E9" max="2.14748E9" units="cm"/>
+          <inkml:channel name="Y" type="integer" min="-2.14748E9" max="2.14748E9" units="cm"/>
+          <inkml:channel name="F" type="integer" max="32767" units="dev"/>
+        </inkml:traceFormat>
+        <inkml:channelProperties>
+          <inkml:channelProperty channel="X" name="resolution" value="1000" units="1/cm"/>
+          <inkml:channelProperty channel="Y" name="resolution" value="1000" units="1/cm"/>
+          <inkml:channelProperty channel="F" name="resolution" value="0" units="1/dev"/>
+        </inkml:channelProperties>
+      </inkml:inkSource>
+      <inkml:timestamp xml:id="ts0" timeString="2021-02-13T11:42:15.862"/>
+    </inkml:context>
+    <inkml:brush xml:id="br0">
+      <inkml:brushProperty name="width" value="0.05" units="cm"/>
+      <inkml:brushProperty name="height" value="0.3" units="cm"/>
+      <inkml:brushProperty name="color" value="#AB008B"/>
+      <inkml:brushProperty name="inkEffects" value="pencil"/>
+    </inkml:brush>
+  </inkml:definitions>
+  <inkml:trace contextRef="#ctx0" brushRef="#br0">15 1 1404,'1'0'1716,"-1"1"200,0-1-123,0 1-553,0 0-420,-1-1-196,1 1-124,-1 0-80,1-1-56,-1 1-60,1 1-56,1 0-36,-1 0-20,0-1 8,1 1 16,0 0 24,-1-1 36,1 1 48,-1 0 36,0-1 20,0 1 4,0 0-20,-1 0-40,0 1-64,0-1-48,0 2-52,0-1-16,1 1-20,-1-1-4,0 1-16,0 0-20,0-1-8,1 0 0,0 0-8,-1-1 8,1 0 1,-1 0-9,0-1-12,1 1-8,-1 0-20,1-1 0,0 1-12,0 0-4,0 0 4,0 0 8,0 0-8,0 0 4,0 0-8,0 1 0,0-1-8,0 1 4,0-1-4,0 0-4,0 0 4,0 0 4,0 0 0,0 0-8,0 0 12,0 0-8,0 0-8,0 0 4,0 0 4,1 0-4,0 1 0,0-1 4,-1 1-4,1 0 4,-1-1 0,0 0 4,0 1 0,0-1 4,0 0 0,0 0-4,0 0-8,0 0 8,0-1 0,0 0-4,0 0-8,0 0 4,0-1 0,0 0 0,0 0 0,0 0 4,0 0-4,0 1-12,0-1 12,0 0-8,0 0-8,0 0-32,0 0-144,1 0-205,-1 0-259,0 0-372,0 0-656,-1-1-880,1 1-264,-2-1 47,1 0 289,-1-1 640,0 1 1520</inkml:trace>
+</inkml:ink>
 </file>
 
 <file path=ppt/notesMasters/notesMaster1.xml><?xml version="1.0" encoding="utf-8"?>
@@ -516,7 +574,7 @@
               <a:pPr>
                 <a:defRPr/>
               </a:pPr>
-              <a:t>12/02/2021</a:t>
+              <a:t>13/02/2021</a:t>
             </a:fld>
             <a:endParaRPr lang="en-GB"/>
           </a:p>
@@ -708,7 +766,7 @@
               <a:pPr>
                 <a:defRPr/>
               </a:pPr>
-              <a:t>‹#›</a:t>
+              <a:t>‹Nr.›</a:t>
             </a:fld>
             <a:endParaRPr lang="en-GB"/>
           </a:p>
@@ -1099,7 +1157,7 @@
             <a:fld id="{CE58CB1E-F828-4F11-99E0-327109AF9DA4}" type="slidenum">
               <a:rPr lang="de-DE" smtClean="0"/>
               <a:pPr/>
-              <a:t>‹#›</a:t>
+              <a:t>‹Nr.›</a:t>
             </a:fld>
             <a:endParaRPr lang="de-DE" dirty="0"/>
           </a:p>
@@ -1318,7 +1376,7 @@
             <a:fld id="{CE58CB1E-F828-4F11-99E0-327109AF9DA4}" type="slidenum">
               <a:rPr lang="de-DE" smtClean="0"/>
               <a:pPr/>
-              <a:t>‹#›</a:t>
+              <a:t>‹Nr.›</a:t>
             </a:fld>
             <a:endParaRPr lang="de-DE" dirty="0"/>
           </a:p>
@@ -1663,7 +1721,7 @@
             <a:fld id="{CE58CB1E-F828-4F11-99E0-327109AF9DA4}" type="slidenum">
               <a:rPr lang="de-DE" smtClean="0"/>
               <a:pPr/>
-              <a:t>‹#›</a:t>
+              <a:t>‹Nr.›</a:t>
             </a:fld>
             <a:endParaRPr lang="de-DE" dirty="0"/>
           </a:p>
@@ -1862,7 +1920,7 @@
             <a:fld id="{CE58CB1E-F828-4F11-99E0-327109AF9DA4}" type="slidenum">
               <a:rPr lang="de-DE" smtClean="0"/>
               <a:pPr/>
-              <a:t>‹#›</a:t>
+              <a:t>‹Nr.›</a:t>
             </a:fld>
             <a:endParaRPr lang="de-DE" dirty="0"/>
           </a:p>
@@ -2061,7 +2119,7 @@
             <a:fld id="{CE58CB1E-F828-4F11-99E0-327109AF9DA4}" type="slidenum">
               <a:rPr lang="de-DE" smtClean="0"/>
               <a:pPr/>
-              <a:t>‹#›</a:t>
+              <a:t>‹Nr.›</a:t>
             </a:fld>
             <a:endParaRPr lang="de-DE" dirty="0"/>
           </a:p>
@@ -2382,7 +2440,7 @@
             <a:fld id="{CE58CB1E-F828-4F11-99E0-327109AF9DA4}" type="slidenum">
               <a:rPr lang="de-DE" smtClean="0"/>
               <a:pPr/>
-              <a:t>‹#›</a:t>
+              <a:t>‹Nr.›</a:t>
             </a:fld>
             <a:endParaRPr lang="de-DE" dirty="0"/>
           </a:p>
@@ -2558,7 +2616,7 @@
             <a:fld id="{CE58CB1E-F828-4F11-99E0-327109AF9DA4}" type="slidenum">
               <a:rPr lang="de-DE" smtClean="0"/>
               <a:pPr/>
-              <a:t>‹#›</a:t>
+              <a:t>‹Nr.›</a:t>
             </a:fld>
             <a:endParaRPr lang="de-DE" dirty="0"/>
           </a:p>
@@ -2873,7 +2931,7 @@
             <a:fld id="{CE58CB1E-F828-4F11-99E0-327109AF9DA4}" type="slidenum">
               <a:rPr lang="de-DE" smtClean="0"/>
               <a:pPr/>
-              <a:t>‹#›</a:t>
+              <a:t>‹Nr.›</a:t>
             </a:fld>
             <a:endParaRPr lang="de-DE" dirty="0"/>
           </a:p>
@@ -3145,7 +3203,7 @@
             <a:fld id="{CE58CB1E-F828-4F11-99E0-327109AF9DA4}" type="slidenum">
               <a:rPr lang="de-DE" smtClean="0"/>
               <a:pPr/>
-              <a:t>‹#›</a:t>
+              <a:t>‹Nr.›</a:t>
             </a:fld>
             <a:endParaRPr lang="de-DE" dirty="0"/>
           </a:p>
@@ -3332,7 +3390,7 @@
             <a:fld id="{CE58CB1E-F828-4F11-99E0-327109AF9DA4}" type="slidenum">
               <a:rPr lang="de-DE" smtClean="0"/>
               <a:pPr/>
-              <a:t>‹#›</a:t>
+              <a:t>‹Nr.›</a:t>
             </a:fld>
             <a:endParaRPr lang="de-DE" dirty="0"/>
           </a:p>
@@ -3531,7 +3589,7 @@
             <a:fld id="{CE58CB1E-F828-4F11-99E0-327109AF9DA4}" type="slidenum">
               <a:rPr lang="de-DE" smtClean="0"/>
               <a:pPr/>
-              <a:t>‹#›</a:t>
+              <a:t>‹Nr.›</a:t>
             </a:fld>
             <a:endParaRPr lang="de-DE" dirty="0"/>
           </a:p>
@@ -3732,7 +3790,7 @@
             <a:fld id="{CE58CB1E-F828-4F11-99E0-327109AF9DA4}" type="slidenum">
               <a:rPr lang="de-DE" smtClean="0"/>
               <a:pPr/>
-              <a:t>‹#›</a:t>
+              <a:t>‹Nr.›</a:t>
             </a:fld>
             <a:endParaRPr lang="de-DE" dirty="0"/>
           </a:p>
@@ -3825,7 +3883,7 @@
             <a:fld id="{CE58CB1E-F828-4F11-99E0-327109AF9DA4}" type="slidenum">
               <a:rPr lang="de-DE" smtClean="0"/>
               <a:pPr/>
-              <a:t>‹#›</a:t>
+              <a:t>‹Nr.›</a:t>
             </a:fld>
             <a:endParaRPr lang="de-DE" dirty="0"/>
           </a:p>
@@ -4108,7 +4166,7 @@
             <a:fld id="{CE58CB1E-F828-4F11-99E0-327109AF9DA4}" type="slidenum">
               <a:rPr lang="de-DE" smtClean="0"/>
               <a:pPr/>
-              <a:t>‹#›</a:t>
+              <a:t>‹Nr.›</a:t>
             </a:fld>
             <a:endParaRPr lang="de-DE" dirty="0"/>
           </a:p>
@@ -4307,7 +4365,7 @@
             <a:fld id="{CE58CB1E-F828-4F11-99E0-327109AF9DA4}" type="slidenum">
               <a:rPr lang="de-DE" smtClean="0"/>
               <a:pPr/>
-              <a:t>‹#›</a:t>
+              <a:t>‹Nr.›</a:t>
             </a:fld>
             <a:endParaRPr lang="de-DE" dirty="0"/>
           </a:p>
@@ -4483,7 +4541,7 @@
             <a:fld id="{CE58CB1E-F828-4F11-99E0-327109AF9DA4}" type="slidenum">
               <a:rPr lang="de-DE" smtClean="0"/>
               <a:pPr/>
-              <a:t>‹#›</a:t>
+              <a:t>‹Nr.›</a:t>
             </a:fld>
             <a:endParaRPr lang="de-DE" dirty="0"/>
           </a:p>
@@ -4852,7 +4910,7 @@
             <a:fld id="{CE58CB1E-F828-4F11-99E0-327109AF9DA4}" type="slidenum">
               <a:rPr lang="de-DE" smtClean="0"/>
               <a:pPr/>
-              <a:t>‹#›</a:t>
+              <a:t>‹Nr.›</a:t>
             </a:fld>
             <a:endParaRPr lang="de-DE" dirty="0"/>
           </a:p>
@@ -5051,7 +5109,7 @@
             <a:fld id="{CE58CB1E-F828-4F11-99E0-327109AF9DA4}" type="slidenum">
               <a:rPr lang="de-DE" smtClean="0"/>
               <a:pPr/>
-              <a:t>‹#›</a:t>
+              <a:t>‹Nr.›</a:t>
             </a:fld>
             <a:endParaRPr lang="de-DE" dirty="0"/>
           </a:p>
@@ -5275,7 +5333,7 @@
             <a:fld id="{CE58CB1E-F828-4F11-99E0-327109AF9DA4}" type="slidenum">
               <a:rPr lang="de-DE" smtClean="0"/>
               <a:pPr/>
-              <a:t>‹#›</a:t>
+              <a:t>‹Nr.›</a:t>
             </a:fld>
             <a:endParaRPr lang="de-DE" dirty="0"/>
           </a:p>
@@ -5462,7 +5520,7 @@
             <a:fld id="{CE58CB1E-F828-4F11-99E0-327109AF9DA4}" type="slidenum">
               <a:rPr lang="de-DE" smtClean="0"/>
               <a:pPr/>
-              <a:t>‹#›</a:t>
+              <a:t>‹Nr.›</a:t>
             </a:fld>
             <a:endParaRPr lang="de-DE" dirty="0"/>
           </a:p>
@@ -5673,7 +5731,7 @@
             <a:fld id="{CE58CB1E-F828-4F11-99E0-327109AF9DA4}" type="slidenum">
               <a:rPr lang="de-DE" smtClean="0"/>
               <a:pPr/>
-              <a:t>‹#›</a:t>
+              <a:t>‹Nr.›</a:t>
             </a:fld>
             <a:endParaRPr lang="de-DE" dirty="0"/>
           </a:p>
@@ -6150,7 +6208,7 @@
                   <a:spcPct val="114000"/>
                 </a:lnSpc>
               </a:pPr>
-              <a:t>‹#›</a:t>
+              <a:t>‹Nr.›</a:t>
             </a:fld>
             <a:endParaRPr lang="de-DE" sz="1200" dirty="0">
               <a:latin typeface="+mn-lt"/>
@@ -6242,7 +6300,7 @@
             <a:fld id="{CE58CB1E-F828-4F11-99E0-327109AF9DA4}" type="slidenum">
               <a:rPr lang="de-DE" noProof="0" smtClean="0"/>
               <a:pPr/>
-              <a:t>‹#›</a:t>
+              <a:t>‹Nr.›</a:t>
             </a:fld>
             <a:endParaRPr lang="de-DE" noProof="0"/>
           </a:p>
@@ -6756,7 +6814,7 @@
             <a:fld id="{CE58CB1E-F828-4F11-99E0-327109AF9DA4}" type="slidenum">
               <a:rPr lang="de-DE" smtClean="0"/>
               <a:pPr/>
-              <a:t>‹#›</a:t>
+              <a:t>‹Nr.›</a:t>
             </a:fld>
             <a:endParaRPr lang="de-DE" dirty="0"/>
           </a:p>
@@ -7414,7 +7472,7 @@
             <a:fld id="{CE58CB1E-F828-4F11-99E0-327109AF9DA4}" type="slidenum">
               <a:rPr lang="de-DE" smtClean="0"/>
               <a:pPr/>
-              <a:t>‹#›</a:t>
+              <a:t>‹Nr.›</a:t>
             </a:fld>
             <a:endParaRPr lang="de-DE" dirty="0"/>
           </a:p>
@@ -8011,7 +8069,7 @@
             <a:fld id="{CE58CB1E-F828-4F11-99E0-327109AF9DA4}" type="slidenum">
               <a:rPr lang="de-DE" smtClean="0"/>
               <a:pPr/>
-              <a:t>‹#›</a:t>
+              <a:t>‹Nr.›</a:t>
             </a:fld>
             <a:endParaRPr lang="de-DE" dirty="0"/>
           </a:p>
@@ -8608,7 +8666,7 @@
             <a:fld id="{CE58CB1E-F828-4F11-99E0-327109AF9DA4}" type="slidenum">
               <a:rPr lang="de-DE" smtClean="0"/>
               <a:pPr/>
-              <a:t>‹#›</a:t>
+              <a:t>‹Nr.›</a:t>
             </a:fld>
             <a:endParaRPr lang="de-DE" dirty="0"/>
           </a:p>
@@ -9656,13 +9714,13 @@
   <p:clrMapOvr>
     <a:masterClrMapping/>
   </p:clrMapOvr>
-  <mc:AlternateContent xmlns:mc="http://schemas.openxmlformats.org/markup-compatibility/2006">
-    <mc:Choice xmlns:p14="http://schemas.microsoft.com/office/powerpoint/2010/main" Requires="p14">
+  <mc:AlternateContent xmlns:mc="http://schemas.openxmlformats.org/markup-compatibility/2006" xmlns:p14="http://schemas.microsoft.com/office/powerpoint/2010/main">
+    <mc:Choice Requires="p14">
       <p:transition spd="med" p14:dur="700" advTm="29363">
         <p:fade/>
       </p:transition>
     </mc:Choice>
-    <mc:Fallback>
+    <mc:Fallback xmlns="">
       <p:transition spd="med" advTm="29363">
         <p:fade/>
       </p:transition>
@@ -10213,13 +10271,13 @@
   <p:clrMapOvr>
     <a:masterClrMapping/>
   </p:clrMapOvr>
-  <mc:AlternateContent xmlns:mc="http://schemas.openxmlformats.org/markup-compatibility/2006">
-    <mc:Choice xmlns:p14="http://schemas.microsoft.com/office/powerpoint/2010/main" Requires="p14">
+  <mc:AlternateContent xmlns:mc="http://schemas.openxmlformats.org/markup-compatibility/2006" xmlns:p14="http://schemas.microsoft.com/office/powerpoint/2010/main">
+    <mc:Choice Requires="p14">
       <p:transition spd="med" p14:dur="700" advTm="82598">
         <p:fade/>
       </p:transition>
     </mc:Choice>
-    <mc:Fallback>
+    <mc:Fallback xmlns="">
       <p:transition spd="med" advTm="82598">
         <p:fade/>
       </p:transition>
@@ -10632,13 +10690,13 @@
   <p:clrMapOvr>
     <a:masterClrMapping/>
   </p:clrMapOvr>
-  <mc:AlternateContent xmlns:mc="http://schemas.openxmlformats.org/markup-compatibility/2006">
-    <mc:Choice xmlns:p14="http://schemas.microsoft.com/office/powerpoint/2010/main" Requires="p14">
+  <mc:AlternateContent xmlns:mc="http://schemas.openxmlformats.org/markup-compatibility/2006" xmlns:p14="http://schemas.microsoft.com/office/powerpoint/2010/main">
+    <mc:Choice Requires="p14">
       <p:transition spd="med" p14:dur="700" advTm="82598">
         <p:fade/>
       </p:transition>
     </mc:Choice>
-    <mc:Fallback>
+    <mc:Fallback xmlns="">
       <p:transition spd="med" advTm="82598">
         <p:fade/>
       </p:transition>
@@ -11140,7 +11198,7 @@
             </a:pPr>
             <a:r>
               <a:rPr lang="de-DE" dirty="0"/>
-              <a:t>Reverse</a:t>
+              <a:t>Richtungen speichern</a:t>
             </a:r>
           </a:p>
           <a:p>
@@ -11163,7 +11221,7 @@
             </a:pPr>
             <a:r>
               <a:rPr lang="de-DE" dirty="0"/>
-              <a:t>Mirror</a:t>
+              <a:t>Invertierte und gespiegelte Permutation</a:t>
             </a:r>
           </a:p>
           <a:p>
@@ -11185,28 +11243,8 @@
               <a:buChar char="•"/>
             </a:pPr>
             <a:r>
-              <a:rPr lang="de-DE" dirty="0" err="1"/>
-              <a:t>Queries</a:t>
-            </a:r>
-            <a:r>
               <a:rPr lang="de-DE" dirty="0"/>
-              <a:t> </a:t>
-            </a:r>
-            <a:r>
-              <a:rPr lang="de-DE" dirty="0" err="1"/>
-              <a:t>compiled</a:t>
-            </a:r>
-            <a:r>
-              <a:rPr lang="de-DE" dirty="0"/>
-              <a:t> into native </a:t>
-            </a:r>
-            <a:r>
-              <a:rPr lang="de-DE" dirty="0" err="1"/>
-              <a:t>machine</a:t>
-            </a:r>
-            <a:r>
-              <a:rPr lang="de-DE" dirty="0"/>
-              <a:t> code (LLVM)</a:t>
+              <a:t>Verbinden mit Kurve mit Grad 1</a:t>
             </a:r>
           </a:p>
           <a:p>
@@ -11228,26 +11266,35 @@
               <a:buChar char="•"/>
             </a:pPr>
             <a:r>
-              <a:rPr lang="de-DE" dirty="0" err="1"/>
-              <a:t>Maximize</a:t>
-            </a:r>
-            <a:r>
               <a:rPr lang="de-DE" dirty="0"/>
-              <a:t> </a:t>
-            </a:r>
-            <a:r>
-              <a:rPr lang="de-DE" dirty="0" err="1"/>
-              <a:t>data</a:t>
-            </a:r>
+              <a:t>Alternativ: </a:t>
+            </a:r>
+          </a:p>
+          <a:p>
+            <a:pPr marL="461963" lvl="1" indent="-285750">
+              <a:spcAft>
+                <a:spcPts val="600"/>
+              </a:spcAft>
+              <a:buFont typeface="Arial" panose="020B0604020202020204" pitchFamily="34" charset="0"/>
+              <a:buChar char="•"/>
+            </a:pPr>
             <a:r>
               <a:rPr lang="de-DE" dirty="0"/>
-              <a:t> and code </a:t>
-            </a:r>
-            <a:r>
-              <a:rPr lang="de-DE" dirty="0" err="1"/>
-              <a:t>locality</a:t>
-            </a:r>
-            <a:endParaRPr lang="de-DE" dirty="0"/>
+              <a:t>Richtungsarray weglassen</a:t>
+            </a:r>
+          </a:p>
+          <a:p>
+            <a:pPr marL="461963" lvl="1" indent="-285750">
+              <a:spcAft>
+                <a:spcPts val="600"/>
+              </a:spcAft>
+              <a:buFont typeface="Arial" panose="020B0604020202020204" pitchFamily="34" charset="0"/>
+              <a:buChar char="•"/>
+            </a:pPr>
+            <a:r>
+              <a:rPr lang="de-DE" dirty="0"/>
+              <a:t>Komplett SIMD-Optimieren</a:t>
+            </a:r>
           </a:p>
         </p:txBody>
       </p:sp>
@@ -11307,7 +11354,7 @@
         </p:nvSpPr>
         <p:spPr>
           <a:xfrm>
-            <a:off x="319090" y="994334"/>
+            <a:off x="309600" y="878400"/>
             <a:ext cx="8508999" cy="410369"/>
           </a:xfrm>
           <a:prstGeom prst="rect">
@@ -11476,6 +11523,19 @@
               </a:spcAft>
             </a:pPr>
             <a:r>
+              <a:rPr lang="de-DE" sz="3200" b="0" kern="1200" noProof="0" dirty="0">
+                <a:solidFill>
+                  <a:schemeClr val="bg2">
+                    <a:lumMod val="75000"/>
+                  </a:schemeClr>
+                </a:solidFill>
+                <a:latin typeface="+mj-lt"/>
+                <a:ea typeface="+mj-ea"/>
+                <a:cs typeface="+mj-cs"/>
+              </a:rPr>
+              <a:t>Lösungsansatz</a:t>
+            </a:r>
+            <a:r>
               <a:rPr lang="de-DE" b="0" kern="1200" noProof="0" dirty="0">
                 <a:solidFill>
                   <a:schemeClr val="bg2">
@@ -11486,7 +11546,7 @@
                 <a:ea typeface="+mj-ea"/>
                 <a:cs typeface="+mj-cs"/>
               </a:rPr>
-              <a:t>Lösungsansatz: Richtungsarray</a:t>
+              <a:t>: Richtungsarray</a:t>
             </a:r>
           </a:p>
         </p:txBody>
@@ -11750,7 +11810,7 @@
         </p:nvSpPr>
         <p:spPr>
           <a:xfrm>
-            <a:off x="311162" y="878427"/>
+            <a:off x="311162" y="878400"/>
             <a:ext cx="8508999" cy="410369"/>
           </a:xfrm>
           <a:prstGeom prst="rect">
@@ -12201,8 +12261,8 @@
         </p:nvSpPr>
         <p:spPr>
           <a:xfrm>
-            <a:off x="260392" y="1925690"/>
-            <a:ext cx="8508999" cy="4523878"/>
+            <a:off x="4572000" y="1949435"/>
+            <a:ext cx="4171265" cy="4523878"/>
           </a:xfrm>
           <a:prstGeom prst="rect">
             <a:avLst/>
@@ -12395,8 +12455,151 @@
             </a:pPr>
             <a:r>
               <a:rPr lang="en-GB" dirty="0"/>
-              <a:t>•</a:t>
-            </a:r>
+              <a:t>• </a:t>
+            </a:r>
+            <a:r>
+              <a:rPr lang="en-GB" dirty="0" err="1"/>
+              <a:t>Abhänig</a:t>
+            </a:r>
+            <a:r>
+              <a:rPr lang="en-GB" dirty="0"/>
+              <a:t> </a:t>
+            </a:r>
+            <a:r>
+              <a:rPr lang="en-GB" dirty="0" err="1"/>
+              <a:t>vom</a:t>
+            </a:r>
+            <a:r>
+              <a:rPr lang="en-GB" dirty="0"/>
+              <a:t> </a:t>
+            </a:r>
+            <a:r>
+              <a:rPr lang="en-GB" dirty="0" err="1"/>
+              <a:t>Richtungsarray</a:t>
+            </a:r>
+            <a:endParaRPr lang="en-GB" dirty="0"/>
+          </a:p>
+          <a:p>
+            <a:pPr marL="285750" indent="-285750">
+              <a:spcAft>
+                <a:spcPts val="600"/>
+              </a:spcAft>
+              <a:buFont typeface="Arial" panose="020B0604020202020204" pitchFamily="34" charset="0"/>
+              <a:buChar char="•"/>
+            </a:pPr>
+            <a:endParaRPr lang="en-GB" dirty="0"/>
+          </a:p>
+          <a:p>
+            <a:pPr marL="285750" indent="-285750">
+              <a:spcAft>
+                <a:spcPts val="600"/>
+              </a:spcAft>
+              <a:buFont typeface="Arial" panose="020B0604020202020204" pitchFamily="34" charset="0"/>
+              <a:buChar char="•"/>
+            </a:pPr>
+            <a:r>
+              <a:rPr lang="en-GB" dirty="0" err="1"/>
+              <a:t>Induktiv</a:t>
+            </a:r>
+            <a:r>
+              <a:rPr lang="en-GB" dirty="0"/>
+              <a:t> </a:t>
+            </a:r>
+            <a:r>
+              <a:rPr lang="en-GB" dirty="0" err="1"/>
+              <a:t>zu</a:t>
+            </a:r>
+            <a:r>
+              <a:rPr lang="en-GB" dirty="0"/>
+              <a:t> </a:t>
+            </a:r>
+            <a:r>
+              <a:rPr lang="en-GB" dirty="0" err="1"/>
+              <a:t>zeigen</a:t>
+            </a:r>
+            <a:endParaRPr lang="en-GB" dirty="0"/>
+          </a:p>
+          <a:p>
+            <a:pPr marL="285750" indent="-285750">
+              <a:spcAft>
+                <a:spcPts val="600"/>
+              </a:spcAft>
+              <a:buFont typeface="Arial" panose="020B0604020202020204" pitchFamily="34" charset="0"/>
+              <a:buChar char="•"/>
+            </a:pPr>
+            <a:endParaRPr lang="en-GB" dirty="0"/>
+          </a:p>
+          <a:p>
+            <a:pPr marL="285750" indent="-285750">
+              <a:spcAft>
+                <a:spcPts val="600"/>
+              </a:spcAft>
+              <a:buFont typeface="Arial" panose="020B0604020202020204" pitchFamily="34" charset="0"/>
+              <a:buChar char="•"/>
+            </a:pPr>
+            <a:r>
+              <a:rPr lang="en-GB" dirty="0" err="1"/>
+              <a:t>Technische</a:t>
+            </a:r>
+            <a:r>
+              <a:rPr lang="en-GB" dirty="0"/>
+              <a:t> </a:t>
+            </a:r>
+            <a:r>
+              <a:rPr lang="en-GB" dirty="0" err="1"/>
+              <a:t>Limitationen</a:t>
+            </a:r>
+            <a:r>
+              <a:rPr lang="en-GB"/>
+              <a:t>: </a:t>
+            </a:r>
+            <a:endParaRPr lang="en-GB" dirty="0"/>
+          </a:p>
+          <a:p>
+            <a:pPr marL="461963" lvl="1" indent="-285750">
+              <a:spcAft>
+                <a:spcPts val="600"/>
+              </a:spcAft>
+              <a:buFont typeface="Arial" panose="020B0604020202020204" pitchFamily="34" charset="0"/>
+              <a:buChar char="•"/>
+            </a:pPr>
+            <a:r>
+              <a:rPr lang="en-GB"/>
+              <a:t>Nur </a:t>
+            </a:r>
+            <a:r>
+              <a:rPr lang="en-GB" dirty="0" err="1"/>
+              <a:t>begrenzt</a:t>
+            </a:r>
+            <a:r>
+              <a:rPr lang="en-GB" dirty="0"/>
+              <a:t> Speicher </a:t>
+            </a:r>
+            <a:r>
+              <a:rPr lang="en-GB" dirty="0" err="1"/>
+              <a:t>verfügbar</a:t>
+            </a:r>
+            <a:endParaRPr lang="en-GB" dirty="0"/>
+          </a:p>
+          <a:p>
+            <a:pPr marL="285750" indent="-285750">
+              <a:spcAft>
+                <a:spcPts val="600"/>
+              </a:spcAft>
+              <a:buFont typeface="Arial" panose="020B0604020202020204" pitchFamily="34" charset="0"/>
+              <a:buChar char="•"/>
+            </a:pPr>
+            <a:endParaRPr lang="en-GB" dirty="0"/>
+          </a:p>
+          <a:p>
+            <a:pPr marL="285750" indent="-285750">
+              <a:spcAft>
+                <a:spcPts val="600"/>
+              </a:spcAft>
+              <a:buFont typeface="Arial" panose="020B0604020202020204" pitchFamily="34" charset="0"/>
+              <a:buChar char="•"/>
+            </a:pPr>
+            <a:endParaRPr lang="en-GB" dirty="0"/>
           </a:p>
           <a:p>
             <a:pPr marL="457200" indent="-457200">
@@ -12488,6 +12691,138 @@
           </a:p>
         </p:txBody>
       </p:sp>
+      <p:pic>
+        <p:nvPicPr>
+          <p:cNvPr id="5" name="Grafik 4">
+            <a:extLst>
+              <a:ext uri="{FF2B5EF4-FFF2-40B4-BE49-F238E27FC236}">
+                <a16:creationId xmlns:a16="http://schemas.microsoft.com/office/drawing/2014/main" id="{4DED0517-4E97-4431-883C-8025BFFE544B}"/>
+              </a:ext>
+            </a:extLst>
+          </p:cNvPr>
+          <p:cNvPicPr>
+            <a:picLocks noChangeAspect="1"/>
+          </p:cNvPicPr>
+          <p:nvPr/>
+        </p:nvPicPr>
+        <p:blipFill>
+          <a:blip r:embed="rId2"/>
+          <a:stretch>
+            <a:fillRect/>
+          </a:stretch>
+        </p:blipFill>
+        <p:spPr>
+          <a:xfrm>
+            <a:off x="311162" y="1949435"/>
+            <a:ext cx="3322320" cy="3322320"/>
+          </a:xfrm>
+          <a:prstGeom prst="rect">
+            <a:avLst/>
+          </a:prstGeom>
+        </p:spPr>
+      </p:pic>
+      <mc:AlternateContent xmlns:mc="http://schemas.openxmlformats.org/markup-compatibility/2006">
+        <mc:Choice xmlns:p14="http://schemas.microsoft.com/office/powerpoint/2010/main" xmlns:aink="http://schemas.microsoft.com/office/drawing/2016/ink" Requires="p14 aink">
+          <p:contentPart p14:bwMode="auto" r:id="rId3">
+            <p14:nvContentPartPr>
+              <p14:cNvPr id="10" name="Freihand 9">
+                <a:extLst>
+                  <a:ext uri="{FF2B5EF4-FFF2-40B4-BE49-F238E27FC236}">
+                    <a16:creationId xmlns:a16="http://schemas.microsoft.com/office/drawing/2014/main" id="{DF48B890-4C42-4836-A83E-C631940C31D2}"/>
+                  </a:ext>
+                </a:extLst>
+              </p14:cNvPr>
+              <p14:cNvContentPartPr/>
+              <p14:nvPr/>
+            </p14:nvContentPartPr>
+            <p14:xfrm>
+              <a:off x="1749240" y="4381080"/>
+              <a:ext cx="3240" cy="12240"/>
+            </p14:xfrm>
+          </p:contentPart>
+        </mc:Choice>
+        <mc:Fallback>
+          <p:pic>
+            <p:nvPicPr>
+              <p:cNvPr id="10" name="Freihand 9">
+                <a:extLst>
+                  <a:ext uri="{FF2B5EF4-FFF2-40B4-BE49-F238E27FC236}">
+                    <a16:creationId xmlns:a16="http://schemas.microsoft.com/office/drawing/2014/main" id="{DF48B890-4C42-4836-A83E-C631940C31D2}"/>
+                  </a:ext>
+                </a:extLst>
+              </p:cNvPr>
+              <p:cNvPicPr/>
+              <p:nvPr/>
+            </p:nvPicPr>
+            <p:blipFill>
+              <a:blip r:embed="rId4"/>
+              <a:stretch>
+                <a:fillRect/>
+              </a:stretch>
+            </p:blipFill>
+            <p:spPr>
+              <a:xfrm>
+                <a:off x="1740600" y="4327080"/>
+                <a:ext cx="20880" cy="119880"/>
+              </a:xfrm>
+              <a:prstGeom prst="rect">
+                <a:avLst/>
+              </a:prstGeom>
+            </p:spPr>
+          </p:pic>
+        </mc:Fallback>
+      </mc:AlternateContent>
+      <mc:AlternateContent xmlns:mc="http://schemas.openxmlformats.org/markup-compatibility/2006">
+        <mc:Choice xmlns:p14="http://schemas.microsoft.com/office/powerpoint/2010/main" xmlns:aink="http://schemas.microsoft.com/office/drawing/2016/ink" Requires="p14 aink">
+          <p:contentPart p14:bwMode="auto" r:id="rId5">
+            <p14:nvContentPartPr>
+              <p14:cNvPr id="11" name="Freihand 10">
+                <a:extLst>
+                  <a:ext uri="{FF2B5EF4-FFF2-40B4-BE49-F238E27FC236}">
+                    <a16:creationId xmlns:a16="http://schemas.microsoft.com/office/drawing/2014/main" id="{1A3E1392-2202-40DB-AA1D-AC5EAC7600CE}"/>
+                  </a:ext>
+                </a:extLst>
+              </p14:cNvPr>
+              <p14:cNvContentPartPr/>
+              <p14:nvPr/>
+            </p14:nvContentPartPr>
+            <p14:xfrm>
+              <a:off x="352440" y="5147160"/>
+              <a:ext cx="6120" cy="56880"/>
+            </p14:xfrm>
+          </p:contentPart>
+        </mc:Choice>
+        <mc:Fallback>
+          <p:pic>
+            <p:nvPicPr>
+              <p:cNvPr id="11" name="Freihand 10">
+                <a:extLst>
+                  <a:ext uri="{FF2B5EF4-FFF2-40B4-BE49-F238E27FC236}">
+                    <a16:creationId xmlns:a16="http://schemas.microsoft.com/office/drawing/2014/main" id="{1A3E1392-2202-40DB-AA1D-AC5EAC7600CE}"/>
+                  </a:ext>
+                </a:extLst>
+              </p:cNvPr>
+              <p:cNvPicPr/>
+              <p:nvPr/>
+            </p:nvPicPr>
+            <p:blipFill>
+              <a:blip r:embed="rId6"/>
+              <a:stretch>
+                <a:fillRect/>
+              </a:stretch>
+            </p:blipFill>
+            <p:spPr>
+              <a:xfrm>
+                <a:off x="343800" y="5093520"/>
+                <a:ext cx="23760" cy="164520"/>
+              </a:xfrm>
+              <a:prstGeom prst="rect">
+                <a:avLst/>
+              </a:prstGeom>
+            </p:spPr>
+          </p:pic>
+        </mc:Fallback>
+      </mc:AlternateContent>
     </p:spTree>
     <p:extLst>
       <p:ext uri="{BB962C8B-B14F-4D97-AF65-F5344CB8AC3E}">

</xml_diff>

<commit_message>
mathematischer Fehler rausgenommen? minimale verbesserungen
</commit_message>
<xml_diff>
--- a/Ausarbeitung/präzi.pptx
+++ b/Ausarbeitung/präzi.pptx
@@ -11176,8 +11176,8 @@
         </p:nvSpPr>
         <p:spPr>
           <a:xfrm>
-            <a:off x="4647179" y="1762188"/>
-            <a:ext cx="4180910" cy="4687380"/>
+            <a:off x="4644001" y="2263459"/>
+            <a:ext cx="4184088" cy="3716142"/>
           </a:xfrm>
         </p:spPr>
         <p:txBody>
@@ -11267,7 +11267,7 @@
             </a:pPr>
             <a:r>
               <a:rPr lang="de-DE" dirty="0"/>
-              <a:t>Alternativ: </a:t>
+              <a:t>Alternativen: </a:t>
             </a:r>
           </a:p>
           <a:p>
@@ -12448,18 +12448,54 @@
             </a:lvl9pPr>
           </a:lstStyle>
           <a:p>
+            <a:pPr marL="285750" indent="-285750">
+              <a:spcAft>
+                <a:spcPts val="600"/>
+              </a:spcAft>
+              <a:buFont typeface="Arial" panose="020B0604020202020204" pitchFamily="34" charset="0"/>
+              <a:buChar char="•"/>
+            </a:pPr>
+            <a:r>
+              <a:rPr lang="en-GB" dirty="0" err="1"/>
+              <a:t>Abhänig</a:t>
+            </a:r>
+            <a:r>
+              <a:rPr lang="en-GB" dirty="0"/>
+              <a:t> </a:t>
+            </a:r>
+            <a:r>
+              <a:rPr lang="en-GB" dirty="0" err="1"/>
+              <a:t>vom</a:t>
+            </a:r>
+            <a:r>
+              <a:rPr lang="en-GB" dirty="0"/>
+              <a:t> </a:t>
+            </a:r>
+            <a:r>
+              <a:rPr lang="en-GB" dirty="0" err="1"/>
+              <a:t>Richtungsarray</a:t>
+            </a:r>
+            <a:endParaRPr lang="en-GB" dirty="0"/>
+          </a:p>
+          <a:p>
             <a:pPr>
               <a:spcAft>
                 <a:spcPts val="600"/>
               </a:spcAft>
             </a:pPr>
-            <a:r>
-              <a:rPr lang="en-GB" dirty="0"/>
-              <a:t>• </a:t>
-            </a:r>
+            <a:endParaRPr lang="en-GB" dirty="0"/>
+          </a:p>
+          <a:p>
+            <a:pPr marL="285750" indent="-285750">
+              <a:spcAft>
+                <a:spcPts val="600"/>
+              </a:spcAft>
+              <a:buFont typeface="Arial" panose="020B0604020202020204" pitchFamily="34" charset="0"/>
+              <a:buChar char="•"/>
+            </a:pPr>
             <a:r>
               <a:rPr lang="en-GB" dirty="0" err="1"/>
-              <a:t>Abhänig</a:t>
+              <a:t>Induktiv</a:t>
             </a:r>
             <a:r>
               <a:rPr lang="en-GB" dirty="0"/>
@@ -12467,7 +12503,7 @@
             </a:r>
             <a:r>
               <a:rPr lang="en-GB" dirty="0" err="1"/>
-              <a:t>vom</a:t>
+              <a:t>zu</a:t>
             </a:r>
             <a:r>
               <a:rPr lang="en-GB" dirty="0"/>
@@ -12475,7 +12511,7 @@
             </a:r>
             <a:r>
               <a:rPr lang="en-GB" dirty="0" err="1"/>
-              <a:t>Richtungsarray</a:t>
+              <a:t>zeigen</a:t>
             </a:r>
             <a:endParaRPr lang="en-GB" dirty="0"/>
           </a:p>
@@ -12499,7 +12535,7 @@
             </a:pPr>
             <a:r>
               <a:rPr lang="en-GB" dirty="0" err="1"/>
-              <a:t>Induktiv</a:t>
+              <a:t>Konstruktion</a:t>
             </a:r>
             <a:r>
               <a:rPr lang="en-GB" dirty="0"/>
@@ -12507,7 +12543,15 @@
             </a:r>
             <a:r>
               <a:rPr lang="en-GB" dirty="0" err="1"/>
-              <a:t>zu</a:t>
+              <a:t>aus</a:t>
+            </a:r>
+            <a:r>
+              <a:rPr lang="en-GB" dirty="0"/>
+              <a:t> den </a:t>
+            </a:r>
+            <a:r>
+              <a:rPr lang="en-GB" dirty="0" err="1"/>
+              <a:t>Kurven</a:t>
             </a:r>
             <a:r>
               <a:rPr lang="en-GB" dirty="0"/>
@@ -12515,8 +12559,24 @@
             </a:r>
             <a:r>
               <a:rPr lang="en-GB" dirty="0" err="1"/>
-              <a:t>zeigen</a:t>
-            </a:r>
+              <a:t>mit</a:t>
+            </a:r>
+            <a:r>
+              <a:rPr lang="en-GB" dirty="0"/>
+              <a:t> Grad 1 &amp; 2 </a:t>
+            </a:r>
+            <a:r>
+              <a:rPr lang="en-GB" dirty="0" err="1"/>
+              <a:t>abgeleitet</a:t>
+            </a:r>
+            <a:endParaRPr lang="en-GB" dirty="0"/>
+          </a:p>
+          <a:p>
+            <a:pPr>
+              <a:spcAft>
+                <a:spcPts val="600"/>
+              </a:spcAft>
+            </a:pPr>
             <a:endParaRPr lang="en-GB" dirty="0"/>
           </a:p>
           <a:p>
@@ -12527,16 +12587,6 @@
               <a:buFont typeface="Arial" panose="020B0604020202020204" pitchFamily="34" charset="0"/>
               <a:buChar char="•"/>
             </a:pPr>
-            <a:endParaRPr lang="en-GB" dirty="0"/>
-          </a:p>
-          <a:p>
-            <a:pPr marL="285750" indent="-285750">
-              <a:spcAft>
-                <a:spcPts val="600"/>
-              </a:spcAft>
-              <a:buFont typeface="Arial" panose="020B0604020202020204" pitchFamily="34" charset="0"/>
-              <a:buChar char="•"/>
-            </a:pPr>
             <a:r>
               <a:rPr lang="en-GB" dirty="0" err="1"/>
               <a:t>Technische</a:t>
@@ -12550,10 +12600,9 @@
               <a:t>Limitationen</a:t>
             </a:r>
             <a:r>
-              <a:rPr lang="en-GB"/>
+              <a:rPr lang="en-GB" dirty="0"/>
               <a:t>: </a:t>
             </a:r>
-            <a:endParaRPr lang="en-GB" dirty="0"/>
           </a:p>
           <a:p>
             <a:pPr marL="461963" lvl="1" indent="-285750">
@@ -12564,7 +12613,7 @@
               <a:buChar char="•"/>
             </a:pPr>
             <a:r>
-              <a:rPr lang="en-GB"/>
+              <a:rPr lang="en-GB" dirty="0"/>
               <a:t>Nur </a:t>
             </a:r>
             <a:r>
@@ -12582,13 +12631,41 @@
             <a:endParaRPr lang="en-GB" dirty="0"/>
           </a:p>
           <a:p>
-            <a:pPr marL="285750" indent="-285750">
+            <a:pPr marL="461963" lvl="1" indent="-285750">
               <a:spcAft>
                 <a:spcPts val="600"/>
               </a:spcAft>
               <a:buFont typeface="Arial" panose="020B0604020202020204" pitchFamily="34" charset="0"/>
               <a:buChar char="•"/>
             </a:pPr>
+            <a:r>
+              <a:rPr lang="en-GB" dirty="0" err="1"/>
+              <a:t>Kurve</a:t>
+            </a:r>
+            <a:r>
+              <a:rPr lang="en-GB" dirty="0"/>
+              <a:t> </a:t>
+            </a:r>
+            <a:r>
+              <a:rPr lang="en-GB" dirty="0" err="1"/>
+              <a:t>schon</a:t>
+            </a:r>
+            <a:r>
+              <a:rPr lang="en-GB" dirty="0"/>
+              <a:t> ab Grad 5 </a:t>
+            </a:r>
+            <a:r>
+              <a:rPr lang="en-GB" dirty="0" err="1"/>
+              <a:t>schwer</a:t>
+            </a:r>
+            <a:r>
+              <a:rPr lang="en-GB" dirty="0"/>
+              <a:t> </a:t>
+            </a:r>
+            <a:r>
+              <a:rPr lang="en-GB" dirty="0" err="1"/>
+              <a:t>lesbar</a:t>
+            </a:r>
             <a:endParaRPr lang="en-GB" dirty="0"/>
           </a:p>
           <a:p>
@@ -12721,8 +12798,8 @@
           </a:prstGeom>
         </p:spPr>
       </p:pic>
-      <mc:AlternateContent xmlns:mc="http://schemas.openxmlformats.org/markup-compatibility/2006">
-        <mc:Choice xmlns:p14="http://schemas.microsoft.com/office/powerpoint/2010/main" xmlns:aink="http://schemas.microsoft.com/office/drawing/2016/ink" Requires="p14 aink">
+      <mc:AlternateContent xmlns:mc="http://schemas.openxmlformats.org/markup-compatibility/2006" xmlns:p14="http://schemas.microsoft.com/office/powerpoint/2010/main" xmlns:aink="http://schemas.microsoft.com/office/drawing/2016/ink">
+        <mc:Choice Requires="p14 aink">
           <p:contentPart p14:bwMode="auto" r:id="rId3">
             <p14:nvContentPartPr>
               <p14:cNvPr id="10" name="Freihand 9">
@@ -12741,7 +12818,7 @@
             </p14:xfrm>
           </p:contentPart>
         </mc:Choice>
-        <mc:Fallback>
+        <mc:Fallback xmlns="">
           <p:pic>
             <p:nvPicPr>
               <p:cNvPr id="10" name="Freihand 9">
@@ -12772,8 +12849,8 @@
           </p:pic>
         </mc:Fallback>
       </mc:AlternateContent>
-      <mc:AlternateContent xmlns:mc="http://schemas.openxmlformats.org/markup-compatibility/2006">
-        <mc:Choice xmlns:p14="http://schemas.microsoft.com/office/powerpoint/2010/main" xmlns:aink="http://schemas.microsoft.com/office/drawing/2016/ink" Requires="p14 aink">
+      <mc:AlternateContent xmlns:mc="http://schemas.openxmlformats.org/markup-compatibility/2006" xmlns:p14="http://schemas.microsoft.com/office/powerpoint/2010/main" xmlns:aink="http://schemas.microsoft.com/office/drawing/2016/ink">
+        <mc:Choice Requires="p14 aink">
           <p:contentPart p14:bwMode="auto" r:id="rId5">
             <p14:nvContentPartPr>
               <p14:cNvPr id="11" name="Freihand 10">
@@ -12792,7 +12869,7 @@
             </p14:xfrm>
           </p:contentPart>
         </mc:Choice>
-        <mc:Fallback>
+        <mc:Fallback xmlns="">
           <p:pic>
             <p:nvPicPr>
               <p:cNvPr id="11" name="Freihand 10">

</xml_diff>

<commit_message>
auf start und end folien nummern eingefügt
</commit_message>
<xml_diff>
--- a/Ausarbeitung/präzi.pptx
+++ b/Ausarbeitung/präzi.pptx
@@ -1,6 +1,6 @@
 
 <file path=ppt/presentation.xml><?xml version="1.0" encoding="utf-8"?>
-<p:presentation xmlns:a="http://schemas.openxmlformats.org/drawingml/2006/main" xmlns:r="http://schemas.openxmlformats.org/officeDocument/2006/relationships" xmlns:p="http://schemas.openxmlformats.org/presentationml/2006/main" showSpecialPlsOnTitleSld="0" saveSubsetFonts="1" autoCompressPictures="0">
+<p:presentation xmlns:a="http://schemas.openxmlformats.org/drawingml/2006/main" xmlns:r="http://schemas.openxmlformats.org/officeDocument/2006/relationships" xmlns:p="http://schemas.openxmlformats.org/presentationml/2006/main" saveSubsetFonts="1" autoCompressPictures="0">
   <p:sldMasterIdLst>
     <p:sldMasterId id="2147483663" r:id="rId1"/>
     <p:sldMasterId id="2147483668" r:id="rId2"/>
@@ -5743,7 +5743,7 @@
   <p:sldLayoutIdLst>
     <p:sldLayoutId id="2147483664" r:id="rId1"/>
   </p:sldLayoutIdLst>
-  <p:hf hdr="0" dt="0"/>
+  <p:hf hdr="0" ftr="0" dt="0"/>
   <p:txStyles>
     <p:titleStyle>
       <a:lvl1pPr algn="l" rtl="0" eaLnBrk="1" fontAlgn="base" hangingPunct="1">
@@ -6351,7 +6351,7 @@
   <p:sldLayoutIdLst>
     <p:sldLayoutId id="2147483669" r:id="rId1"/>
   </p:sldLayoutIdLst>
-  <p:hf hdr="0" dt="0"/>
+  <p:hf hdr="0" ftr="0" dt="0"/>
   <p:txStyles>
     <p:titleStyle>
       <a:lvl1pPr algn="l" rtl="0" eaLnBrk="0" fontAlgn="base" hangingPunct="0">
@@ -6985,7 +6985,7 @@
     <p:sldLayoutId id="2147483717" r:id="rId7"/>
     <p:sldLayoutId id="2147483718" r:id="rId8"/>
   </p:sldLayoutIdLst>
-  <p:hf hdr="0" dt="0"/>
+  <p:hf hdr="0" ftr="0" dt="0"/>
   <p:txStyles>
     <p:titleStyle>
       <a:lvl1pPr algn="l" rtl="0" eaLnBrk="0" fontAlgn="base" hangingPunct="0">
@@ -7530,7 +7530,7 @@
     <p:sldLayoutId id="2147483653" r:id="rId7"/>
     <p:sldLayoutId id="2147483656" r:id="rId8"/>
   </p:sldLayoutIdLst>
-  <p:hf hdr="0" dt="0"/>
+  <p:hf hdr="0" ftr="0" dt="0"/>
   <p:txStyles>
     <p:titleStyle>
       <a:lvl1pPr algn="l" rtl="0" eaLnBrk="0" fontAlgn="base" hangingPunct="0">
@@ -8120,7 +8120,7 @@
   <p:sldLayoutIdLst>
     <p:sldLayoutId id="2147483685" r:id="rId1"/>
   </p:sldLayoutIdLst>
-  <p:hf hdr="0" dt="0"/>
+  <p:hf hdr="0" ftr="0" dt="0"/>
   <p:txStyles>
     <p:titleStyle>
       <a:lvl1pPr algn="l" rtl="0" eaLnBrk="0" fontAlgn="base" hangingPunct="0">
@@ -8717,7 +8717,7 @@
   <p:sldLayoutIdLst>
     <p:sldLayoutId id="2147483698" r:id="rId1"/>
   </p:sldLayoutIdLst>
-  <p:hf hdr="0" dt="0"/>
+  <p:hf hdr="0" ftr="0" dt="0"/>
   <p:txStyles>
     <p:titleStyle>
       <a:lvl1pPr algn="l" rtl="0" eaLnBrk="0" fontAlgn="base" hangingPunct="0">
@@ -9271,6 +9271,36 @@
           </a:prstGeom>
         </p:spPr>
       </p:pic>
+      <p:sp>
+        <p:nvSpPr>
+          <p:cNvPr id="2" name="Foliennummernplatzhalter 1">
+            <a:extLst>
+              <a:ext uri="{FF2B5EF4-FFF2-40B4-BE49-F238E27FC236}">
+                <a16:creationId xmlns:a16="http://schemas.microsoft.com/office/drawing/2014/main" id="{5A4FB968-3119-4854-BB56-C5616488883F}"/>
+              </a:ext>
+            </a:extLst>
+          </p:cNvPr>
+          <p:cNvSpPr>
+            <a:spLocks noGrp="1"/>
+          </p:cNvSpPr>
+          <p:nvPr>
+            <p:ph type="sldNum" sz="quarter" idx="12"/>
+          </p:nvPr>
+        </p:nvSpPr>
+        <p:spPr/>
+        <p:txBody>
+          <a:bodyPr/>
+          <a:lstStyle/>
+          <a:p>
+            <a:fld id="{CE58CB1E-F828-4F11-99E0-327109AF9DA4}" type="slidenum">
+              <a:rPr lang="de-DE" smtClean="0"/>
+              <a:pPr/>
+              <a:t>1</a:t>
+            </a:fld>
+            <a:endParaRPr lang="de-DE" dirty="0"/>
+          </a:p>
+        </p:txBody>
+      </p:sp>
     </p:spTree>
   </p:cSld>
   <p:clrMapOvr>
@@ -9344,7 +9374,7 @@
               </a:pPr>
               <a:t>10</a:t>
             </a:fld>
-            <a:endParaRPr lang="de-DE"/>
+            <a:endParaRPr lang="de-DE" dirty="0"/>
           </a:p>
         </p:txBody>
       </p:sp>
@@ -9651,59 +9681,6 @@
           </a:p>
         </p:txBody>
       </p:sp>
-      <p:sp>
-        <p:nvSpPr>
-          <p:cNvPr id="6" name="Fußzeilenplatzhalter 4">
-            <a:extLst>
-              <a:ext uri="{FF2B5EF4-FFF2-40B4-BE49-F238E27FC236}">
-                <a16:creationId xmlns:a16="http://schemas.microsoft.com/office/drawing/2014/main" id="{64C2E136-AC46-4D88-8561-726B9D9A8B1B}"/>
-              </a:ext>
-            </a:extLst>
-          </p:cNvPr>
-          <p:cNvSpPr>
-            <a:spLocks noGrp="1"/>
-          </p:cNvSpPr>
-          <p:nvPr>
-            <p:ph type="ftr" sz="quarter" idx="17"/>
-          </p:nvPr>
-        </p:nvSpPr>
-        <p:spPr>
-          <a:xfrm>
-            <a:off x="311162" y="6473313"/>
-            <a:ext cx="8760170" cy="365125"/>
-          </a:xfrm>
-        </p:spPr>
-        <p:txBody>
-          <a:bodyPr anchor="ctr">
-            <a:normAutofit/>
-          </a:bodyPr>
-          <a:lstStyle/>
-          <a:p>
-            <a:pPr>
-              <a:lnSpc>
-                <a:spcPct val="90000"/>
-              </a:lnSpc>
-            </a:pPr>
-            <a:r>
-              <a:rPr lang="de-DE" sz="900" dirty="0"/>
-              <a:t>Aspekte der systemnahen Programmierung bei der Spieleentwicklung | 16.02.2021 | </a:t>
-            </a:r>
-            <a:r>
-              <a:rPr lang="en-US" sz="900" b="1" dirty="0" err="1"/>
-              <a:t>Peano-Kurven</a:t>
-            </a:r>
-            <a:r>
-              <a:rPr lang="en-US" sz="900" b="1" dirty="0"/>
-              <a:t> (A214) 		</a:t>
-            </a:r>
-            <a:r>
-              <a:rPr lang="en-US" sz="1400" b="1" dirty="0"/>
-              <a:t>Mohamed Attia</a:t>
-            </a:r>
-            <a:endParaRPr lang="en-US" sz="900" dirty="0"/>
-          </a:p>
-        </p:txBody>
-      </p:sp>
     </p:spTree>
     <p:extLst>
       <p:ext uri="{BB962C8B-B14F-4D97-AF65-F5344CB8AC3E}">
@@ -9806,6 +9783,36 @@
           </a:p>
         </p:txBody>
       </p:sp>
+      <p:sp>
+        <p:nvSpPr>
+          <p:cNvPr id="2" name="Foliennummernplatzhalter 1">
+            <a:extLst>
+              <a:ext uri="{FF2B5EF4-FFF2-40B4-BE49-F238E27FC236}">
+                <a16:creationId xmlns:a16="http://schemas.microsoft.com/office/drawing/2014/main" id="{F54BC5A4-944E-4405-8F4B-124F1397FA96}"/>
+              </a:ext>
+            </a:extLst>
+          </p:cNvPr>
+          <p:cNvSpPr>
+            <a:spLocks noGrp="1"/>
+          </p:cNvSpPr>
+          <p:nvPr>
+            <p:ph type="sldNum" sz="quarter" idx="12"/>
+          </p:nvPr>
+        </p:nvSpPr>
+        <p:spPr/>
+        <p:txBody>
+          <a:bodyPr/>
+          <a:lstStyle/>
+          <a:p>
+            <a:fld id="{CE58CB1E-F828-4F11-99E0-327109AF9DA4}" type="slidenum">
+              <a:rPr lang="de-DE" smtClean="0"/>
+              <a:pPr/>
+              <a:t>11</a:t>
+            </a:fld>
+            <a:endParaRPr lang="de-DE" dirty="0"/>
+          </a:p>
+        </p:txBody>
+      </p:sp>
     </p:spTree>
   </p:cSld>
   <p:clrMapOvr>
@@ -9948,57 +9955,6 @@
               <a:t>2</a:t>
             </a:fld>
             <a:endParaRPr lang="de-DE" dirty="0"/>
-          </a:p>
-        </p:txBody>
-      </p:sp>
-      <p:sp>
-        <p:nvSpPr>
-          <p:cNvPr id="7" name="Fußzeilenplatzhalter 4"/>
-          <p:cNvSpPr>
-            <a:spLocks noGrp="1"/>
-          </p:cNvSpPr>
-          <p:nvPr>
-            <p:ph type="ftr" sz="quarter" idx="17"/>
-          </p:nvPr>
-        </p:nvSpPr>
-        <p:spPr>
-          <a:xfrm>
-            <a:off x="311162" y="6473313"/>
-            <a:ext cx="8760170" cy="365125"/>
-          </a:xfrm>
-        </p:spPr>
-        <p:txBody>
-          <a:bodyPr anchor="ctr">
-            <a:normAutofit/>
-          </a:bodyPr>
-          <a:lstStyle/>
-          <a:p>
-            <a:pPr>
-              <a:lnSpc>
-                <a:spcPct val="90000"/>
-              </a:lnSpc>
-            </a:pPr>
-            <a:r>
-              <a:rPr lang="de-DE" sz="900" dirty="0"/>
-              <a:t>Aspekte der systemnahen Programmierung bei der Spieleentwicklung | 16.02.2021 | </a:t>
-            </a:r>
-            <a:r>
-              <a:rPr lang="en-US" sz="900" b="1" dirty="0" err="1"/>
-              <a:t>Peano-Kurven</a:t>
-            </a:r>
-            <a:r>
-              <a:rPr lang="en-US" sz="900" b="1" dirty="0"/>
-              <a:t> (A214) 		</a:t>
-            </a:r>
-            <a:r>
-              <a:rPr lang="en-US" sz="1400" b="1" dirty="0"/>
-              <a:t>Thomas </a:t>
-            </a:r>
-            <a:r>
-              <a:rPr lang="en-US" sz="1400" b="1" dirty="0" err="1"/>
-              <a:t>Torggler</a:t>
-            </a:r>
-            <a:endParaRPr lang="en-US" sz="900" dirty="0"/>
           </a:p>
         </p:txBody>
       </p:sp>
@@ -10623,63 +10579,6 @@
           </a:p>
         </p:txBody>
       </p:sp>
-      <p:sp>
-        <p:nvSpPr>
-          <p:cNvPr id="6" name="Fußzeilenplatzhalter 4">
-            <a:extLst>
-              <a:ext uri="{FF2B5EF4-FFF2-40B4-BE49-F238E27FC236}">
-                <a16:creationId xmlns:a16="http://schemas.microsoft.com/office/drawing/2014/main" id="{2AF21C1A-026D-45C8-9527-3FCD2C058BF0}"/>
-              </a:ext>
-            </a:extLst>
-          </p:cNvPr>
-          <p:cNvSpPr>
-            <a:spLocks noGrp="1"/>
-          </p:cNvSpPr>
-          <p:nvPr>
-            <p:ph type="ftr" sz="quarter" idx="17"/>
-          </p:nvPr>
-        </p:nvSpPr>
-        <p:spPr>
-          <a:xfrm>
-            <a:off x="311162" y="6473313"/>
-            <a:ext cx="8760170" cy="365125"/>
-          </a:xfrm>
-        </p:spPr>
-        <p:txBody>
-          <a:bodyPr anchor="ctr">
-            <a:normAutofit/>
-          </a:bodyPr>
-          <a:lstStyle/>
-          <a:p>
-            <a:pPr>
-              <a:lnSpc>
-                <a:spcPct val="90000"/>
-              </a:lnSpc>
-            </a:pPr>
-            <a:r>
-              <a:rPr lang="de-DE" sz="900" dirty="0"/>
-              <a:t>Aspekte der systemnahen Programmierung bei der Spieleentwicklung | 16.02.2021 | </a:t>
-            </a:r>
-            <a:r>
-              <a:rPr lang="en-US" sz="900" b="1" dirty="0" err="1"/>
-              <a:t>Peano-Kurven</a:t>
-            </a:r>
-            <a:r>
-              <a:rPr lang="en-US" sz="900" b="1" dirty="0"/>
-              <a:t> (A214) 		</a:t>
-            </a:r>
-            <a:r>
-              <a:rPr lang="en-US" sz="1400" b="1" dirty="0"/>
-              <a:t>Thomas </a:t>
-            </a:r>
-            <a:r>
-              <a:rPr lang="en-US" sz="1400" b="1" dirty="0" err="1"/>
-              <a:t>Torggler</a:t>
-            </a:r>
-            <a:endParaRPr lang="en-US" sz="900" dirty="0"/>
-          </a:p>
-        </p:txBody>
-      </p:sp>
     </p:spTree>
     <p:extLst>
       <p:ext uri="{BB962C8B-B14F-4D97-AF65-F5344CB8AC3E}">
@@ -11022,63 +10921,6 @@
           </a:p>
         </p:txBody>
       </p:sp>
-      <p:sp>
-        <p:nvSpPr>
-          <p:cNvPr id="9" name="Fußzeilenplatzhalter 4">
-            <a:extLst>
-              <a:ext uri="{FF2B5EF4-FFF2-40B4-BE49-F238E27FC236}">
-                <a16:creationId xmlns:a16="http://schemas.microsoft.com/office/drawing/2014/main" id="{36CC2A49-7F74-4EDA-AD34-5949FDEB6A53}"/>
-              </a:ext>
-            </a:extLst>
-          </p:cNvPr>
-          <p:cNvSpPr>
-            <a:spLocks noGrp="1"/>
-          </p:cNvSpPr>
-          <p:nvPr>
-            <p:ph type="ftr" sz="quarter" idx="17"/>
-          </p:nvPr>
-        </p:nvSpPr>
-        <p:spPr>
-          <a:xfrm>
-            <a:off x="311162" y="6473313"/>
-            <a:ext cx="8760170" cy="365125"/>
-          </a:xfrm>
-        </p:spPr>
-        <p:txBody>
-          <a:bodyPr anchor="ctr">
-            <a:normAutofit/>
-          </a:bodyPr>
-          <a:lstStyle/>
-          <a:p>
-            <a:pPr>
-              <a:lnSpc>
-                <a:spcPct val="90000"/>
-              </a:lnSpc>
-            </a:pPr>
-            <a:r>
-              <a:rPr lang="de-DE" sz="900" dirty="0"/>
-              <a:t>Aspekte der systemnahen Programmierung bei der Spieleentwicklung | 16.02.2021 | </a:t>
-            </a:r>
-            <a:r>
-              <a:rPr lang="en-US" sz="900" b="1" dirty="0" err="1"/>
-              <a:t>Peano-Kurven</a:t>
-            </a:r>
-            <a:r>
-              <a:rPr lang="en-US" sz="900" b="1" dirty="0"/>
-              <a:t> (A214) 		</a:t>
-            </a:r>
-            <a:r>
-              <a:rPr lang="en-US" sz="1400" b="1" dirty="0"/>
-              <a:t>Thomas </a:t>
-            </a:r>
-            <a:r>
-              <a:rPr lang="en-US" sz="1400" b="1" dirty="0" err="1"/>
-              <a:t>Torggler</a:t>
-            </a:r>
-            <a:endParaRPr lang="en-US" sz="900" dirty="0"/>
-          </a:p>
-        </p:txBody>
-      </p:sp>
     </p:spTree>
     <p:extLst>
       <p:ext uri="{BB962C8B-B14F-4D97-AF65-F5344CB8AC3E}">
@@ -11551,66 +11393,6 @@
           </a:p>
         </p:txBody>
       </p:sp>
-      <p:sp>
-        <p:nvSpPr>
-          <p:cNvPr id="7" name="Fußzeilenplatzhalter 4">
-            <a:extLst>
-              <a:ext uri="{FF2B5EF4-FFF2-40B4-BE49-F238E27FC236}">
-                <a16:creationId xmlns:a16="http://schemas.microsoft.com/office/drawing/2014/main" id="{0F3EA4E7-33C1-4C40-B9E7-8F82BF1E26B1}"/>
-              </a:ext>
-            </a:extLst>
-          </p:cNvPr>
-          <p:cNvSpPr>
-            <a:spLocks noGrp="1"/>
-          </p:cNvSpPr>
-          <p:nvPr>
-            <p:ph type="ftr" sz="quarter" idx="17"/>
-          </p:nvPr>
-        </p:nvSpPr>
-        <p:spPr>
-          <a:xfrm>
-            <a:off x="311162" y="6473313"/>
-            <a:ext cx="8760170" cy="365125"/>
-          </a:xfrm>
-        </p:spPr>
-        <p:txBody>
-          <a:bodyPr anchor="ctr">
-            <a:normAutofit/>
-          </a:bodyPr>
-          <a:lstStyle/>
-          <a:p>
-            <a:pPr>
-              <a:lnSpc>
-                <a:spcPct val="90000"/>
-              </a:lnSpc>
-            </a:pPr>
-            <a:r>
-              <a:rPr lang="de-DE" sz="900" dirty="0"/>
-              <a:t>Aspekte der systemnahen Programmierung bei der Spieleentwicklung | 16.02.2021 | </a:t>
-            </a:r>
-            <a:r>
-              <a:rPr lang="en-US" sz="900" b="1" dirty="0" err="1"/>
-              <a:t>Peano-Kurven</a:t>
-            </a:r>
-            <a:r>
-              <a:rPr lang="en-US" sz="900" b="1" dirty="0"/>
-              <a:t> (A214) 		</a:t>
-            </a:r>
-            <a:r>
-              <a:rPr lang="en-US" sz="1400" b="1" dirty="0"/>
-              <a:t>Patrick Zimmermann</a:t>
-            </a:r>
-          </a:p>
-          <a:p>
-            <a:pPr>
-              <a:lnSpc>
-                <a:spcPct val="90000"/>
-              </a:lnSpc>
-            </a:pPr>
-            <a:endParaRPr lang="en-US" sz="900" dirty="0"/>
-          </a:p>
-        </p:txBody>
-      </p:sp>
     </p:spTree>
     <p:extLst>
       <p:ext uri="{BB962C8B-B14F-4D97-AF65-F5344CB8AC3E}">
@@ -11790,7 +11572,7 @@
               </a:pPr>
               <a:t>6</a:t>
             </a:fld>
-            <a:endParaRPr lang="de-DE"/>
+            <a:endParaRPr lang="de-DE" dirty="0"/>
           </a:p>
         </p:txBody>
       </p:sp>
@@ -12053,66 +11835,6 @@
           </a:prstGeom>
         </p:spPr>
       </p:pic>
-      <p:sp>
-        <p:nvSpPr>
-          <p:cNvPr id="8" name="Fußzeilenplatzhalter 4">
-            <a:extLst>
-              <a:ext uri="{FF2B5EF4-FFF2-40B4-BE49-F238E27FC236}">
-                <a16:creationId xmlns:a16="http://schemas.microsoft.com/office/drawing/2014/main" id="{06A0CE1A-6F41-4533-973A-D165D0F68D47}"/>
-              </a:ext>
-            </a:extLst>
-          </p:cNvPr>
-          <p:cNvSpPr>
-            <a:spLocks noGrp="1"/>
-          </p:cNvSpPr>
-          <p:nvPr>
-            <p:ph type="ftr" sz="quarter" idx="17"/>
-          </p:nvPr>
-        </p:nvSpPr>
-        <p:spPr>
-          <a:xfrm>
-            <a:off x="311162" y="6473313"/>
-            <a:ext cx="8760170" cy="365125"/>
-          </a:xfrm>
-        </p:spPr>
-        <p:txBody>
-          <a:bodyPr anchor="ctr">
-            <a:normAutofit/>
-          </a:bodyPr>
-          <a:lstStyle/>
-          <a:p>
-            <a:pPr>
-              <a:lnSpc>
-                <a:spcPct val="90000"/>
-              </a:lnSpc>
-            </a:pPr>
-            <a:r>
-              <a:rPr lang="de-DE" sz="900" dirty="0"/>
-              <a:t>Aspekte der systemnahen Programmierung bei der Spieleentwicklung | 16.02.2021 | </a:t>
-            </a:r>
-            <a:r>
-              <a:rPr lang="en-US" sz="900" b="1" dirty="0" err="1"/>
-              <a:t>Peano-Kurven</a:t>
-            </a:r>
-            <a:r>
-              <a:rPr lang="en-US" sz="900" b="1" dirty="0"/>
-              <a:t> (A214) 		</a:t>
-            </a:r>
-            <a:r>
-              <a:rPr lang="en-US" sz="1400" b="1" dirty="0"/>
-              <a:t>Patrick Zimmermann</a:t>
-            </a:r>
-          </a:p>
-          <a:p>
-            <a:pPr>
-              <a:lnSpc>
-                <a:spcPct val="90000"/>
-              </a:lnSpc>
-            </a:pPr>
-            <a:endParaRPr lang="en-US" sz="900" dirty="0"/>
-          </a:p>
-        </p:txBody>
-      </p:sp>
     </p:spTree>
     <p:extLst>
       <p:ext uri="{BB962C8B-B14F-4D97-AF65-F5344CB8AC3E}">
@@ -12708,66 +12430,6 @@
           </a:p>
         </p:txBody>
       </p:sp>
-      <p:sp>
-        <p:nvSpPr>
-          <p:cNvPr id="6" name="Fußzeilenplatzhalter 4">
-            <a:extLst>
-              <a:ext uri="{FF2B5EF4-FFF2-40B4-BE49-F238E27FC236}">
-                <a16:creationId xmlns:a16="http://schemas.microsoft.com/office/drawing/2014/main" id="{D5B5DBB3-9CA8-426E-B7EC-C09DA9B579E1}"/>
-              </a:ext>
-            </a:extLst>
-          </p:cNvPr>
-          <p:cNvSpPr>
-            <a:spLocks noGrp="1"/>
-          </p:cNvSpPr>
-          <p:nvPr>
-            <p:ph type="ftr" sz="quarter" idx="17"/>
-          </p:nvPr>
-        </p:nvSpPr>
-        <p:spPr>
-          <a:xfrm>
-            <a:off x="311162" y="6473313"/>
-            <a:ext cx="8760170" cy="365125"/>
-          </a:xfrm>
-        </p:spPr>
-        <p:txBody>
-          <a:bodyPr anchor="ctr">
-            <a:normAutofit/>
-          </a:bodyPr>
-          <a:lstStyle/>
-          <a:p>
-            <a:pPr>
-              <a:lnSpc>
-                <a:spcPct val="90000"/>
-              </a:lnSpc>
-            </a:pPr>
-            <a:r>
-              <a:rPr lang="de-DE" sz="900" dirty="0"/>
-              <a:t>Aspekte der systemnahen Programmierung bei der Spieleentwicklung | 16.02.2021 | </a:t>
-            </a:r>
-            <a:r>
-              <a:rPr lang="en-US" sz="900" b="1" dirty="0" err="1"/>
-              <a:t>Peano-Kurven</a:t>
-            </a:r>
-            <a:r>
-              <a:rPr lang="en-US" sz="900" b="1" dirty="0"/>
-              <a:t> (A214) 		</a:t>
-            </a:r>
-            <a:r>
-              <a:rPr lang="en-US" sz="1400" b="1" dirty="0"/>
-              <a:t>Patrick Zimmermann</a:t>
-            </a:r>
-          </a:p>
-          <a:p>
-            <a:pPr>
-              <a:lnSpc>
-                <a:spcPct val="90000"/>
-              </a:lnSpc>
-            </a:pPr>
-            <a:endParaRPr lang="en-US" sz="900" dirty="0"/>
-          </a:p>
-        </p:txBody>
-      </p:sp>
       <p:pic>
         <p:nvPicPr>
           <p:cNvPr id="5" name="Grafik 4">
@@ -13299,59 +12961,6 @@
           </a:prstGeom>
         </p:spPr>
       </p:pic>
-      <p:sp>
-        <p:nvSpPr>
-          <p:cNvPr id="8" name="Fußzeilenplatzhalter 4">
-            <a:extLst>
-              <a:ext uri="{FF2B5EF4-FFF2-40B4-BE49-F238E27FC236}">
-                <a16:creationId xmlns:a16="http://schemas.microsoft.com/office/drawing/2014/main" id="{9BE297F5-F76F-4349-9250-004A1D72373D}"/>
-              </a:ext>
-            </a:extLst>
-          </p:cNvPr>
-          <p:cNvSpPr>
-            <a:spLocks noGrp="1"/>
-          </p:cNvSpPr>
-          <p:nvPr>
-            <p:ph type="ftr" sz="quarter" idx="17"/>
-          </p:nvPr>
-        </p:nvSpPr>
-        <p:spPr>
-          <a:xfrm>
-            <a:off x="311162" y="6473313"/>
-            <a:ext cx="8760170" cy="365125"/>
-          </a:xfrm>
-        </p:spPr>
-        <p:txBody>
-          <a:bodyPr anchor="ctr">
-            <a:normAutofit/>
-          </a:bodyPr>
-          <a:lstStyle/>
-          <a:p>
-            <a:pPr>
-              <a:lnSpc>
-                <a:spcPct val="90000"/>
-              </a:lnSpc>
-            </a:pPr>
-            <a:r>
-              <a:rPr lang="de-DE" sz="900" dirty="0"/>
-              <a:t>Aspekte der systemnahen Programmierung bei der Spieleentwicklung | 16.02.2021 | </a:t>
-            </a:r>
-            <a:r>
-              <a:rPr lang="en-US" sz="900" b="1" dirty="0" err="1"/>
-              <a:t>Peano-Kurven</a:t>
-            </a:r>
-            <a:r>
-              <a:rPr lang="en-US" sz="900" b="1" dirty="0"/>
-              <a:t> (A214) 		</a:t>
-            </a:r>
-            <a:r>
-              <a:rPr lang="en-US" sz="1400" b="1" dirty="0"/>
-              <a:t>Mohamed Attia</a:t>
-            </a:r>
-            <a:endParaRPr lang="en-US" sz="900" dirty="0"/>
-          </a:p>
-        </p:txBody>
-      </p:sp>
     </p:spTree>
     <p:extLst>
       <p:ext uri="{BB962C8B-B14F-4D97-AF65-F5344CB8AC3E}">
@@ -13789,59 +13398,6 @@
           </a:prstGeom>
         </p:spPr>
       </p:pic>
-      <p:sp>
-        <p:nvSpPr>
-          <p:cNvPr id="8" name="Fußzeilenplatzhalter 4">
-            <a:extLst>
-              <a:ext uri="{FF2B5EF4-FFF2-40B4-BE49-F238E27FC236}">
-                <a16:creationId xmlns:a16="http://schemas.microsoft.com/office/drawing/2014/main" id="{4A445705-B563-45A5-9008-D9189C25EFB1}"/>
-              </a:ext>
-            </a:extLst>
-          </p:cNvPr>
-          <p:cNvSpPr>
-            <a:spLocks noGrp="1"/>
-          </p:cNvSpPr>
-          <p:nvPr>
-            <p:ph type="ftr" sz="quarter" idx="17"/>
-          </p:nvPr>
-        </p:nvSpPr>
-        <p:spPr>
-          <a:xfrm>
-            <a:off x="311162" y="6473313"/>
-            <a:ext cx="8760170" cy="365125"/>
-          </a:xfrm>
-        </p:spPr>
-        <p:txBody>
-          <a:bodyPr anchor="ctr">
-            <a:normAutofit/>
-          </a:bodyPr>
-          <a:lstStyle/>
-          <a:p>
-            <a:pPr>
-              <a:lnSpc>
-                <a:spcPct val="90000"/>
-              </a:lnSpc>
-            </a:pPr>
-            <a:r>
-              <a:rPr lang="de-DE" sz="900" dirty="0"/>
-              <a:t>Aspekte der systemnahen Programmierung bei der Spieleentwicklung | 16.02.2021 | </a:t>
-            </a:r>
-            <a:r>
-              <a:rPr lang="en-US" sz="900" b="1" dirty="0" err="1"/>
-              <a:t>Peano-Kurven</a:t>
-            </a:r>
-            <a:r>
-              <a:rPr lang="en-US" sz="900" b="1" dirty="0"/>
-              <a:t> (A214) 		</a:t>
-            </a:r>
-            <a:r>
-              <a:rPr lang="en-US" sz="1400" b="1" dirty="0"/>
-              <a:t>Mohamed Attia</a:t>
-            </a:r>
-            <a:endParaRPr lang="en-US" sz="900" dirty="0"/>
-          </a:p>
-        </p:txBody>
-      </p:sp>
     </p:spTree>
     <p:extLst>
       <p:ext uri="{BB962C8B-B14F-4D97-AF65-F5344CB8AC3E}">

</xml_diff>

<commit_message>
Grammatikalisch bis ca Hälfte drübergelesen
</commit_message>
<xml_diff>
--- a/Ausarbeitung/präzi.pptx
+++ b/Ausarbeitung/präzi.pptx
@@ -11984,7 +11984,7 @@
         <p:spPr>
           <a:xfrm>
             <a:off x="4572000" y="1949435"/>
-            <a:ext cx="4171265" cy="4523878"/>
+            <a:ext cx="4153989" cy="3859182"/>
           </a:xfrm>
           <a:prstGeom prst="rect">
             <a:avLst/>
@@ -12453,7 +12453,7 @@
         <p:spPr>
           <a:xfrm>
             <a:off x="311162" y="1949435"/>
-            <a:ext cx="3322320" cy="3322320"/>
+            <a:ext cx="3999581" cy="3999581"/>
           </a:xfrm>
           <a:prstGeom prst="rect">
             <a:avLst/>

</xml_diff>

<commit_message>
Drübergelesen und Grammatik zeug gemacht
</commit_message>
<xml_diff>
--- a/Ausarbeitung/präzi.pptx
+++ b/Ausarbeitung/präzi.pptx
@@ -20,8 +20,8 @@
     <p:sldId id="473" r:id="rId8"/>
     <p:sldId id="474" r:id="rId9"/>
     <p:sldId id="400" r:id="rId10"/>
-    <p:sldId id="471" r:id="rId11"/>
-    <p:sldId id="406" r:id="rId12"/>
+    <p:sldId id="406" r:id="rId11"/>
+    <p:sldId id="471" r:id="rId12"/>
     <p:sldId id="429" r:id="rId13"/>
     <p:sldId id="469" r:id="rId14"/>
     <p:sldId id="470" r:id="rId15"/>
@@ -10963,6 +10963,448 @@
           <a:chExt cx="0" cy="0"/>
         </a:xfrm>
       </p:grpSpPr>
+      <p:sp>
+        <p:nvSpPr>
+          <p:cNvPr id="12" name="Content Placeholder 2">
+            <a:extLst>
+              <a:ext uri="{FF2B5EF4-FFF2-40B4-BE49-F238E27FC236}">
+                <a16:creationId xmlns:a16="http://schemas.microsoft.com/office/drawing/2014/main" id="{CEA1C233-A05E-4C0A-9D6F-463ADE16CF81}"/>
+              </a:ext>
+            </a:extLst>
+          </p:cNvPr>
+          <p:cNvSpPr>
+            <a:spLocks noGrp="1"/>
+          </p:cNvSpPr>
+          <p:nvPr>
+            <p:ph idx="15"/>
+          </p:nvPr>
+        </p:nvSpPr>
+        <p:spPr>
+          <a:xfrm>
+            <a:off x="4644001" y="2228472"/>
+            <a:ext cx="4180910" cy="4687380"/>
+          </a:xfrm>
+        </p:spPr>
+        <p:txBody>
+          <a:bodyPr/>
+          <a:lstStyle/>
+          <a:p>
+            <a:pPr marL="285750" indent="-285750">
+              <a:buFont typeface="Arial" panose="020B0604020202020204" pitchFamily="34" charset="0"/>
+              <a:buChar char="•"/>
+            </a:pPr>
+            <a:r>
+              <a:rPr lang="de-DE" sz="1800" dirty="0"/>
+              <a:t>Data </a:t>
+            </a:r>
+            <a:r>
+              <a:rPr lang="de-DE" sz="1800" dirty="0" err="1"/>
+              <a:t>centric</a:t>
+            </a:r>
+            <a:r>
+              <a:rPr lang="de-DE" sz="1800" dirty="0"/>
+              <a:t> </a:t>
+            </a:r>
+            <a:r>
+              <a:rPr lang="de-DE" sz="1800" dirty="0" err="1"/>
+              <a:t>processing</a:t>
+            </a:r>
+            <a:endParaRPr lang="de-DE" sz="1800" dirty="0"/>
+          </a:p>
+          <a:p>
+            <a:pPr marL="285750" indent="-285750">
+              <a:buFont typeface="Arial" panose="020B0604020202020204" pitchFamily="34" charset="0"/>
+              <a:buChar char="•"/>
+            </a:pPr>
+            <a:endParaRPr lang="de-DE" sz="1800" dirty="0"/>
+          </a:p>
+          <a:p>
+            <a:pPr marL="285750" indent="-285750">
+              <a:buFont typeface="Arial" panose="020B0604020202020204" pitchFamily="34" charset="0"/>
+              <a:buChar char="•"/>
+            </a:pPr>
+            <a:r>
+              <a:rPr lang="en-US" sz="1800" dirty="0"/>
+              <a:t>Data pushed towards operator</a:t>
+            </a:r>
+          </a:p>
+          <a:p>
+            <a:pPr marL="285750" indent="-285750">
+              <a:buFont typeface="Arial" panose="020B0604020202020204" pitchFamily="34" charset="0"/>
+              <a:buChar char="•"/>
+            </a:pPr>
+            <a:endParaRPr lang="en-US" sz="1800" dirty="0"/>
+          </a:p>
+          <a:p>
+            <a:pPr marL="285750" indent="-285750">
+              <a:buFont typeface="Arial" panose="020B0604020202020204" pitchFamily="34" charset="0"/>
+              <a:buChar char="•"/>
+            </a:pPr>
+            <a:r>
+              <a:rPr lang="en-US" sz="1800" dirty="0"/>
+              <a:t>Queries compiled into native machine code (LLVM)</a:t>
+            </a:r>
+          </a:p>
+          <a:p>
+            <a:pPr marL="285750" indent="-285750">
+              <a:buFont typeface="Arial" panose="020B0604020202020204" pitchFamily="34" charset="0"/>
+              <a:buChar char="•"/>
+            </a:pPr>
+            <a:endParaRPr lang="en-US" sz="1800" dirty="0"/>
+          </a:p>
+          <a:p>
+            <a:pPr marL="285750" indent="-285750">
+              <a:buFont typeface="Arial" panose="020B0604020202020204" pitchFamily="34" charset="0"/>
+              <a:buChar char="•"/>
+            </a:pPr>
+            <a:r>
+              <a:rPr lang="en-US" sz="1800" dirty="0"/>
+              <a:t>Maximize data and code locality</a:t>
+            </a:r>
+          </a:p>
+        </p:txBody>
+      </p:sp>
+      <p:sp>
+        <p:nvSpPr>
+          <p:cNvPr id="4" name="Foliennummernplatzhalter 3"/>
+          <p:cNvSpPr>
+            <a:spLocks noGrp="1"/>
+          </p:cNvSpPr>
+          <p:nvPr>
+            <p:ph type="sldNum" sz="quarter" idx="16"/>
+          </p:nvPr>
+        </p:nvSpPr>
+        <p:spPr>
+          <a:xfrm>
+            <a:off x="6774934" y="6473313"/>
+            <a:ext cx="2052074" cy="365125"/>
+          </a:xfrm>
+        </p:spPr>
+        <p:txBody>
+          <a:bodyPr anchor="ctr">
+            <a:normAutofit/>
+          </a:bodyPr>
+          <a:lstStyle/>
+          <a:p>
+            <a:pPr>
+              <a:spcAft>
+                <a:spcPts val="600"/>
+              </a:spcAft>
+            </a:pPr>
+            <a:fld id="{CE58CB1E-F828-4F11-99E0-327109AF9DA4}" type="slidenum">
+              <a:rPr lang="de-DE" smtClean="0"/>
+              <a:pPr>
+                <a:spcAft>
+                  <a:spcPts val="600"/>
+                </a:spcAft>
+              </a:pPr>
+              <a:t>5</a:t>
+            </a:fld>
+            <a:endParaRPr lang="de-DE" dirty="0"/>
+          </a:p>
+        </p:txBody>
+      </p:sp>
+      <p:sp>
+        <p:nvSpPr>
+          <p:cNvPr id="13" name="Titel 2">
+            <a:extLst>
+              <a:ext uri="{FF2B5EF4-FFF2-40B4-BE49-F238E27FC236}">
+                <a16:creationId xmlns:a16="http://schemas.microsoft.com/office/drawing/2014/main" id="{7336CDAB-C088-4FDD-A2DB-CACAE4828BED}"/>
+              </a:ext>
+            </a:extLst>
+          </p:cNvPr>
+          <p:cNvSpPr txBox="1">
+            <a:spLocks/>
+          </p:cNvSpPr>
+          <p:nvPr/>
+        </p:nvSpPr>
+        <p:spPr>
+          <a:xfrm>
+            <a:off x="311162" y="878400"/>
+            <a:ext cx="8508999" cy="410369"/>
+          </a:xfrm>
+          <a:prstGeom prst="rect">
+            <a:avLst/>
+          </a:prstGeom>
+          <a:noFill/>
+          <a:ln w="9525">
+            <a:noFill/>
+            <a:miter lim="800000"/>
+            <a:headEnd/>
+            <a:tailEnd/>
+          </a:ln>
+        </p:spPr>
+        <p:txBody>
+          <a:bodyPr vert="horz" wrap="square" lIns="0" tIns="0" rIns="0" bIns="0" numCol="1" anchor="t" anchorCtr="0" compatLnSpc="1">
+            <a:prstTxWarp prst="textNoShape">
+              <a:avLst/>
+            </a:prstTxWarp>
+            <a:noAutofit/>
+          </a:bodyPr>
+          <a:lstStyle>
+            <a:lvl1pPr algn="l" rtl="0" eaLnBrk="0" fontAlgn="base" hangingPunct="0">
+              <a:lnSpc>
+                <a:spcPts val="3200"/>
+              </a:lnSpc>
+              <a:spcBef>
+                <a:spcPct val="0"/>
+              </a:spcBef>
+              <a:spcAft>
+                <a:spcPct val="0"/>
+              </a:spcAft>
+              <a:defRPr lang="de-DE" sz="3000" b="0" kern="1200" noProof="0" dirty="0">
+                <a:solidFill>
+                  <a:schemeClr val="tx1"/>
+                </a:solidFill>
+                <a:latin typeface="+mj-lt"/>
+                <a:ea typeface="+mj-ea"/>
+                <a:cs typeface="+mj-cs"/>
+              </a:defRPr>
+            </a:lvl1pPr>
+            <a:lvl2pPr algn="l" rtl="0" eaLnBrk="0" fontAlgn="base" hangingPunct="0">
+              <a:spcBef>
+                <a:spcPct val="0"/>
+              </a:spcBef>
+              <a:spcAft>
+                <a:spcPct val="0"/>
+              </a:spcAft>
+              <a:defRPr sz="2000" b="1">
+                <a:solidFill>
+                  <a:schemeClr val="tx2"/>
+                </a:solidFill>
+                <a:latin typeface="Arial" charset="0"/>
+                <a:cs typeface="Arial" charset="0"/>
+              </a:defRPr>
+            </a:lvl2pPr>
+            <a:lvl3pPr algn="l" rtl="0" eaLnBrk="0" fontAlgn="base" hangingPunct="0">
+              <a:spcBef>
+                <a:spcPct val="0"/>
+              </a:spcBef>
+              <a:spcAft>
+                <a:spcPct val="0"/>
+              </a:spcAft>
+              <a:defRPr sz="2000" b="1">
+                <a:solidFill>
+                  <a:schemeClr val="tx2"/>
+                </a:solidFill>
+                <a:latin typeface="Arial" charset="0"/>
+                <a:cs typeface="Arial" charset="0"/>
+              </a:defRPr>
+            </a:lvl3pPr>
+            <a:lvl4pPr algn="l" rtl="0" eaLnBrk="0" fontAlgn="base" hangingPunct="0">
+              <a:spcBef>
+                <a:spcPct val="0"/>
+              </a:spcBef>
+              <a:spcAft>
+                <a:spcPct val="0"/>
+              </a:spcAft>
+              <a:defRPr sz="2000" b="1">
+                <a:solidFill>
+                  <a:schemeClr val="tx2"/>
+                </a:solidFill>
+                <a:latin typeface="Arial" charset="0"/>
+                <a:cs typeface="Arial" charset="0"/>
+              </a:defRPr>
+            </a:lvl4pPr>
+            <a:lvl5pPr algn="l" rtl="0" eaLnBrk="0" fontAlgn="base" hangingPunct="0">
+              <a:spcBef>
+                <a:spcPct val="0"/>
+              </a:spcBef>
+              <a:spcAft>
+                <a:spcPct val="0"/>
+              </a:spcAft>
+              <a:defRPr sz="2000" b="1">
+                <a:solidFill>
+                  <a:schemeClr val="tx2"/>
+                </a:solidFill>
+                <a:latin typeface="Arial" charset="0"/>
+                <a:cs typeface="Arial" charset="0"/>
+              </a:defRPr>
+            </a:lvl5pPr>
+            <a:lvl6pPr marL="457200" algn="l" rtl="0" fontAlgn="base">
+              <a:spcBef>
+                <a:spcPct val="0"/>
+              </a:spcBef>
+              <a:spcAft>
+                <a:spcPct val="0"/>
+              </a:spcAft>
+              <a:defRPr sz="2000" b="1">
+                <a:solidFill>
+                  <a:schemeClr val="tx2"/>
+                </a:solidFill>
+                <a:latin typeface="Arial" charset="0"/>
+                <a:cs typeface="Arial" charset="0"/>
+              </a:defRPr>
+            </a:lvl6pPr>
+            <a:lvl7pPr marL="914400" algn="l" rtl="0" fontAlgn="base">
+              <a:spcBef>
+                <a:spcPct val="0"/>
+              </a:spcBef>
+              <a:spcAft>
+                <a:spcPct val="0"/>
+              </a:spcAft>
+              <a:defRPr sz="2000" b="1">
+                <a:solidFill>
+                  <a:schemeClr val="tx2"/>
+                </a:solidFill>
+                <a:latin typeface="Arial" charset="0"/>
+                <a:cs typeface="Arial" charset="0"/>
+              </a:defRPr>
+            </a:lvl7pPr>
+            <a:lvl8pPr marL="1371600" algn="l" rtl="0" fontAlgn="base">
+              <a:spcBef>
+                <a:spcPct val="0"/>
+              </a:spcBef>
+              <a:spcAft>
+                <a:spcPct val="0"/>
+              </a:spcAft>
+              <a:defRPr sz="2000" b="1">
+                <a:solidFill>
+                  <a:schemeClr val="tx2"/>
+                </a:solidFill>
+                <a:latin typeface="Arial" charset="0"/>
+                <a:cs typeface="Arial" charset="0"/>
+              </a:defRPr>
+            </a:lvl8pPr>
+            <a:lvl9pPr marL="1828800" algn="l" rtl="0" fontAlgn="base">
+              <a:spcBef>
+                <a:spcPct val="0"/>
+              </a:spcBef>
+              <a:spcAft>
+                <a:spcPct val="0"/>
+              </a:spcAft>
+              <a:defRPr sz="2000" b="1">
+                <a:solidFill>
+                  <a:schemeClr val="tx2"/>
+                </a:solidFill>
+                <a:latin typeface="Arial" charset="0"/>
+                <a:cs typeface="Arial" charset="0"/>
+              </a:defRPr>
+            </a:lvl9pPr>
+          </a:lstStyle>
+          <a:p>
+            <a:r>
+              <a:rPr lang="en-US" sz="3200" dirty="0" err="1">
+                <a:solidFill>
+                  <a:schemeClr val="bg2">
+                    <a:lumMod val="75000"/>
+                  </a:schemeClr>
+                </a:solidFill>
+              </a:rPr>
+              <a:t>Lösungsansatz</a:t>
+            </a:r>
+            <a:endParaRPr lang="en-US" sz="3200" dirty="0">
+              <a:solidFill>
+                <a:schemeClr val="bg2">
+                  <a:lumMod val="75000"/>
+                </a:schemeClr>
+              </a:solidFill>
+            </a:endParaRPr>
+          </a:p>
+        </p:txBody>
+      </p:sp>
+      <p:pic>
+        <p:nvPicPr>
+          <p:cNvPr id="6" name="Picture 5" descr="Text&#10;&#10;Description automatically generated">
+            <a:extLst>
+              <a:ext uri="{FF2B5EF4-FFF2-40B4-BE49-F238E27FC236}">
+                <a16:creationId xmlns:a16="http://schemas.microsoft.com/office/drawing/2014/main" id="{218FE5F2-F830-4280-B737-85D5F8AAB29E}"/>
+              </a:ext>
+            </a:extLst>
+          </p:cNvPr>
+          <p:cNvPicPr>
+            <a:picLocks noChangeAspect="1"/>
+          </p:cNvPicPr>
+          <p:nvPr/>
+        </p:nvPicPr>
+        <p:blipFill>
+          <a:blip r:embed="rId2"/>
+          <a:stretch>
+            <a:fillRect/>
+          </a:stretch>
+        </p:blipFill>
+        <p:spPr>
+          <a:xfrm>
+            <a:off x="16450" y="1615741"/>
+            <a:ext cx="4745026" cy="4530626"/>
+          </a:xfrm>
+          <a:prstGeom prst="rect">
+            <a:avLst/>
+          </a:prstGeom>
+        </p:spPr>
+      </p:pic>
+      <p:pic>
+        <p:nvPicPr>
+          <p:cNvPr id="10" name="Picture 9" descr="Text&#10;&#10;Description automatically generated">
+            <a:extLst>
+              <a:ext uri="{FF2B5EF4-FFF2-40B4-BE49-F238E27FC236}">
+                <a16:creationId xmlns:a16="http://schemas.microsoft.com/office/drawing/2014/main" id="{A9337FD1-AAAB-444E-B97B-6DA9FBE302F4}"/>
+              </a:ext>
+            </a:extLst>
+          </p:cNvPr>
+          <p:cNvPicPr>
+            <a:picLocks noChangeAspect="1"/>
+          </p:cNvPicPr>
+          <p:nvPr/>
+        </p:nvPicPr>
+        <p:blipFill>
+          <a:blip r:embed="rId3"/>
+          <a:stretch>
+            <a:fillRect/>
+          </a:stretch>
+        </p:blipFill>
+        <p:spPr>
+          <a:xfrm>
+            <a:off x="4741333" y="1615741"/>
+            <a:ext cx="4402667" cy="4530626"/>
+          </a:xfrm>
+          <a:prstGeom prst="rect">
+            <a:avLst/>
+          </a:prstGeom>
+        </p:spPr>
+      </p:pic>
+    </p:spTree>
+    <p:extLst>
+      <p:ext uri="{BB962C8B-B14F-4D97-AF65-F5344CB8AC3E}">
+        <p14:creationId xmlns:p14="http://schemas.microsoft.com/office/powerpoint/2010/main" val="407081727"/>
+      </p:ext>
+    </p:extLst>
+  </p:cSld>
+  <p:clrMapOvr>
+    <a:masterClrMapping/>
+  </p:clrMapOvr>
+  <mc:AlternateContent xmlns:mc="http://schemas.openxmlformats.org/markup-compatibility/2006" xmlns:p14="http://schemas.microsoft.com/office/powerpoint/2010/main">
+    <mc:Choice Requires="p14">
+      <p:transition spd="med" p14:dur="700" advTm="1315">
+        <p:fade/>
+      </p:transition>
+    </mc:Choice>
+    <mc:Fallback xmlns="">
+      <p:transition spd="med" advTm="1315">
+        <p:fade/>
+      </p:transition>
+    </mc:Fallback>
+  </mc:AlternateContent>
+</p:sld>
+</file>
+
+<file path=ppt/slides/slide6.xml><?xml version="1.0" encoding="utf-8"?>
+<p:sld xmlns:a="http://schemas.openxmlformats.org/drawingml/2006/main" xmlns:r="http://schemas.openxmlformats.org/officeDocument/2006/relationships" xmlns:p="http://schemas.openxmlformats.org/presentationml/2006/main">
+  <p:cSld>
+    <p:spTree>
+      <p:nvGrpSpPr>
+        <p:cNvPr id="1" name=""/>
+        <p:cNvGrpSpPr/>
+        <p:nvPr/>
+      </p:nvGrpSpPr>
+      <p:grpSpPr>
+        <a:xfrm>
+          <a:off x="0" y="0"/>
+          <a:ext cx="0" cy="0"/>
+          <a:chOff x="0" y="0"/>
+          <a:chExt cx="0" cy="0"/>
+        </a:xfrm>
+      </p:grpSpPr>
       <p:pic>
         <p:nvPicPr>
           <p:cNvPr id="3" name="Picture 2" descr="Diagram&#10;&#10;Description automatically generated">
@@ -11174,7 +11616,7 @@
                   <a:spcPts val="600"/>
                 </a:spcAft>
               </a:pPr>
-              <a:t>5</a:t>
+              <a:t>6</a:t>
             </a:fld>
             <a:endParaRPr lang="de-DE"/>
           </a:p>
@@ -11397,448 +11839,6 @@
     <p:extLst>
       <p:ext uri="{BB962C8B-B14F-4D97-AF65-F5344CB8AC3E}">
         <p14:creationId xmlns:p14="http://schemas.microsoft.com/office/powerpoint/2010/main" val="3469765047"/>
-      </p:ext>
-    </p:extLst>
-  </p:cSld>
-  <p:clrMapOvr>
-    <a:masterClrMapping/>
-  </p:clrMapOvr>
-  <mc:AlternateContent xmlns:mc="http://schemas.openxmlformats.org/markup-compatibility/2006" xmlns:p14="http://schemas.microsoft.com/office/powerpoint/2010/main">
-    <mc:Choice Requires="p14">
-      <p:transition spd="med" p14:dur="700" advTm="1315">
-        <p:fade/>
-      </p:transition>
-    </mc:Choice>
-    <mc:Fallback xmlns="">
-      <p:transition spd="med" advTm="1315">
-        <p:fade/>
-      </p:transition>
-    </mc:Fallback>
-  </mc:AlternateContent>
-</p:sld>
-</file>
-
-<file path=ppt/slides/slide6.xml><?xml version="1.0" encoding="utf-8"?>
-<p:sld xmlns:a="http://schemas.openxmlformats.org/drawingml/2006/main" xmlns:r="http://schemas.openxmlformats.org/officeDocument/2006/relationships" xmlns:p="http://schemas.openxmlformats.org/presentationml/2006/main">
-  <p:cSld>
-    <p:spTree>
-      <p:nvGrpSpPr>
-        <p:cNvPr id="1" name=""/>
-        <p:cNvGrpSpPr/>
-        <p:nvPr/>
-      </p:nvGrpSpPr>
-      <p:grpSpPr>
-        <a:xfrm>
-          <a:off x="0" y="0"/>
-          <a:ext cx="0" cy="0"/>
-          <a:chOff x="0" y="0"/>
-          <a:chExt cx="0" cy="0"/>
-        </a:xfrm>
-      </p:grpSpPr>
-      <p:sp>
-        <p:nvSpPr>
-          <p:cNvPr id="12" name="Content Placeholder 2">
-            <a:extLst>
-              <a:ext uri="{FF2B5EF4-FFF2-40B4-BE49-F238E27FC236}">
-                <a16:creationId xmlns:a16="http://schemas.microsoft.com/office/drawing/2014/main" id="{CEA1C233-A05E-4C0A-9D6F-463ADE16CF81}"/>
-              </a:ext>
-            </a:extLst>
-          </p:cNvPr>
-          <p:cNvSpPr>
-            <a:spLocks noGrp="1"/>
-          </p:cNvSpPr>
-          <p:nvPr>
-            <p:ph idx="15"/>
-          </p:nvPr>
-        </p:nvSpPr>
-        <p:spPr>
-          <a:xfrm>
-            <a:off x="4644001" y="2228472"/>
-            <a:ext cx="4180910" cy="4687380"/>
-          </a:xfrm>
-        </p:spPr>
-        <p:txBody>
-          <a:bodyPr/>
-          <a:lstStyle/>
-          <a:p>
-            <a:pPr marL="285750" indent="-285750">
-              <a:buFont typeface="Arial" panose="020B0604020202020204" pitchFamily="34" charset="0"/>
-              <a:buChar char="•"/>
-            </a:pPr>
-            <a:r>
-              <a:rPr lang="de-DE" sz="1800" dirty="0"/>
-              <a:t>Data </a:t>
-            </a:r>
-            <a:r>
-              <a:rPr lang="de-DE" sz="1800" dirty="0" err="1"/>
-              <a:t>centric</a:t>
-            </a:r>
-            <a:r>
-              <a:rPr lang="de-DE" sz="1800" dirty="0"/>
-              <a:t> </a:t>
-            </a:r>
-            <a:r>
-              <a:rPr lang="de-DE" sz="1800" dirty="0" err="1"/>
-              <a:t>processing</a:t>
-            </a:r>
-            <a:endParaRPr lang="de-DE" sz="1800" dirty="0"/>
-          </a:p>
-          <a:p>
-            <a:pPr marL="285750" indent="-285750">
-              <a:buFont typeface="Arial" panose="020B0604020202020204" pitchFamily="34" charset="0"/>
-              <a:buChar char="•"/>
-            </a:pPr>
-            <a:endParaRPr lang="de-DE" sz="1800" dirty="0"/>
-          </a:p>
-          <a:p>
-            <a:pPr marL="285750" indent="-285750">
-              <a:buFont typeface="Arial" panose="020B0604020202020204" pitchFamily="34" charset="0"/>
-              <a:buChar char="•"/>
-            </a:pPr>
-            <a:r>
-              <a:rPr lang="en-US" sz="1800" dirty="0"/>
-              <a:t>Data pushed towards operator</a:t>
-            </a:r>
-          </a:p>
-          <a:p>
-            <a:pPr marL="285750" indent="-285750">
-              <a:buFont typeface="Arial" panose="020B0604020202020204" pitchFamily="34" charset="0"/>
-              <a:buChar char="•"/>
-            </a:pPr>
-            <a:endParaRPr lang="en-US" sz="1800" dirty="0"/>
-          </a:p>
-          <a:p>
-            <a:pPr marL="285750" indent="-285750">
-              <a:buFont typeface="Arial" panose="020B0604020202020204" pitchFamily="34" charset="0"/>
-              <a:buChar char="•"/>
-            </a:pPr>
-            <a:r>
-              <a:rPr lang="en-US" sz="1800" dirty="0"/>
-              <a:t>Queries compiled into native machine code (LLVM)</a:t>
-            </a:r>
-          </a:p>
-          <a:p>
-            <a:pPr marL="285750" indent="-285750">
-              <a:buFont typeface="Arial" panose="020B0604020202020204" pitchFamily="34" charset="0"/>
-              <a:buChar char="•"/>
-            </a:pPr>
-            <a:endParaRPr lang="en-US" sz="1800" dirty="0"/>
-          </a:p>
-          <a:p>
-            <a:pPr marL="285750" indent="-285750">
-              <a:buFont typeface="Arial" panose="020B0604020202020204" pitchFamily="34" charset="0"/>
-              <a:buChar char="•"/>
-            </a:pPr>
-            <a:r>
-              <a:rPr lang="en-US" sz="1800" dirty="0"/>
-              <a:t>Maximize data and code locality</a:t>
-            </a:r>
-          </a:p>
-        </p:txBody>
-      </p:sp>
-      <p:sp>
-        <p:nvSpPr>
-          <p:cNvPr id="4" name="Foliennummernplatzhalter 3"/>
-          <p:cNvSpPr>
-            <a:spLocks noGrp="1"/>
-          </p:cNvSpPr>
-          <p:nvPr>
-            <p:ph type="sldNum" sz="quarter" idx="16"/>
-          </p:nvPr>
-        </p:nvSpPr>
-        <p:spPr>
-          <a:xfrm>
-            <a:off x="6774934" y="6473313"/>
-            <a:ext cx="2052074" cy="365125"/>
-          </a:xfrm>
-        </p:spPr>
-        <p:txBody>
-          <a:bodyPr anchor="ctr">
-            <a:normAutofit/>
-          </a:bodyPr>
-          <a:lstStyle/>
-          <a:p>
-            <a:pPr>
-              <a:spcAft>
-                <a:spcPts val="600"/>
-              </a:spcAft>
-            </a:pPr>
-            <a:fld id="{CE58CB1E-F828-4F11-99E0-327109AF9DA4}" type="slidenum">
-              <a:rPr lang="de-DE" smtClean="0"/>
-              <a:pPr>
-                <a:spcAft>
-                  <a:spcPts val="600"/>
-                </a:spcAft>
-              </a:pPr>
-              <a:t>6</a:t>
-            </a:fld>
-            <a:endParaRPr lang="de-DE" dirty="0"/>
-          </a:p>
-        </p:txBody>
-      </p:sp>
-      <p:sp>
-        <p:nvSpPr>
-          <p:cNvPr id="13" name="Titel 2">
-            <a:extLst>
-              <a:ext uri="{FF2B5EF4-FFF2-40B4-BE49-F238E27FC236}">
-                <a16:creationId xmlns:a16="http://schemas.microsoft.com/office/drawing/2014/main" id="{7336CDAB-C088-4FDD-A2DB-CACAE4828BED}"/>
-              </a:ext>
-            </a:extLst>
-          </p:cNvPr>
-          <p:cNvSpPr txBox="1">
-            <a:spLocks/>
-          </p:cNvSpPr>
-          <p:nvPr/>
-        </p:nvSpPr>
-        <p:spPr>
-          <a:xfrm>
-            <a:off x="311162" y="878400"/>
-            <a:ext cx="8508999" cy="410369"/>
-          </a:xfrm>
-          <a:prstGeom prst="rect">
-            <a:avLst/>
-          </a:prstGeom>
-          <a:noFill/>
-          <a:ln w="9525">
-            <a:noFill/>
-            <a:miter lim="800000"/>
-            <a:headEnd/>
-            <a:tailEnd/>
-          </a:ln>
-        </p:spPr>
-        <p:txBody>
-          <a:bodyPr vert="horz" wrap="square" lIns="0" tIns="0" rIns="0" bIns="0" numCol="1" anchor="t" anchorCtr="0" compatLnSpc="1">
-            <a:prstTxWarp prst="textNoShape">
-              <a:avLst/>
-            </a:prstTxWarp>
-            <a:noAutofit/>
-          </a:bodyPr>
-          <a:lstStyle>
-            <a:lvl1pPr algn="l" rtl="0" eaLnBrk="0" fontAlgn="base" hangingPunct="0">
-              <a:lnSpc>
-                <a:spcPts val="3200"/>
-              </a:lnSpc>
-              <a:spcBef>
-                <a:spcPct val="0"/>
-              </a:spcBef>
-              <a:spcAft>
-                <a:spcPct val="0"/>
-              </a:spcAft>
-              <a:defRPr lang="de-DE" sz="3000" b="0" kern="1200" noProof="0" dirty="0">
-                <a:solidFill>
-                  <a:schemeClr val="tx1"/>
-                </a:solidFill>
-                <a:latin typeface="+mj-lt"/>
-                <a:ea typeface="+mj-ea"/>
-                <a:cs typeface="+mj-cs"/>
-              </a:defRPr>
-            </a:lvl1pPr>
-            <a:lvl2pPr algn="l" rtl="0" eaLnBrk="0" fontAlgn="base" hangingPunct="0">
-              <a:spcBef>
-                <a:spcPct val="0"/>
-              </a:spcBef>
-              <a:spcAft>
-                <a:spcPct val="0"/>
-              </a:spcAft>
-              <a:defRPr sz="2000" b="1">
-                <a:solidFill>
-                  <a:schemeClr val="tx2"/>
-                </a:solidFill>
-                <a:latin typeface="Arial" charset="0"/>
-                <a:cs typeface="Arial" charset="0"/>
-              </a:defRPr>
-            </a:lvl2pPr>
-            <a:lvl3pPr algn="l" rtl="0" eaLnBrk="0" fontAlgn="base" hangingPunct="0">
-              <a:spcBef>
-                <a:spcPct val="0"/>
-              </a:spcBef>
-              <a:spcAft>
-                <a:spcPct val="0"/>
-              </a:spcAft>
-              <a:defRPr sz="2000" b="1">
-                <a:solidFill>
-                  <a:schemeClr val="tx2"/>
-                </a:solidFill>
-                <a:latin typeface="Arial" charset="0"/>
-                <a:cs typeface="Arial" charset="0"/>
-              </a:defRPr>
-            </a:lvl3pPr>
-            <a:lvl4pPr algn="l" rtl="0" eaLnBrk="0" fontAlgn="base" hangingPunct="0">
-              <a:spcBef>
-                <a:spcPct val="0"/>
-              </a:spcBef>
-              <a:spcAft>
-                <a:spcPct val="0"/>
-              </a:spcAft>
-              <a:defRPr sz="2000" b="1">
-                <a:solidFill>
-                  <a:schemeClr val="tx2"/>
-                </a:solidFill>
-                <a:latin typeface="Arial" charset="0"/>
-                <a:cs typeface="Arial" charset="0"/>
-              </a:defRPr>
-            </a:lvl4pPr>
-            <a:lvl5pPr algn="l" rtl="0" eaLnBrk="0" fontAlgn="base" hangingPunct="0">
-              <a:spcBef>
-                <a:spcPct val="0"/>
-              </a:spcBef>
-              <a:spcAft>
-                <a:spcPct val="0"/>
-              </a:spcAft>
-              <a:defRPr sz="2000" b="1">
-                <a:solidFill>
-                  <a:schemeClr val="tx2"/>
-                </a:solidFill>
-                <a:latin typeface="Arial" charset="0"/>
-                <a:cs typeface="Arial" charset="0"/>
-              </a:defRPr>
-            </a:lvl5pPr>
-            <a:lvl6pPr marL="457200" algn="l" rtl="0" fontAlgn="base">
-              <a:spcBef>
-                <a:spcPct val="0"/>
-              </a:spcBef>
-              <a:spcAft>
-                <a:spcPct val="0"/>
-              </a:spcAft>
-              <a:defRPr sz="2000" b="1">
-                <a:solidFill>
-                  <a:schemeClr val="tx2"/>
-                </a:solidFill>
-                <a:latin typeface="Arial" charset="0"/>
-                <a:cs typeface="Arial" charset="0"/>
-              </a:defRPr>
-            </a:lvl6pPr>
-            <a:lvl7pPr marL="914400" algn="l" rtl="0" fontAlgn="base">
-              <a:spcBef>
-                <a:spcPct val="0"/>
-              </a:spcBef>
-              <a:spcAft>
-                <a:spcPct val="0"/>
-              </a:spcAft>
-              <a:defRPr sz="2000" b="1">
-                <a:solidFill>
-                  <a:schemeClr val="tx2"/>
-                </a:solidFill>
-                <a:latin typeface="Arial" charset="0"/>
-                <a:cs typeface="Arial" charset="0"/>
-              </a:defRPr>
-            </a:lvl7pPr>
-            <a:lvl8pPr marL="1371600" algn="l" rtl="0" fontAlgn="base">
-              <a:spcBef>
-                <a:spcPct val="0"/>
-              </a:spcBef>
-              <a:spcAft>
-                <a:spcPct val="0"/>
-              </a:spcAft>
-              <a:defRPr sz="2000" b="1">
-                <a:solidFill>
-                  <a:schemeClr val="tx2"/>
-                </a:solidFill>
-                <a:latin typeface="Arial" charset="0"/>
-                <a:cs typeface="Arial" charset="0"/>
-              </a:defRPr>
-            </a:lvl8pPr>
-            <a:lvl9pPr marL="1828800" algn="l" rtl="0" fontAlgn="base">
-              <a:spcBef>
-                <a:spcPct val="0"/>
-              </a:spcBef>
-              <a:spcAft>
-                <a:spcPct val="0"/>
-              </a:spcAft>
-              <a:defRPr sz="2000" b="1">
-                <a:solidFill>
-                  <a:schemeClr val="tx2"/>
-                </a:solidFill>
-                <a:latin typeface="Arial" charset="0"/>
-                <a:cs typeface="Arial" charset="0"/>
-              </a:defRPr>
-            </a:lvl9pPr>
-          </a:lstStyle>
-          <a:p>
-            <a:r>
-              <a:rPr lang="en-US" sz="3200" dirty="0" err="1">
-                <a:solidFill>
-                  <a:schemeClr val="bg2">
-                    <a:lumMod val="75000"/>
-                  </a:schemeClr>
-                </a:solidFill>
-              </a:rPr>
-              <a:t>Lösungsansatz</a:t>
-            </a:r>
-            <a:endParaRPr lang="en-US" sz="3200" dirty="0">
-              <a:solidFill>
-                <a:schemeClr val="bg2">
-                  <a:lumMod val="75000"/>
-                </a:schemeClr>
-              </a:solidFill>
-            </a:endParaRPr>
-          </a:p>
-        </p:txBody>
-      </p:sp>
-      <p:pic>
-        <p:nvPicPr>
-          <p:cNvPr id="6" name="Picture 5" descr="Text&#10;&#10;Description automatically generated">
-            <a:extLst>
-              <a:ext uri="{FF2B5EF4-FFF2-40B4-BE49-F238E27FC236}">
-                <a16:creationId xmlns:a16="http://schemas.microsoft.com/office/drawing/2014/main" id="{218FE5F2-F830-4280-B737-85D5F8AAB29E}"/>
-              </a:ext>
-            </a:extLst>
-          </p:cNvPr>
-          <p:cNvPicPr>
-            <a:picLocks noChangeAspect="1"/>
-          </p:cNvPicPr>
-          <p:nvPr/>
-        </p:nvPicPr>
-        <p:blipFill>
-          <a:blip r:embed="rId2"/>
-          <a:stretch>
-            <a:fillRect/>
-          </a:stretch>
-        </p:blipFill>
-        <p:spPr>
-          <a:xfrm>
-            <a:off x="16450" y="1615741"/>
-            <a:ext cx="4745026" cy="4530626"/>
-          </a:xfrm>
-          <a:prstGeom prst="rect">
-            <a:avLst/>
-          </a:prstGeom>
-        </p:spPr>
-      </p:pic>
-      <p:pic>
-        <p:nvPicPr>
-          <p:cNvPr id="10" name="Picture 9" descr="Text&#10;&#10;Description automatically generated">
-            <a:extLst>
-              <a:ext uri="{FF2B5EF4-FFF2-40B4-BE49-F238E27FC236}">
-                <a16:creationId xmlns:a16="http://schemas.microsoft.com/office/drawing/2014/main" id="{A9337FD1-AAAB-444E-B97B-6DA9FBE302F4}"/>
-              </a:ext>
-            </a:extLst>
-          </p:cNvPr>
-          <p:cNvPicPr>
-            <a:picLocks noChangeAspect="1"/>
-          </p:cNvPicPr>
-          <p:nvPr/>
-        </p:nvPicPr>
-        <p:blipFill>
-          <a:blip r:embed="rId3"/>
-          <a:stretch>
-            <a:fillRect/>
-          </a:stretch>
-        </p:blipFill>
-        <p:spPr>
-          <a:xfrm>
-            <a:off x="4741333" y="1615741"/>
-            <a:ext cx="4402667" cy="4530626"/>
-          </a:xfrm>
-          <a:prstGeom prst="rect">
-            <a:avLst/>
-          </a:prstGeom>
-        </p:spPr>
-      </p:pic>
-    </p:spTree>
-    <p:extLst>
-      <p:ext uri="{BB962C8B-B14F-4D97-AF65-F5344CB8AC3E}">
-        <p14:creationId xmlns:p14="http://schemas.microsoft.com/office/powerpoint/2010/main" val="407081727"/>
       </p:ext>
     </p:extLst>
   </p:cSld>

</xml_diff>

<commit_message>
Folien Ready - Mo (noch nur den Skript für die Präzi)
</commit_message>
<xml_diff>
--- a/Ausarbeitung/präzi.pptx
+++ b/Ausarbeitung/präzi.pptx
@@ -10,10 +10,10 @@
     <p:sldMasterId id="2147483697" r:id="rId6"/>
   </p:sldMasterIdLst>
   <p:notesMasterIdLst>
-    <p:notesMasterId r:id="rId18"/>
+    <p:notesMasterId r:id="rId21"/>
   </p:notesMasterIdLst>
   <p:handoutMasterIdLst>
-    <p:handoutMasterId r:id="rId19"/>
+    <p:handoutMasterId r:id="rId22"/>
   </p:handoutMasterIdLst>
   <p:sldIdLst>
     <p:sldId id="355" r:id="rId7"/>
@@ -23,10 +23,13 @@
     <p:sldId id="406" r:id="rId11"/>
     <p:sldId id="471" r:id="rId12"/>
     <p:sldId id="429" r:id="rId13"/>
-    <p:sldId id="469" r:id="rId14"/>
-    <p:sldId id="470" r:id="rId15"/>
-    <p:sldId id="472" r:id="rId16"/>
-    <p:sldId id="356" r:id="rId17"/>
+    <p:sldId id="475" r:id="rId14"/>
+    <p:sldId id="476" r:id="rId15"/>
+    <p:sldId id="477" r:id="rId16"/>
+    <p:sldId id="478" r:id="rId17"/>
+    <p:sldId id="479" r:id="rId18"/>
+    <p:sldId id="480" r:id="rId19"/>
+    <p:sldId id="356" r:id="rId20"/>
   </p:sldIdLst>
   <p:sldSz cx="9144000" cy="6858000" type="screen4x3"/>
   <p:notesSz cx="9925050" cy="6665913"/>
@@ -297,7 +300,7 @@
               <a:pPr>
                 <a:defRPr/>
               </a:pPr>
-              <a:t>13/02/2021</a:t>
+              <a:t>15/02/2021</a:t>
             </a:fld>
             <a:endParaRPr lang="en-GB" dirty="0"/>
           </a:p>
@@ -390,7 +393,7 @@
               <a:pPr>
                 <a:defRPr/>
               </a:pPr>
-              <a:t>‹Nr.›</a:t>
+              <a:t>‹#›</a:t>
             </a:fld>
             <a:endParaRPr lang="en-GB"/>
           </a:p>
@@ -574,7 +577,7 @@
               <a:pPr>
                 <a:defRPr/>
               </a:pPr>
-              <a:t>13/02/2021</a:t>
+              <a:t>15/02/2021</a:t>
             </a:fld>
             <a:endParaRPr lang="en-GB"/>
           </a:p>
@@ -766,7 +769,7 @@
               <a:pPr>
                 <a:defRPr/>
               </a:pPr>
-              <a:t>‹Nr.›</a:t>
+              <a:t>‹#›</a:t>
             </a:fld>
             <a:endParaRPr lang="en-GB"/>
           </a:p>
@@ -1157,7 +1160,7 @@
             <a:fld id="{CE58CB1E-F828-4F11-99E0-327109AF9DA4}" type="slidenum">
               <a:rPr lang="de-DE" smtClean="0"/>
               <a:pPr/>
-              <a:t>‹Nr.›</a:t>
+              <a:t>‹#›</a:t>
             </a:fld>
             <a:endParaRPr lang="de-DE" dirty="0"/>
           </a:p>
@@ -1376,7 +1379,7 @@
             <a:fld id="{CE58CB1E-F828-4F11-99E0-327109AF9DA4}" type="slidenum">
               <a:rPr lang="de-DE" smtClean="0"/>
               <a:pPr/>
-              <a:t>‹Nr.›</a:t>
+              <a:t>‹#›</a:t>
             </a:fld>
             <a:endParaRPr lang="de-DE" dirty="0"/>
           </a:p>
@@ -1721,7 +1724,7 @@
             <a:fld id="{CE58CB1E-F828-4F11-99E0-327109AF9DA4}" type="slidenum">
               <a:rPr lang="de-DE" smtClean="0"/>
               <a:pPr/>
-              <a:t>‹Nr.›</a:t>
+              <a:t>‹#›</a:t>
             </a:fld>
             <a:endParaRPr lang="de-DE" dirty="0"/>
           </a:p>
@@ -1920,7 +1923,7 @@
             <a:fld id="{CE58CB1E-F828-4F11-99E0-327109AF9DA4}" type="slidenum">
               <a:rPr lang="de-DE" smtClean="0"/>
               <a:pPr/>
-              <a:t>‹Nr.›</a:t>
+              <a:t>‹#›</a:t>
             </a:fld>
             <a:endParaRPr lang="de-DE" dirty="0"/>
           </a:p>
@@ -2119,7 +2122,7 @@
             <a:fld id="{CE58CB1E-F828-4F11-99E0-327109AF9DA4}" type="slidenum">
               <a:rPr lang="de-DE" smtClean="0"/>
               <a:pPr/>
-              <a:t>‹Nr.›</a:t>
+              <a:t>‹#›</a:t>
             </a:fld>
             <a:endParaRPr lang="de-DE" dirty="0"/>
           </a:p>
@@ -2440,7 +2443,7 @@
             <a:fld id="{CE58CB1E-F828-4F11-99E0-327109AF9DA4}" type="slidenum">
               <a:rPr lang="de-DE" smtClean="0"/>
               <a:pPr/>
-              <a:t>‹Nr.›</a:t>
+              <a:t>‹#›</a:t>
             </a:fld>
             <a:endParaRPr lang="de-DE" dirty="0"/>
           </a:p>
@@ -2616,7 +2619,7 @@
             <a:fld id="{CE58CB1E-F828-4F11-99E0-327109AF9DA4}" type="slidenum">
               <a:rPr lang="de-DE" smtClean="0"/>
               <a:pPr/>
-              <a:t>‹Nr.›</a:t>
+              <a:t>‹#›</a:t>
             </a:fld>
             <a:endParaRPr lang="de-DE" dirty="0"/>
           </a:p>
@@ -2931,7 +2934,7 @@
             <a:fld id="{CE58CB1E-F828-4F11-99E0-327109AF9DA4}" type="slidenum">
               <a:rPr lang="de-DE" smtClean="0"/>
               <a:pPr/>
-              <a:t>‹Nr.›</a:t>
+              <a:t>‹#›</a:t>
             </a:fld>
             <a:endParaRPr lang="de-DE" dirty="0"/>
           </a:p>
@@ -3203,7 +3206,7 @@
             <a:fld id="{CE58CB1E-F828-4F11-99E0-327109AF9DA4}" type="slidenum">
               <a:rPr lang="de-DE" smtClean="0"/>
               <a:pPr/>
-              <a:t>‹Nr.›</a:t>
+              <a:t>‹#›</a:t>
             </a:fld>
             <a:endParaRPr lang="de-DE" dirty="0"/>
           </a:p>
@@ -3390,7 +3393,7 @@
             <a:fld id="{CE58CB1E-F828-4F11-99E0-327109AF9DA4}" type="slidenum">
               <a:rPr lang="de-DE" smtClean="0"/>
               <a:pPr/>
-              <a:t>‹Nr.›</a:t>
+              <a:t>‹#›</a:t>
             </a:fld>
             <a:endParaRPr lang="de-DE" dirty="0"/>
           </a:p>
@@ -3589,7 +3592,7 @@
             <a:fld id="{CE58CB1E-F828-4F11-99E0-327109AF9DA4}" type="slidenum">
               <a:rPr lang="de-DE" smtClean="0"/>
               <a:pPr/>
-              <a:t>‹Nr.›</a:t>
+              <a:t>‹#›</a:t>
             </a:fld>
             <a:endParaRPr lang="de-DE" dirty="0"/>
           </a:p>
@@ -3790,7 +3793,7 @@
             <a:fld id="{CE58CB1E-F828-4F11-99E0-327109AF9DA4}" type="slidenum">
               <a:rPr lang="de-DE" smtClean="0"/>
               <a:pPr/>
-              <a:t>‹Nr.›</a:t>
+              <a:t>‹#›</a:t>
             </a:fld>
             <a:endParaRPr lang="de-DE" dirty="0"/>
           </a:p>
@@ -3883,7 +3886,7 @@
             <a:fld id="{CE58CB1E-F828-4F11-99E0-327109AF9DA4}" type="slidenum">
               <a:rPr lang="de-DE" smtClean="0"/>
               <a:pPr/>
-              <a:t>‹Nr.›</a:t>
+              <a:t>‹#›</a:t>
             </a:fld>
             <a:endParaRPr lang="de-DE" dirty="0"/>
           </a:p>
@@ -4166,7 +4169,7 @@
             <a:fld id="{CE58CB1E-F828-4F11-99E0-327109AF9DA4}" type="slidenum">
               <a:rPr lang="de-DE" smtClean="0"/>
               <a:pPr/>
-              <a:t>‹Nr.›</a:t>
+              <a:t>‹#›</a:t>
             </a:fld>
             <a:endParaRPr lang="de-DE" dirty="0"/>
           </a:p>
@@ -4365,7 +4368,7 @@
             <a:fld id="{CE58CB1E-F828-4F11-99E0-327109AF9DA4}" type="slidenum">
               <a:rPr lang="de-DE" smtClean="0"/>
               <a:pPr/>
-              <a:t>‹Nr.›</a:t>
+              <a:t>‹#›</a:t>
             </a:fld>
             <a:endParaRPr lang="de-DE" dirty="0"/>
           </a:p>
@@ -4541,7 +4544,7 @@
             <a:fld id="{CE58CB1E-F828-4F11-99E0-327109AF9DA4}" type="slidenum">
               <a:rPr lang="de-DE" smtClean="0"/>
               <a:pPr/>
-              <a:t>‹Nr.›</a:t>
+              <a:t>‹#›</a:t>
             </a:fld>
             <a:endParaRPr lang="de-DE" dirty="0"/>
           </a:p>
@@ -4910,7 +4913,7 @@
             <a:fld id="{CE58CB1E-F828-4F11-99E0-327109AF9DA4}" type="slidenum">
               <a:rPr lang="de-DE" smtClean="0"/>
               <a:pPr/>
-              <a:t>‹Nr.›</a:t>
+              <a:t>‹#›</a:t>
             </a:fld>
             <a:endParaRPr lang="de-DE" dirty="0"/>
           </a:p>
@@ -5109,7 +5112,7 @@
             <a:fld id="{CE58CB1E-F828-4F11-99E0-327109AF9DA4}" type="slidenum">
               <a:rPr lang="de-DE" smtClean="0"/>
               <a:pPr/>
-              <a:t>‹Nr.›</a:t>
+              <a:t>‹#›</a:t>
             </a:fld>
             <a:endParaRPr lang="de-DE" dirty="0"/>
           </a:p>
@@ -5333,7 +5336,7 @@
             <a:fld id="{CE58CB1E-F828-4F11-99E0-327109AF9DA4}" type="slidenum">
               <a:rPr lang="de-DE" smtClean="0"/>
               <a:pPr/>
-              <a:t>‹Nr.›</a:t>
+              <a:t>‹#›</a:t>
             </a:fld>
             <a:endParaRPr lang="de-DE" dirty="0"/>
           </a:p>
@@ -5520,7 +5523,7 @@
             <a:fld id="{CE58CB1E-F828-4F11-99E0-327109AF9DA4}" type="slidenum">
               <a:rPr lang="de-DE" smtClean="0"/>
               <a:pPr/>
-              <a:t>‹Nr.›</a:t>
+              <a:t>‹#›</a:t>
             </a:fld>
             <a:endParaRPr lang="de-DE" dirty="0"/>
           </a:p>
@@ -5731,7 +5734,7 @@
             <a:fld id="{CE58CB1E-F828-4F11-99E0-327109AF9DA4}" type="slidenum">
               <a:rPr lang="de-DE" smtClean="0"/>
               <a:pPr/>
-              <a:t>‹Nr.›</a:t>
+              <a:t>‹#›</a:t>
             </a:fld>
             <a:endParaRPr lang="de-DE" dirty="0"/>
           </a:p>
@@ -6208,7 +6211,7 @@
                   <a:spcPct val="114000"/>
                 </a:lnSpc>
               </a:pPr>
-              <a:t>‹Nr.›</a:t>
+              <a:t>‹#›</a:t>
             </a:fld>
             <a:endParaRPr lang="de-DE" sz="1200" dirty="0">
               <a:latin typeface="+mn-lt"/>
@@ -6300,7 +6303,7 @@
             <a:fld id="{CE58CB1E-F828-4F11-99E0-327109AF9DA4}" type="slidenum">
               <a:rPr lang="de-DE" noProof="0" smtClean="0"/>
               <a:pPr/>
-              <a:t>‹Nr.›</a:t>
+              <a:t>‹#›</a:t>
             </a:fld>
             <a:endParaRPr lang="de-DE" noProof="0"/>
           </a:p>
@@ -6814,7 +6817,7 @@
             <a:fld id="{CE58CB1E-F828-4F11-99E0-327109AF9DA4}" type="slidenum">
               <a:rPr lang="de-DE" smtClean="0"/>
               <a:pPr/>
-              <a:t>‹Nr.›</a:t>
+              <a:t>‹#›</a:t>
             </a:fld>
             <a:endParaRPr lang="de-DE" dirty="0"/>
           </a:p>
@@ -7472,7 +7475,7 @@
             <a:fld id="{CE58CB1E-F828-4F11-99E0-327109AF9DA4}" type="slidenum">
               <a:rPr lang="de-DE" smtClean="0"/>
               <a:pPr/>
-              <a:t>‹Nr.›</a:t>
+              <a:t>‹#›</a:t>
             </a:fld>
             <a:endParaRPr lang="de-DE" dirty="0"/>
           </a:p>
@@ -8069,7 +8072,7 @@
             <a:fld id="{CE58CB1E-F828-4F11-99E0-327109AF9DA4}" type="slidenum">
               <a:rPr lang="de-DE" smtClean="0"/>
               <a:pPr/>
-              <a:t>‹Nr.›</a:t>
+              <a:t>‹#›</a:t>
             </a:fld>
             <a:endParaRPr lang="de-DE" dirty="0"/>
           </a:p>
@@ -8666,7 +8669,7 @@
             <a:fld id="{CE58CB1E-F828-4F11-99E0-327109AF9DA4}" type="slidenum">
               <a:rPr lang="de-DE" smtClean="0"/>
               <a:pPr/>
-              <a:t>‹Nr.›</a:t>
+              <a:t>‹#›</a:t>
             </a:fld>
             <a:endParaRPr lang="de-DE" dirty="0"/>
           </a:p>
@@ -9211,7 +9214,15 @@
           <a:p>
             <a:r>
               <a:rPr lang="de-DE" sz="1200" dirty="0"/>
-              <a:t>München,  der 16. Februar 2021</a:t>
+              <a:t>München</a:t>
+            </a:r>
+            <a:r>
+              <a:rPr lang="de-DE" sz="1200"/>
+              <a:t>, den 16</a:t>
+            </a:r>
+            <a:r>
+              <a:rPr lang="de-DE" sz="1200" dirty="0"/>
+              <a:t>. Februar 2021</a:t>
             </a:r>
           </a:p>
         </p:txBody>
@@ -9338,6 +9349,1114 @@
           <a:chExt cx="0" cy="0"/>
         </a:xfrm>
       </p:grpSpPr>
+      <p:pic>
+        <p:nvPicPr>
+          <p:cNvPr id="5" name="Picture 4" descr="Chart, bar chart&#10;&#10;Description automatically generated">
+            <a:extLst>
+              <a:ext uri="{FF2B5EF4-FFF2-40B4-BE49-F238E27FC236}">
+                <a16:creationId xmlns:a16="http://schemas.microsoft.com/office/drawing/2014/main" id="{547B83D1-95EE-4F7E-8B63-DE0AAF710199}"/>
+              </a:ext>
+            </a:extLst>
+          </p:cNvPr>
+          <p:cNvPicPr>
+            <a:picLocks noChangeAspect="1"/>
+          </p:cNvPicPr>
+          <p:nvPr/>
+        </p:nvPicPr>
+        <p:blipFill>
+          <a:blip r:embed="rId2"/>
+          <a:stretch>
+            <a:fillRect/>
+          </a:stretch>
+        </p:blipFill>
+        <p:spPr>
+          <a:xfrm>
+            <a:off x="319090" y="1641075"/>
+            <a:ext cx="8508999" cy="4651227"/>
+          </a:xfrm>
+          <a:prstGeom prst="rect">
+            <a:avLst/>
+          </a:prstGeom>
+          <a:noFill/>
+          <a:ln w="9525">
+            <a:noFill/>
+            <a:miter lim="800000"/>
+            <a:headEnd/>
+            <a:tailEnd/>
+          </a:ln>
+        </p:spPr>
+      </p:pic>
+      <p:sp>
+        <p:nvSpPr>
+          <p:cNvPr id="4" name="Foliennummernplatzhalter 3"/>
+          <p:cNvSpPr>
+            <a:spLocks noGrp="1"/>
+          </p:cNvSpPr>
+          <p:nvPr>
+            <p:ph type="sldNum" sz="quarter" idx="11"/>
+          </p:nvPr>
+        </p:nvSpPr>
+        <p:spPr>
+          <a:xfrm>
+            <a:off x="6774934" y="6473313"/>
+            <a:ext cx="2052074" cy="365125"/>
+          </a:xfrm>
+        </p:spPr>
+        <p:txBody>
+          <a:bodyPr anchor="ctr">
+            <a:normAutofit/>
+          </a:bodyPr>
+          <a:lstStyle/>
+          <a:p>
+            <a:pPr>
+              <a:spcAft>
+                <a:spcPts val="600"/>
+              </a:spcAft>
+            </a:pPr>
+            <a:fld id="{CE58CB1E-F828-4F11-99E0-327109AF9DA4}" type="slidenum">
+              <a:rPr lang="de-DE" smtClean="0"/>
+              <a:pPr>
+                <a:spcAft>
+                  <a:spcPts val="600"/>
+                </a:spcAft>
+              </a:pPr>
+              <a:t>10</a:t>
+            </a:fld>
+            <a:endParaRPr lang="de-DE"/>
+          </a:p>
+        </p:txBody>
+      </p:sp>
+      <p:sp>
+        <p:nvSpPr>
+          <p:cNvPr id="8" name="Titel 2">
+            <a:extLst>
+              <a:ext uri="{FF2B5EF4-FFF2-40B4-BE49-F238E27FC236}">
+                <a16:creationId xmlns:a16="http://schemas.microsoft.com/office/drawing/2014/main" id="{573D1DC5-689B-478B-B4A9-CBDED710DE1B}"/>
+              </a:ext>
+            </a:extLst>
+          </p:cNvPr>
+          <p:cNvSpPr txBox="1">
+            <a:spLocks/>
+          </p:cNvSpPr>
+          <p:nvPr/>
+        </p:nvSpPr>
+        <p:spPr>
+          <a:xfrm>
+            <a:off x="311162" y="878427"/>
+            <a:ext cx="8508999" cy="410369"/>
+          </a:xfrm>
+          <a:prstGeom prst="rect">
+            <a:avLst/>
+          </a:prstGeom>
+          <a:noFill/>
+          <a:ln w="9525">
+            <a:noFill/>
+            <a:miter lim="800000"/>
+            <a:headEnd/>
+            <a:tailEnd/>
+          </a:ln>
+        </p:spPr>
+        <p:txBody>
+          <a:bodyPr vert="horz" wrap="square" lIns="0" tIns="0" rIns="0" bIns="0" numCol="1" anchor="t" anchorCtr="0" compatLnSpc="1">
+            <a:prstTxWarp prst="textNoShape">
+              <a:avLst/>
+            </a:prstTxWarp>
+            <a:noAutofit/>
+          </a:bodyPr>
+          <a:lstStyle>
+            <a:lvl1pPr algn="l" rtl="0" eaLnBrk="0" fontAlgn="base" hangingPunct="0">
+              <a:lnSpc>
+                <a:spcPts val="3200"/>
+              </a:lnSpc>
+              <a:spcBef>
+                <a:spcPct val="0"/>
+              </a:spcBef>
+              <a:spcAft>
+                <a:spcPct val="0"/>
+              </a:spcAft>
+              <a:defRPr lang="de-DE" sz="3000" b="0" kern="1200" noProof="0" dirty="0">
+                <a:solidFill>
+                  <a:schemeClr val="tx1"/>
+                </a:solidFill>
+                <a:latin typeface="+mj-lt"/>
+                <a:ea typeface="+mj-ea"/>
+                <a:cs typeface="+mj-cs"/>
+              </a:defRPr>
+            </a:lvl1pPr>
+            <a:lvl2pPr algn="l" rtl="0" eaLnBrk="0" fontAlgn="base" hangingPunct="0">
+              <a:spcBef>
+                <a:spcPct val="0"/>
+              </a:spcBef>
+              <a:spcAft>
+                <a:spcPct val="0"/>
+              </a:spcAft>
+              <a:defRPr sz="2000" b="1">
+                <a:solidFill>
+                  <a:schemeClr val="tx2"/>
+                </a:solidFill>
+                <a:latin typeface="Arial" charset="0"/>
+                <a:cs typeface="Arial" charset="0"/>
+              </a:defRPr>
+            </a:lvl2pPr>
+            <a:lvl3pPr algn="l" rtl="0" eaLnBrk="0" fontAlgn="base" hangingPunct="0">
+              <a:spcBef>
+                <a:spcPct val="0"/>
+              </a:spcBef>
+              <a:spcAft>
+                <a:spcPct val="0"/>
+              </a:spcAft>
+              <a:defRPr sz="2000" b="1">
+                <a:solidFill>
+                  <a:schemeClr val="tx2"/>
+                </a:solidFill>
+                <a:latin typeface="Arial" charset="0"/>
+                <a:cs typeface="Arial" charset="0"/>
+              </a:defRPr>
+            </a:lvl3pPr>
+            <a:lvl4pPr algn="l" rtl="0" eaLnBrk="0" fontAlgn="base" hangingPunct="0">
+              <a:spcBef>
+                <a:spcPct val="0"/>
+              </a:spcBef>
+              <a:spcAft>
+                <a:spcPct val="0"/>
+              </a:spcAft>
+              <a:defRPr sz="2000" b="1">
+                <a:solidFill>
+                  <a:schemeClr val="tx2"/>
+                </a:solidFill>
+                <a:latin typeface="Arial" charset="0"/>
+                <a:cs typeface="Arial" charset="0"/>
+              </a:defRPr>
+            </a:lvl4pPr>
+            <a:lvl5pPr algn="l" rtl="0" eaLnBrk="0" fontAlgn="base" hangingPunct="0">
+              <a:spcBef>
+                <a:spcPct val="0"/>
+              </a:spcBef>
+              <a:spcAft>
+                <a:spcPct val="0"/>
+              </a:spcAft>
+              <a:defRPr sz="2000" b="1">
+                <a:solidFill>
+                  <a:schemeClr val="tx2"/>
+                </a:solidFill>
+                <a:latin typeface="Arial" charset="0"/>
+                <a:cs typeface="Arial" charset="0"/>
+              </a:defRPr>
+            </a:lvl5pPr>
+            <a:lvl6pPr marL="457200" algn="l" rtl="0" fontAlgn="base">
+              <a:spcBef>
+                <a:spcPct val="0"/>
+              </a:spcBef>
+              <a:spcAft>
+                <a:spcPct val="0"/>
+              </a:spcAft>
+              <a:defRPr sz="2000" b="1">
+                <a:solidFill>
+                  <a:schemeClr val="tx2"/>
+                </a:solidFill>
+                <a:latin typeface="Arial" charset="0"/>
+                <a:cs typeface="Arial" charset="0"/>
+              </a:defRPr>
+            </a:lvl6pPr>
+            <a:lvl7pPr marL="914400" algn="l" rtl="0" fontAlgn="base">
+              <a:spcBef>
+                <a:spcPct val="0"/>
+              </a:spcBef>
+              <a:spcAft>
+                <a:spcPct val="0"/>
+              </a:spcAft>
+              <a:defRPr sz="2000" b="1">
+                <a:solidFill>
+                  <a:schemeClr val="tx2"/>
+                </a:solidFill>
+                <a:latin typeface="Arial" charset="0"/>
+                <a:cs typeface="Arial" charset="0"/>
+              </a:defRPr>
+            </a:lvl7pPr>
+            <a:lvl8pPr marL="1371600" algn="l" rtl="0" fontAlgn="base">
+              <a:spcBef>
+                <a:spcPct val="0"/>
+              </a:spcBef>
+              <a:spcAft>
+                <a:spcPct val="0"/>
+              </a:spcAft>
+              <a:defRPr sz="2000" b="1">
+                <a:solidFill>
+                  <a:schemeClr val="tx2"/>
+                </a:solidFill>
+                <a:latin typeface="Arial" charset="0"/>
+                <a:cs typeface="Arial" charset="0"/>
+              </a:defRPr>
+            </a:lvl8pPr>
+            <a:lvl9pPr marL="1828800" algn="l" rtl="0" fontAlgn="base">
+              <a:spcBef>
+                <a:spcPct val="0"/>
+              </a:spcBef>
+              <a:spcAft>
+                <a:spcPct val="0"/>
+              </a:spcAft>
+              <a:defRPr sz="2000" b="1">
+                <a:solidFill>
+                  <a:schemeClr val="tx2"/>
+                </a:solidFill>
+                <a:latin typeface="Arial" charset="0"/>
+                <a:cs typeface="Arial" charset="0"/>
+              </a:defRPr>
+            </a:lvl9pPr>
+          </a:lstStyle>
+          <a:p>
+            <a:r>
+              <a:rPr lang="en-US" sz="3200" dirty="0"/>
+              <a:t> </a:t>
+            </a:r>
+            <a:r>
+              <a:rPr lang="de-DE" sz="3200" dirty="0" err="1">
+                <a:solidFill>
+                  <a:schemeClr val="bg2">
+                    <a:lumMod val="75000"/>
+                  </a:schemeClr>
+                </a:solidFill>
+              </a:rPr>
+              <a:t>Performanzanalyse</a:t>
+            </a:r>
+            <a:r>
+              <a:rPr lang="en-US" sz="3200" dirty="0">
+                <a:solidFill>
+                  <a:schemeClr val="bg2">
+                    <a:lumMod val="75000"/>
+                  </a:schemeClr>
+                </a:solidFill>
+              </a:rPr>
+              <a:t>: </a:t>
+            </a:r>
+            <a:r>
+              <a:rPr lang="en-US" sz="3200" dirty="0">
+                <a:solidFill>
+                  <a:srgbClr val="005293"/>
+                </a:solidFill>
+              </a:rPr>
+              <a:t>Grad 1 bis 3</a:t>
+            </a:r>
+            <a:endParaRPr lang="en-US" sz="3200" dirty="0"/>
+          </a:p>
+        </p:txBody>
+      </p:sp>
+      <p:pic>
+        <p:nvPicPr>
+          <p:cNvPr id="6" name="Picture 5" descr="Chart, bar chart&#10;&#10;Description automatically generated">
+            <a:extLst>
+              <a:ext uri="{FF2B5EF4-FFF2-40B4-BE49-F238E27FC236}">
+                <a16:creationId xmlns:a16="http://schemas.microsoft.com/office/drawing/2014/main" id="{56CC4D61-DB78-4D27-A5DA-EA73E88277E1}"/>
+              </a:ext>
+            </a:extLst>
+          </p:cNvPr>
+          <p:cNvPicPr>
+            <a:picLocks noChangeAspect="1"/>
+          </p:cNvPicPr>
+          <p:nvPr/>
+        </p:nvPicPr>
+        <p:blipFill rotWithShape="1">
+          <a:blip r:embed="rId3"/>
+          <a:srcRect t="-167" b="94092"/>
+          <a:stretch/>
+        </p:blipFill>
+        <p:spPr>
+          <a:xfrm>
+            <a:off x="319090" y="1628286"/>
+            <a:ext cx="8508999" cy="487185"/>
+          </a:xfrm>
+          <a:prstGeom prst="rect">
+            <a:avLst/>
+          </a:prstGeom>
+          <a:noFill/>
+          <a:ln w="9525">
+            <a:noFill/>
+            <a:miter lim="800000"/>
+            <a:headEnd/>
+            <a:tailEnd/>
+          </a:ln>
+        </p:spPr>
+      </p:pic>
+    </p:spTree>
+    <p:extLst>
+      <p:ext uri="{BB962C8B-B14F-4D97-AF65-F5344CB8AC3E}">
+        <p14:creationId xmlns:p14="http://schemas.microsoft.com/office/powerpoint/2010/main" val="4076214429"/>
+      </p:ext>
+    </p:extLst>
+  </p:cSld>
+  <p:clrMapOvr>
+    <a:masterClrMapping/>
+  </p:clrMapOvr>
+  <mc:AlternateContent xmlns:mc="http://schemas.openxmlformats.org/markup-compatibility/2006" xmlns:p14="http://schemas.microsoft.com/office/powerpoint/2010/main">
+    <mc:Choice Requires="p14">
+      <p:transition spd="med" p14:dur="700" advTm="29363">
+        <p:fade/>
+      </p:transition>
+    </mc:Choice>
+    <mc:Fallback xmlns="">
+      <p:transition spd="med" advTm="29363">
+        <p:fade/>
+      </p:transition>
+    </mc:Fallback>
+  </mc:AlternateContent>
+</p:sld>
+</file>
+
+<file path=ppt/slides/slide11.xml><?xml version="1.0" encoding="utf-8"?>
+<p:sld xmlns:a="http://schemas.openxmlformats.org/drawingml/2006/main" xmlns:r="http://schemas.openxmlformats.org/officeDocument/2006/relationships" xmlns:p="http://schemas.openxmlformats.org/presentationml/2006/main">
+  <p:cSld>
+    <p:spTree>
+      <p:nvGrpSpPr>
+        <p:cNvPr id="1" name=""/>
+        <p:cNvGrpSpPr/>
+        <p:nvPr/>
+      </p:nvGrpSpPr>
+      <p:grpSpPr>
+        <a:xfrm>
+          <a:off x="0" y="0"/>
+          <a:ext cx="0" cy="0"/>
+          <a:chOff x="0" y="0"/>
+          <a:chExt cx="0" cy="0"/>
+        </a:xfrm>
+      </p:grpSpPr>
+      <p:pic>
+        <p:nvPicPr>
+          <p:cNvPr id="7" name="Picture 6" descr="Chart, bar chart&#10;&#10;Description automatically generated">
+            <a:extLst>
+              <a:ext uri="{FF2B5EF4-FFF2-40B4-BE49-F238E27FC236}">
+                <a16:creationId xmlns:a16="http://schemas.microsoft.com/office/drawing/2014/main" id="{F6EF73C4-2F64-4013-98AD-C981F86635C4}"/>
+              </a:ext>
+            </a:extLst>
+          </p:cNvPr>
+          <p:cNvPicPr>
+            <a:picLocks noChangeAspect="1"/>
+          </p:cNvPicPr>
+          <p:nvPr/>
+        </p:nvPicPr>
+        <p:blipFill rotWithShape="1">
+          <a:blip r:embed="rId2"/>
+          <a:srcRect b="52054"/>
+          <a:stretch/>
+        </p:blipFill>
+        <p:spPr>
+          <a:xfrm>
+            <a:off x="323839" y="1562353"/>
+            <a:ext cx="8508999" cy="4060408"/>
+          </a:xfrm>
+          <a:prstGeom prst="rect">
+            <a:avLst/>
+          </a:prstGeom>
+          <a:noFill/>
+          <a:ln w="9525">
+            <a:noFill/>
+            <a:miter lim="800000"/>
+            <a:headEnd/>
+            <a:tailEnd/>
+          </a:ln>
+        </p:spPr>
+      </p:pic>
+      <p:sp>
+        <p:nvSpPr>
+          <p:cNvPr id="4" name="Foliennummernplatzhalter 3"/>
+          <p:cNvSpPr>
+            <a:spLocks noGrp="1"/>
+          </p:cNvSpPr>
+          <p:nvPr>
+            <p:ph type="sldNum" sz="quarter" idx="11"/>
+          </p:nvPr>
+        </p:nvSpPr>
+        <p:spPr>
+          <a:xfrm>
+            <a:off x="6774934" y="6473313"/>
+            <a:ext cx="2052074" cy="365125"/>
+          </a:xfrm>
+        </p:spPr>
+        <p:txBody>
+          <a:bodyPr anchor="ctr">
+            <a:normAutofit/>
+          </a:bodyPr>
+          <a:lstStyle/>
+          <a:p>
+            <a:pPr>
+              <a:spcAft>
+                <a:spcPts val="600"/>
+              </a:spcAft>
+            </a:pPr>
+            <a:fld id="{CE58CB1E-F828-4F11-99E0-327109AF9DA4}" type="slidenum">
+              <a:rPr lang="de-DE" smtClean="0"/>
+              <a:pPr>
+                <a:spcAft>
+                  <a:spcPts val="600"/>
+                </a:spcAft>
+              </a:pPr>
+              <a:t>11</a:t>
+            </a:fld>
+            <a:endParaRPr lang="de-DE"/>
+          </a:p>
+        </p:txBody>
+      </p:sp>
+      <p:sp>
+        <p:nvSpPr>
+          <p:cNvPr id="8" name="Titel 2">
+            <a:extLst>
+              <a:ext uri="{FF2B5EF4-FFF2-40B4-BE49-F238E27FC236}">
+                <a16:creationId xmlns:a16="http://schemas.microsoft.com/office/drawing/2014/main" id="{8B86187C-3AC6-4172-A4F8-48DF292EB314}"/>
+              </a:ext>
+            </a:extLst>
+          </p:cNvPr>
+          <p:cNvSpPr txBox="1">
+            <a:spLocks/>
+          </p:cNvSpPr>
+          <p:nvPr/>
+        </p:nvSpPr>
+        <p:spPr>
+          <a:xfrm>
+            <a:off x="311162" y="878427"/>
+            <a:ext cx="8508999" cy="410369"/>
+          </a:xfrm>
+          <a:prstGeom prst="rect">
+            <a:avLst/>
+          </a:prstGeom>
+          <a:noFill/>
+          <a:ln w="9525">
+            <a:noFill/>
+            <a:miter lim="800000"/>
+            <a:headEnd/>
+            <a:tailEnd/>
+          </a:ln>
+        </p:spPr>
+        <p:txBody>
+          <a:bodyPr vert="horz" wrap="square" lIns="0" tIns="0" rIns="0" bIns="0" numCol="1" anchor="t" anchorCtr="0" compatLnSpc="1">
+            <a:prstTxWarp prst="textNoShape">
+              <a:avLst/>
+            </a:prstTxWarp>
+            <a:noAutofit/>
+          </a:bodyPr>
+          <a:lstStyle>
+            <a:lvl1pPr algn="l" rtl="0" eaLnBrk="0" fontAlgn="base" hangingPunct="0">
+              <a:lnSpc>
+                <a:spcPts val="3200"/>
+              </a:lnSpc>
+              <a:spcBef>
+                <a:spcPct val="0"/>
+              </a:spcBef>
+              <a:spcAft>
+                <a:spcPct val="0"/>
+              </a:spcAft>
+              <a:defRPr lang="de-DE" sz="3000" b="0" kern="1200" noProof="0" dirty="0">
+                <a:solidFill>
+                  <a:schemeClr val="tx1"/>
+                </a:solidFill>
+                <a:latin typeface="+mj-lt"/>
+                <a:ea typeface="+mj-ea"/>
+                <a:cs typeface="+mj-cs"/>
+              </a:defRPr>
+            </a:lvl1pPr>
+            <a:lvl2pPr algn="l" rtl="0" eaLnBrk="0" fontAlgn="base" hangingPunct="0">
+              <a:spcBef>
+                <a:spcPct val="0"/>
+              </a:spcBef>
+              <a:spcAft>
+                <a:spcPct val="0"/>
+              </a:spcAft>
+              <a:defRPr sz="2000" b="1">
+                <a:solidFill>
+                  <a:schemeClr val="tx2"/>
+                </a:solidFill>
+                <a:latin typeface="Arial" charset="0"/>
+                <a:cs typeface="Arial" charset="0"/>
+              </a:defRPr>
+            </a:lvl2pPr>
+            <a:lvl3pPr algn="l" rtl="0" eaLnBrk="0" fontAlgn="base" hangingPunct="0">
+              <a:spcBef>
+                <a:spcPct val="0"/>
+              </a:spcBef>
+              <a:spcAft>
+                <a:spcPct val="0"/>
+              </a:spcAft>
+              <a:defRPr sz="2000" b="1">
+                <a:solidFill>
+                  <a:schemeClr val="tx2"/>
+                </a:solidFill>
+                <a:latin typeface="Arial" charset="0"/>
+                <a:cs typeface="Arial" charset="0"/>
+              </a:defRPr>
+            </a:lvl3pPr>
+            <a:lvl4pPr algn="l" rtl="0" eaLnBrk="0" fontAlgn="base" hangingPunct="0">
+              <a:spcBef>
+                <a:spcPct val="0"/>
+              </a:spcBef>
+              <a:spcAft>
+                <a:spcPct val="0"/>
+              </a:spcAft>
+              <a:defRPr sz="2000" b="1">
+                <a:solidFill>
+                  <a:schemeClr val="tx2"/>
+                </a:solidFill>
+                <a:latin typeface="Arial" charset="0"/>
+                <a:cs typeface="Arial" charset="0"/>
+              </a:defRPr>
+            </a:lvl4pPr>
+            <a:lvl5pPr algn="l" rtl="0" eaLnBrk="0" fontAlgn="base" hangingPunct="0">
+              <a:spcBef>
+                <a:spcPct val="0"/>
+              </a:spcBef>
+              <a:spcAft>
+                <a:spcPct val="0"/>
+              </a:spcAft>
+              <a:defRPr sz="2000" b="1">
+                <a:solidFill>
+                  <a:schemeClr val="tx2"/>
+                </a:solidFill>
+                <a:latin typeface="Arial" charset="0"/>
+                <a:cs typeface="Arial" charset="0"/>
+              </a:defRPr>
+            </a:lvl5pPr>
+            <a:lvl6pPr marL="457200" algn="l" rtl="0" fontAlgn="base">
+              <a:spcBef>
+                <a:spcPct val="0"/>
+              </a:spcBef>
+              <a:spcAft>
+                <a:spcPct val="0"/>
+              </a:spcAft>
+              <a:defRPr sz="2000" b="1">
+                <a:solidFill>
+                  <a:schemeClr val="tx2"/>
+                </a:solidFill>
+                <a:latin typeface="Arial" charset="0"/>
+                <a:cs typeface="Arial" charset="0"/>
+              </a:defRPr>
+            </a:lvl6pPr>
+            <a:lvl7pPr marL="914400" algn="l" rtl="0" fontAlgn="base">
+              <a:spcBef>
+                <a:spcPct val="0"/>
+              </a:spcBef>
+              <a:spcAft>
+                <a:spcPct val="0"/>
+              </a:spcAft>
+              <a:defRPr sz="2000" b="1">
+                <a:solidFill>
+                  <a:schemeClr val="tx2"/>
+                </a:solidFill>
+                <a:latin typeface="Arial" charset="0"/>
+                <a:cs typeface="Arial" charset="0"/>
+              </a:defRPr>
+            </a:lvl7pPr>
+            <a:lvl8pPr marL="1371600" algn="l" rtl="0" fontAlgn="base">
+              <a:spcBef>
+                <a:spcPct val="0"/>
+              </a:spcBef>
+              <a:spcAft>
+                <a:spcPct val="0"/>
+              </a:spcAft>
+              <a:defRPr sz="2000" b="1">
+                <a:solidFill>
+                  <a:schemeClr val="tx2"/>
+                </a:solidFill>
+                <a:latin typeface="Arial" charset="0"/>
+                <a:cs typeface="Arial" charset="0"/>
+              </a:defRPr>
+            </a:lvl8pPr>
+            <a:lvl9pPr marL="1828800" algn="l" rtl="0" fontAlgn="base">
+              <a:spcBef>
+                <a:spcPct val="0"/>
+              </a:spcBef>
+              <a:spcAft>
+                <a:spcPct val="0"/>
+              </a:spcAft>
+              <a:defRPr sz="2000" b="1">
+                <a:solidFill>
+                  <a:schemeClr val="tx2"/>
+                </a:solidFill>
+                <a:latin typeface="Arial" charset="0"/>
+                <a:cs typeface="Arial" charset="0"/>
+              </a:defRPr>
+            </a:lvl9pPr>
+          </a:lstStyle>
+          <a:p>
+            <a:r>
+              <a:rPr lang="en-US" sz="3200" dirty="0"/>
+              <a:t> </a:t>
+            </a:r>
+            <a:r>
+              <a:rPr lang="en-US" sz="3200" dirty="0" err="1">
+                <a:solidFill>
+                  <a:schemeClr val="bg2">
+                    <a:lumMod val="75000"/>
+                  </a:schemeClr>
+                </a:solidFill>
+              </a:rPr>
+              <a:t>Performanzanalyse</a:t>
+            </a:r>
+            <a:r>
+              <a:rPr lang="en-US" sz="3200" dirty="0">
+                <a:solidFill>
+                  <a:schemeClr val="bg2">
+                    <a:lumMod val="75000"/>
+                  </a:schemeClr>
+                </a:solidFill>
+              </a:rPr>
+              <a:t>: </a:t>
+            </a:r>
+            <a:r>
+              <a:rPr lang="en-US" sz="3200" dirty="0">
+                <a:solidFill>
+                  <a:srgbClr val="005293"/>
+                </a:solidFill>
+              </a:rPr>
+              <a:t>Grad 4 bis 6</a:t>
+            </a:r>
+            <a:endParaRPr lang="en-US" sz="3200" dirty="0"/>
+          </a:p>
+        </p:txBody>
+      </p:sp>
+      <p:pic>
+        <p:nvPicPr>
+          <p:cNvPr id="6" name="Picture 5" descr="Chart, bar chart&#10;&#10;Description automatically generated">
+            <a:extLst>
+              <a:ext uri="{FF2B5EF4-FFF2-40B4-BE49-F238E27FC236}">
+                <a16:creationId xmlns:a16="http://schemas.microsoft.com/office/drawing/2014/main" id="{AADFC083-A29D-4E15-ABFF-FFAF7864FFDE}"/>
+              </a:ext>
+            </a:extLst>
+          </p:cNvPr>
+          <p:cNvPicPr>
+            <a:picLocks noChangeAspect="1"/>
+          </p:cNvPicPr>
+          <p:nvPr/>
+        </p:nvPicPr>
+        <p:blipFill rotWithShape="1">
+          <a:blip r:embed="rId2"/>
+          <a:srcRect t="94241"/>
+          <a:stretch/>
+        </p:blipFill>
+        <p:spPr>
+          <a:xfrm>
+            <a:off x="323839" y="5586198"/>
+            <a:ext cx="8508999" cy="461838"/>
+          </a:xfrm>
+          <a:prstGeom prst="rect">
+            <a:avLst/>
+          </a:prstGeom>
+          <a:noFill/>
+          <a:ln w="9525">
+            <a:noFill/>
+            <a:miter lim="800000"/>
+            <a:headEnd/>
+            <a:tailEnd/>
+          </a:ln>
+        </p:spPr>
+      </p:pic>
+    </p:spTree>
+    <p:extLst>
+      <p:ext uri="{BB962C8B-B14F-4D97-AF65-F5344CB8AC3E}">
+        <p14:creationId xmlns:p14="http://schemas.microsoft.com/office/powerpoint/2010/main" val="1672962177"/>
+      </p:ext>
+    </p:extLst>
+  </p:cSld>
+  <p:clrMapOvr>
+    <a:masterClrMapping/>
+  </p:clrMapOvr>
+  <mc:AlternateContent xmlns:mc="http://schemas.openxmlformats.org/markup-compatibility/2006" xmlns:p14="http://schemas.microsoft.com/office/powerpoint/2010/main">
+    <mc:Choice Requires="p14">
+      <p:transition spd="med" p14:dur="700" advTm="29363">
+        <p:fade/>
+      </p:transition>
+    </mc:Choice>
+    <mc:Fallback xmlns="">
+      <p:transition spd="med" advTm="29363">
+        <p:fade/>
+      </p:transition>
+    </mc:Fallback>
+  </mc:AlternateContent>
+</p:sld>
+</file>
+
+<file path=ppt/slides/slide12.xml><?xml version="1.0" encoding="utf-8"?>
+<p:sld xmlns:a="http://schemas.openxmlformats.org/drawingml/2006/main" xmlns:r="http://schemas.openxmlformats.org/officeDocument/2006/relationships" xmlns:p="http://schemas.openxmlformats.org/presentationml/2006/main">
+  <p:cSld>
+    <p:spTree>
+      <p:nvGrpSpPr>
+        <p:cNvPr id="1" name=""/>
+        <p:cNvGrpSpPr/>
+        <p:nvPr/>
+      </p:nvGrpSpPr>
+      <p:grpSpPr>
+        <a:xfrm>
+          <a:off x="0" y="0"/>
+          <a:ext cx="0" cy="0"/>
+          <a:chOff x="0" y="0"/>
+          <a:chExt cx="0" cy="0"/>
+        </a:xfrm>
+      </p:grpSpPr>
+      <p:pic>
+        <p:nvPicPr>
+          <p:cNvPr id="6" name="Picture 5" descr="Chart, bar chart&#10;&#10;Description automatically generated">
+            <a:extLst>
+              <a:ext uri="{FF2B5EF4-FFF2-40B4-BE49-F238E27FC236}">
+                <a16:creationId xmlns:a16="http://schemas.microsoft.com/office/drawing/2014/main" id="{652AE685-3ACC-48E4-8D6F-1A1F92D9116C}"/>
+              </a:ext>
+            </a:extLst>
+          </p:cNvPr>
+          <p:cNvPicPr>
+            <a:picLocks noChangeAspect="1"/>
+          </p:cNvPicPr>
+          <p:nvPr/>
+        </p:nvPicPr>
+        <p:blipFill rotWithShape="1">
+          <a:blip r:embed="rId2"/>
+          <a:srcRect t="47615"/>
+          <a:stretch/>
+        </p:blipFill>
+        <p:spPr>
+          <a:xfrm>
+            <a:off x="319090" y="1907523"/>
+            <a:ext cx="8508999" cy="4305019"/>
+          </a:xfrm>
+          <a:prstGeom prst="rect">
+            <a:avLst/>
+          </a:prstGeom>
+          <a:noFill/>
+          <a:ln w="9525">
+            <a:noFill/>
+            <a:miter lim="800000"/>
+            <a:headEnd/>
+            <a:tailEnd/>
+          </a:ln>
+        </p:spPr>
+      </p:pic>
+      <p:sp>
+        <p:nvSpPr>
+          <p:cNvPr id="4" name="Foliennummernplatzhalter 3"/>
+          <p:cNvSpPr>
+            <a:spLocks noGrp="1"/>
+          </p:cNvSpPr>
+          <p:nvPr>
+            <p:ph type="sldNum" sz="quarter" idx="11"/>
+          </p:nvPr>
+        </p:nvSpPr>
+        <p:spPr>
+          <a:xfrm>
+            <a:off x="6774934" y="6473313"/>
+            <a:ext cx="2052074" cy="365125"/>
+          </a:xfrm>
+        </p:spPr>
+        <p:txBody>
+          <a:bodyPr anchor="ctr">
+            <a:normAutofit/>
+          </a:bodyPr>
+          <a:lstStyle/>
+          <a:p>
+            <a:pPr>
+              <a:spcAft>
+                <a:spcPts val="600"/>
+              </a:spcAft>
+            </a:pPr>
+            <a:fld id="{CE58CB1E-F828-4F11-99E0-327109AF9DA4}" type="slidenum">
+              <a:rPr lang="de-DE" smtClean="0"/>
+              <a:pPr>
+                <a:spcAft>
+                  <a:spcPts val="600"/>
+                </a:spcAft>
+              </a:pPr>
+              <a:t>12</a:t>
+            </a:fld>
+            <a:endParaRPr lang="de-DE"/>
+          </a:p>
+        </p:txBody>
+      </p:sp>
+      <p:sp>
+        <p:nvSpPr>
+          <p:cNvPr id="7" name="Titel 2">
+            <a:extLst>
+              <a:ext uri="{FF2B5EF4-FFF2-40B4-BE49-F238E27FC236}">
+                <a16:creationId xmlns:a16="http://schemas.microsoft.com/office/drawing/2014/main" id="{350939F0-E62E-4063-BF78-80FD7E8E29E3}"/>
+              </a:ext>
+            </a:extLst>
+          </p:cNvPr>
+          <p:cNvSpPr txBox="1">
+            <a:spLocks/>
+          </p:cNvSpPr>
+          <p:nvPr/>
+        </p:nvSpPr>
+        <p:spPr>
+          <a:xfrm>
+            <a:off x="311162" y="878427"/>
+            <a:ext cx="8508999" cy="410369"/>
+          </a:xfrm>
+          <a:prstGeom prst="rect">
+            <a:avLst/>
+          </a:prstGeom>
+          <a:noFill/>
+          <a:ln w="9525">
+            <a:noFill/>
+            <a:miter lim="800000"/>
+            <a:headEnd/>
+            <a:tailEnd/>
+          </a:ln>
+        </p:spPr>
+        <p:txBody>
+          <a:bodyPr vert="horz" wrap="square" lIns="0" tIns="0" rIns="0" bIns="0" numCol="1" anchor="t" anchorCtr="0" compatLnSpc="1">
+            <a:prstTxWarp prst="textNoShape">
+              <a:avLst/>
+            </a:prstTxWarp>
+            <a:noAutofit/>
+          </a:bodyPr>
+          <a:lstStyle>
+            <a:lvl1pPr algn="l" rtl="0" eaLnBrk="0" fontAlgn="base" hangingPunct="0">
+              <a:lnSpc>
+                <a:spcPts val="3200"/>
+              </a:lnSpc>
+              <a:spcBef>
+                <a:spcPct val="0"/>
+              </a:spcBef>
+              <a:spcAft>
+                <a:spcPct val="0"/>
+              </a:spcAft>
+              <a:defRPr lang="de-DE" sz="3000" b="0" kern="1200" noProof="0" dirty="0">
+                <a:solidFill>
+                  <a:schemeClr val="tx1"/>
+                </a:solidFill>
+                <a:latin typeface="+mj-lt"/>
+                <a:ea typeface="+mj-ea"/>
+                <a:cs typeface="+mj-cs"/>
+              </a:defRPr>
+            </a:lvl1pPr>
+            <a:lvl2pPr algn="l" rtl="0" eaLnBrk="0" fontAlgn="base" hangingPunct="0">
+              <a:spcBef>
+                <a:spcPct val="0"/>
+              </a:spcBef>
+              <a:spcAft>
+                <a:spcPct val="0"/>
+              </a:spcAft>
+              <a:defRPr sz="2000" b="1">
+                <a:solidFill>
+                  <a:schemeClr val="tx2"/>
+                </a:solidFill>
+                <a:latin typeface="Arial" charset="0"/>
+                <a:cs typeface="Arial" charset="0"/>
+              </a:defRPr>
+            </a:lvl2pPr>
+            <a:lvl3pPr algn="l" rtl="0" eaLnBrk="0" fontAlgn="base" hangingPunct="0">
+              <a:spcBef>
+                <a:spcPct val="0"/>
+              </a:spcBef>
+              <a:spcAft>
+                <a:spcPct val="0"/>
+              </a:spcAft>
+              <a:defRPr sz="2000" b="1">
+                <a:solidFill>
+                  <a:schemeClr val="tx2"/>
+                </a:solidFill>
+                <a:latin typeface="Arial" charset="0"/>
+                <a:cs typeface="Arial" charset="0"/>
+              </a:defRPr>
+            </a:lvl3pPr>
+            <a:lvl4pPr algn="l" rtl="0" eaLnBrk="0" fontAlgn="base" hangingPunct="0">
+              <a:spcBef>
+                <a:spcPct val="0"/>
+              </a:spcBef>
+              <a:spcAft>
+                <a:spcPct val="0"/>
+              </a:spcAft>
+              <a:defRPr sz="2000" b="1">
+                <a:solidFill>
+                  <a:schemeClr val="tx2"/>
+                </a:solidFill>
+                <a:latin typeface="Arial" charset="0"/>
+                <a:cs typeface="Arial" charset="0"/>
+              </a:defRPr>
+            </a:lvl4pPr>
+            <a:lvl5pPr algn="l" rtl="0" eaLnBrk="0" fontAlgn="base" hangingPunct="0">
+              <a:spcBef>
+                <a:spcPct val="0"/>
+              </a:spcBef>
+              <a:spcAft>
+                <a:spcPct val="0"/>
+              </a:spcAft>
+              <a:defRPr sz="2000" b="1">
+                <a:solidFill>
+                  <a:schemeClr val="tx2"/>
+                </a:solidFill>
+                <a:latin typeface="Arial" charset="0"/>
+                <a:cs typeface="Arial" charset="0"/>
+              </a:defRPr>
+            </a:lvl5pPr>
+            <a:lvl6pPr marL="457200" algn="l" rtl="0" fontAlgn="base">
+              <a:spcBef>
+                <a:spcPct val="0"/>
+              </a:spcBef>
+              <a:spcAft>
+                <a:spcPct val="0"/>
+              </a:spcAft>
+              <a:defRPr sz="2000" b="1">
+                <a:solidFill>
+                  <a:schemeClr val="tx2"/>
+                </a:solidFill>
+                <a:latin typeface="Arial" charset="0"/>
+                <a:cs typeface="Arial" charset="0"/>
+              </a:defRPr>
+            </a:lvl6pPr>
+            <a:lvl7pPr marL="914400" algn="l" rtl="0" fontAlgn="base">
+              <a:spcBef>
+                <a:spcPct val="0"/>
+              </a:spcBef>
+              <a:spcAft>
+                <a:spcPct val="0"/>
+              </a:spcAft>
+              <a:defRPr sz="2000" b="1">
+                <a:solidFill>
+                  <a:schemeClr val="tx2"/>
+                </a:solidFill>
+                <a:latin typeface="Arial" charset="0"/>
+                <a:cs typeface="Arial" charset="0"/>
+              </a:defRPr>
+            </a:lvl7pPr>
+            <a:lvl8pPr marL="1371600" algn="l" rtl="0" fontAlgn="base">
+              <a:spcBef>
+                <a:spcPct val="0"/>
+              </a:spcBef>
+              <a:spcAft>
+                <a:spcPct val="0"/>
+              </a:spcAft>
+              <a:defRPr sz="2000" b="1">
+                <a:solidFill>
+                  <a:schemeClr val="tx2"/>
+                </a:solidFill>
+                <a:latin typeface="Arial" charset="0"/>
+                <a:cs typeface="Arial" charset="0"/>
+              </a:defRPr>
+            </a:lvl8pPr>
+            <a:lvl9pPr marL="1828800" algn="l" rtl="0" fontAlgn="base">
+              <a:spcBef>
+                <a:spcPct val="0"/>
+              </a:spcBef>
+              <a:spcAft>
+                <a:spcPct val="0"/>
+              </a:spcAft>
+              <a:defRPr sz="2000" b="1">
+                <a:solidFill>
+                  <a:schemeClr val="tx2"/>
+                </a:solidFill>
+                <a:latin typeface="Arial" charset="0"/>
+                <a:cs typeface="Arial" charset="0"/>
+              </a:defRPr>
+            </a:lvl9pPr>
+          </a:lstStyle>
+          <a:p>
+            <a:r>
+              <a:rPr lang="en-US" sz="3200" dirty="0"/>
+              <a:t> </a:t>
+            </a:r>
+            <a:r>
+              <a:rPr lang="en-US" sz="3200" dirty="0" err="1">
+                <a:solidFill>
+                  <a:schemeClr val="bg2">
+                    <a:lumMod val="75000"/>
+                  </a:schemeClr>
+                </a:solidFill>
+              </a:rPr>
+              <a:t>Performanzanalyse</a:t>
+            </a:r>
+            <a:r>
+              <a:rPr lang="en-US" sz="3200" dirty="0">
+                <a:solidFill>
+                  <a:schemeClr val="bg2">
+                    <a:lumMod val="75000"/>
+                  </a:schemeClr>
+                </a:solidFill>
+              </a:rPr>
+              <a:t>: </a:t>
+            </a:r>
+            <a:r>
+              <a:rPr lang="en-US" sz="3200" dirty="0">
+                <a:solidFill>
+                  <a:srgbClr val="005293"/>
+                </a:solidFill>
+              </a:rPr>
+              <a:t>Grad 6 bis 8</a:t>
+            </a:r>
+            <a:endParaRPr lang="en-US" sz="3200" dirty="0"/>
+          </a:p>
+        </p:txBody>
+      </p:sp>
+      <p:pic>
+        <p:nvPicPr>
+          <p:cNvPr id="5" name="Picture 4" descr="Chart, bar chart&#10;&#10;Description automatically generated">
+            <a:extLst>
+              <a:ext uri="{FF2B5EF4-FFF2-40B4-BE49-F238E27FC236}">
+                <a16:creationId xmlns:a16="http://schemas.microsoft.com/office/drawing/2014/main" id="{710F71BB-1104-447C-8A3F-06EF3369E532}"/>
+              </a:ext>
+            </a:extLst>
+          </p:cNvPr>
+          <p:cNvPicPr>
+            <a:picLocks noChangeAspect="1"/>
+          </p:cNvPicPr>
+          <p:nvPr/>
+        </p:nvPicPr>
+        <p:blipFill rotWithShape="1">
+          <a:blip r:embed="rId2"/>
+          <a:srcRect t="-167" b="94092"/>
+          <a:stretch/>
+        </p:blipFill>
+        <p:spPr>
+          <a:xfrm>
+            <a:off x="319090" y="1501119"/>
+            <a:ext cx="8508999" cy="487185"/>
+          </a:xfrm>
+          <a:prstGeom prst="rect">
+            <a:avLst/>
+          </a:prstGeom>
+          <a:noFill/>
+          <a:ln w="9525">
+            <a:noFill/>
+            <a:miter lim="800000"/>
+            <a:headEnd/>
+            <a:tailEnd/>
+          </a:ln>
+        </p:spPr>
+      </p:pic>
+    </p:spTree>
+    <p:extLst>
+      <p:ext uri="{BB962C8B-B14F-4D97-AF65-F5344CB8AC3E}">
+        <p14:creationId xmlns:p14="http://schemas.microsoft.com/office/powerpoint/2010/main" val="2898193272"/>
+      </p:ext>
+    </p:extLst>
+  </p:cSld>
+  <p:clrMapOvr>
+    <a:masterClrMapping/>
+  </p:clrMapOvr>
+  <mc:AlternateContent xmlns:mc="http://schemas.openxmlformats.org/markup-compatibility/2006" xmlns:p14="http://schemas.microsoft.com/office/powerpoint/2010/main">
+    <mc:Choice Requires="p14">
+      <p:transition spd="med" p14:dur="700" advTm="29363">
+        <p:fade/>
+      </p:transition>
+    </mc:Choice>
+    <mc:Fallback xmlns="">
+      <p:transition spd="med" advTm="29363">
+        <p:fade/>
+      </p:transition>
+    </mc:Fallback>
+  </mc:AlternateContent>
+</p:sld>
+</file>
+
+<file path=ppt/slides/slide13.xml><?xml version="1.0" encoding="utf-8"?>
+<p:sld xmlns:a="http://schemas.openxmlformats.org/drawingml/2006/main" xmlns:r="http://schemas.openxmlformats.org/officeDocument/2006/relationships" xmlns:p="http://schemas.openxmlformats.org/presentationml/2006/main">
+  <p:cSld>
+    <p:spTree>
+      <p:nvGrpSpPr>
+        <p:cNvPr id="1" name=""/>
+        <p:cNvGrpSpPr/>
+        <p:nvPr/>
+      </p:nvGrpSpPr>
+      <p:grpSpPr>
+        <a:xfrm>
+          <a:off x="0" y="0"/>
+          <a:ext cx="0" cy="0"/>
+          <a:chOff x="0" y="0"/>
+          <a:chExt cx="0" cy="0"/>
+        </a:xfrm>
+      </p:grpSpPr>
       <p:sp>
         <p:nvSpPr>
           <p:cNvPr id="4" name="Foliennummernplatzhalter 3"/>
@@ -9372,7 +10491,7 @@
                   <a:spcPts val="600"/>
                 </a:spcAft>
               </a:pPr>
-              <a:t>10</a:t>
+              <a:t>13</a:t>
             </a:fld>
             <a:endParaRPr lang="de-DE" dirty="0"/>
           </a:p>
@@ -9413,26 +10532,6 @@
                 </a:solidFill>
               </a:rPr>
               <a:t>Fazit</a:t>
-            </a:r>
-            <a:r>
-              <a:rPr lang="en-US" sz="3200" dirty="0">
-                <a:solidFill>
-                  <a:schemeClr val="bg2">
-                    <a:lumMod val="75000"/>
-                  </a:schemeClr>
-                </a:solidFill>
-              </a:rPr>
-              <a:t>: </a:t>
-            </a:r>
-            <a:r>
-              <a:rPr lang="en-US" sz="3200" dirty="0" err="1">
-                <a:solidFill>
-                  <a:schemeClr val="bg2">
-                    <a:lumMod val="75000"/>
-                  </a:schemeClr>
-                </a:solidFill>
-              </a:rPr>
-              <a:t>Verbesserungsmöglichkeiten</a:t>
             </a:r>
             <a:endParaRPr lang="de-DE" sz="3200" dirty="0"/>
           </a:p>
@@ -9641,27 +10740,18 @@
             </a:lvl9pPr>
           </a:lstStyle>
           <a:p>
-            <a:pPr>
-              <a:spcAft>
-                <a:spcPts val="600"/>
-              </a:spcAft>
-            </a:pPr>
-            <a:r>
-              <a:rPr lang="en-GB"/>
-              <a:t>•</a:t>
-            </a:r>
-          </a:p>
-          <a:p>
-            <a:pPr marL="457200" indent="-457200">
+            <a:pPr marL="285750" indent="-285750">
               <a:spcAft>
                 <a:spcPts val="600"/>
               </a:spcAft>
               <a:buFont typeface="Courier New" panose="02070309020205020404" pitchFamily="49" charset="0"/>
               <a:buChar char="o"/>
             </a:pPr>
-            <a:endParaRPr lang="en-GB">
+            <a:endParaRPr lang="en-US" sz="2400" dirty="0">
               <a:solidFill>
-                <a:srgbClr val="FF0000"/>
+                <a:schemeClr val="bg2">
+                  <a:lumMod val="75000"/>
+                </a:schemeClr>
               </a:solidFill>
             </a:endParaRPr>
           </a:p>
@@ -9673,18 +10763,131 @@
               <a:buFont typeface="Courier New" panose="02070309020205020404" pitchFamily="49" charset="0"/>
               <a:buChar char="o"/>
             </a:pPr>
-            <a:endParaRPr lang="en-US">
+            <a:r>
+              <a:rPr lang="de-DE" sz="2400" dirty="0">
+                <a:solidFill>
+                  <a:schemeClr val="bg2">
+                    <a:lumMod val="75000"/>
+                  </a:schemeClr>
+                </a:solidFill>
+              </a:rPr>
+              <a:t>Verbesserungsmöglichkeiten</a:t>
+            </a:r>
+            <a:r>
+              <a:rPr lang="en-US" sz="2400" dirty="0">
+                <a:solidFill>
+                  <a:schemeClr val="bg2">
+                    <a:lumMod val="75000"/>
+                  </a:schemeClr>
+                </a:solidFill>
+              </a:rPr>
+              <a:t>:</a:t>
+            </a:r>
+            <a:endParaRPr lang="de-DE" sz="2400" dirty="0">
               <a:solidFill>
-                <a:srgbClr val="FF0000"/>
+                <a:srgbClr val="005293"/>
               </a:solidFill>
             </a:endParaRPr>
+          </a:p>
+          <a:p>
+            <a:pPr marL="285750" indent="-285750">
+              <a:spcAft>
+                <a:spcPts val="600"/>
+              </a:spcAft>
+              <a:buFont typeface="Wingdings" panose="05000000000000000000" pitchFamily="2" charset="2"/>
+              <a:buChar char="ü"/>
+            </a:pPr>
+            <a:endParaRPr lang="de-DE" dirty="0">
+              <a:solidFill>
+                <a:srgbClr val="005293"/>
+              </a:solidFill>
+            </a:endParaRPr>
+          </a:p>
+          <a:p>
+            <a:pPr marL="285750" indent="-285750">
+              <a:spcAft>
+                <a:spcPts val="600"/>
+              </a:spcAft>
+              <a:buFont typeface="Wingdings" panose="05000000000000000000" pitchFamily="2" charset="2"/>
+              <a:buChar char="ü"/>
+            </a:pPr>
+            <a:r>
+              <a:rPr lang="de-DE" sz="1800" dirty="0"/>
+              <a:t>Speicheroptimierungen</a:t>
+            </a:r>
+          </a:p>
+          <a:p>
+            <a:pPr marL="285750" indent="-285750">
+              <a:spcAft>
+                <a:spcPts val="600"/>
+              </a:spcAft>
+              <a:buFont typeface="Wingdings" panose="05000000000000000000" pitchFamily="2" charset="2"/>
+              <a:buChar char="ü"/>
+            </a:pPr>
+            <a:endParaRPr lang="de-DE" sz="1800" dirty="0"/>
+          </a:p>
+          <a:p>
+            <a:pPr marL="285750" indent="-285750">
+              <a:spcAft>
+                <a:spcPts val="600"/>
+              </a:spcAft>
+              <a:buFont typeface="Wingdings" panose="05000000000000000000" pitchFamily="2" charset="2"/>
+              <a:buChar char="ü"/>
+            </a:pPr>
+            <a:r>
+              <a:rPr lang="de-DE" sz="1800" dirty="0"/>
+              <a:t>Multithreading</a:t>
+            </a:r>
+          </a:p>
+          <a:p>
+            <a:pPr marL="285750" indent="-285750">
+              <a:spcAft>
+                <a:spcPts val="600"/>
+              </a:spcAft>
+              <a:buFont typeface="Wingdings" panose="05000000000000000000" pitchFamily="2" charset="2"/>
+              <a:buChar char="ü"/>
+            </a:pPr>
+            <a:endParaRPr lang="de-DE" sz="1800" dirty="0"/>
+          </a:p>
+          <a:p>
+            <a:pPr marL="285750" indent="-285750">
+              <a:spcAft>
+                <a:spcPts val="600"/>
+              </a:spcAft>
+              <a:buFont typeface="Wingdings" panose="05000000000000000000" pitchFamily="2" charset="2"/>
+              <a:buChar char="ü"/>
+            </a:pPr>
+            <a:r>
+              <a:rPr lang="de-DE" sz="1800" dirty="0"/>
+              <a:t>16-bit Alignment SIMD-Instruktionen </a:t>
+            </a:r>
+          </a:p>
+          <a:p>
+            <a:pPr marL="285750" indent="-285750">
+              <a:spcAft>
+                <a:spcPts val="600"/>
+              </a:spcAft>
+              <a:buFont typeface="Wingdings" panose="05000000000000000000" pitchFamily="2" charset="2"/>
+              <a:buChar char="ü"/>
+            </a:pPr>
+            <a:endParaRPr lang="de-DE" sz="1800" dirty="0"/>
+          </a:p>
+          <a:p>
+            <a:pPr marL="285750" indent="-285750">
+              <a:spcAft>
+                <a:spcPts val="600"/>
+              </a:spcAft>
+              <a:buFont typeface="Wingdings" panose="05000000000000000000" pitchFamily="2" charset="2"/>
+              <a:buChar char="ü"/>
+            </a:pPr>
+            <a:endParaRPr lang="de-DE" dirty="0"/>
           </a:p>
         </p:txBody>
       </p:sp>
     </p:spTree>
     <p:extLst>
       <p:ext uri="{BB962C8B-B14F-4D97-AF65-F5344CB8AC3E}">
-        <p14:creationId xmlns:p14="http://schemas.microsoft.com/office/powerpoint/2010/main" val="2187016146"/>
+        <p14:creationId xmlns:p14="http://schemas.microsoft.com/office/powerpoint/2010/main" val="104453609"/>
       </p:ext>
     </p:extLst>
   </p:cSld>
@@ -9706,7 +10909,7 @@
 </p:sld>
 </file>
 
-<file path=ppt/slides/slide11.xml><?xml version="1.0" encoding="utf-8"?>
+<file path=ppt/slides/slide14.xml><?xml version="1.0" encoding="utf-8"?>
 <p:sld xmlns:a="http://schemas.openxmlformats.org/drawingml/2006/main" xmlns:r="http://schemas.openxmlformats.org/officeDocument/2006/relationships" xmlns:p="http://schemas.openxmlformats.org/presentationml/2006/main">
   <p:cSld>
     <p:spTree>
@@ -9807,7 +11010,7 @@
             <a:fld id="{CE58CB1E-F828-4F11-99E0-327109AF9DA4}" type="slidenum">
               <a:rPr lang="de-DE" smtClean="0"/>
               <a:pPr/>
-              <a:t>11</a:t>
+              <a:t>14</a:t>
             </a:fld>
             <a:endParaRPr lang="de-DE" dirty="0"/>
           </a:p>
@@ -12680,10 +13883,6 @@
               </a:rPr>
               <a:t>Performanzanalyse</a:t>
             </a:r>
-            <a:r>
-              <a:rPr lang="en-US" sz="3200" dirty="0"/>
-              <a:t>:</a:t>
-            </a:r>
             <a:endParaRPr lang="de-DE" sz="3200" dirty="0"/>
           </a:p>
         </p:txBody>
@@ -12891,25 +14090,162 @@
             </a:lvl9pPr>
           </a:lstStyle>
           <a:p>
-            <a:pPr>
-              <a:spcAft>
-                <a:spcPts val="600"/>
-              </a:spcAft>
-            </a:pPr>
-            <a:r>
-              <a:rPr lang="en-GB"/>
-              <a:t>•</a:t>
-            </a:r>
-          </a:p>
-          <a:p>
-            <a:pPr marL="457200" indent="-457200">
+            <a:pPr marL="285750" indent="-285750">
               <a:spcAft>
                 <a:spcPts val="600"/>
               </a:spcAft>
               <a:buFont typeface="Courier New" panose="02070309020205020404" pitchFamily="49" charset="0"/>
               <a:buChar char="o"/>
             </a:pPr>
-            <a:endParaRPr lang="en-GB">
+            <a:r>
+              <a:rPr lang="en-GB" sz="2400" dirty="0">
+                <a:solidFill>
+                  <a:srgbClr val="005293"/>
+                </a:solidFill>
+              </a:rPr>
+              <a:t>Environment:</a:t>
+            </a:r>
+          </a:p>
+          <a:p>
+            <a:pPr marL="285750" indent="-285750">
+              <a:spcAft>
+                <a:spcPts val="600"/>
+              </a:spcAft>
+              <a:buFont typeface="Courier New" panose="02070309020205020404" pitchFamily="49" charset="0"/>
+              <a:buChar char="o"/>
+            </a:pPr>
+            <a:endParaRPr lang="en-GB" sz="2400" dirty="0">
+              <a:solidFill>
+                <a:srgbClr val="005293"/>
+              </a:solidFill>
+            </a:endParaRPr>
+          </a:p>
+          <a:p>
+            <a:pPr marL="285750" indent="-285750">
+              <a:spcAft>
+                <a:spcPts val="600"/>
+              </a:spcAft>
+              <a:buFont typeface="Wingdings" panose="05000000000000000000" pitchFamily="2" charset="2"/>
+              <a:buChar char="Ø"/>
+            </a:pPr>
+            <a:r>
+              <a:rPr lang="en-GB" sz="1800" dirty="0"/>
+              <a:t> I</a:t>
+            </a:r>
+            <a:r>
+              <a:rPr lang="en-US" sz="1800" dirty="0" err="1"/>
+              <a:t>ntel</a:t>
+            </a:r>
+            <a:r>
+              <a:rPr lang="en-US" sz="1800" dirty="0"/>
+              <a:t> Core i7-7700K (4.20GHz)</a:t>
+            </a:r>
+          </a:p>
+          <a:p>
+            <a:pPr marL="285750" indent="-285750">
+              <a:spcAft>
+                <a:spcPts val="600"/>
+              </a:spcAft>
+              <a:buFont typeface="Wingdings" panose="05000000000000000000" pitchFamily="2" charset="2"/>
+              <a:buChar char="Ø"/>
+            </a:pPr>
+            <a:r>
+              <a:rPr lang="en-US" sz="1800" dirty="0"/>
+              <a:t>16GB</a:t>
+            </a:r>
+            <a:endParaRPr lang="de-DE" sz="1800" dirty="0"/>
+          </a:p>
+          <a:p>
+            <a:pPr marL="285750" indent="-285750">
+              <a:spcAft>
+                <a:spcPts val="600"/>
+              </a:spcAft>
+              <a:buFont typeface="Wingdings" panose="05000000000000000000" pitchFamily="2" charset="2"/>
+              <a:buChar char="Ø"/>
+            </a:pPr>
+            <a:r>
+              <a:rPr lang="en-US" sz="1800" dirty="0"/>
+              <a:t>Linux Mint 20 64-bit (Kernel 5.4.0-26-generic)</a:t>
+            </a:r>
+          </a:p>
+          <a:p>
+            <a:pPr marL="342900" indent="-342900">
+              <a:spcAft>
+                <a:spcPts val="600"/>
+              </a:spcAft>
+              <a:buFont typeface="Wingdings" panose="05000000000000000000" pitchFamily="2" charset="2"/>
+              <a:buChar char="Ø"/>
+            </a:pPr>
+            <a:endParaRPr lang="en-GB" sz="2400" dirty="0">
+              <a:solidFill>
+                <a:srgbClr val="005293"/>
+              </a:solidFill>
+            </a:endParaRPr>
+          </a:p>
+          <a:p>
+            <a:pPr marL="285750" indent="-285750">
+              <a:spcAft>
+                <a:spcPts val="600"/>
+              </a:spcAft>
+              <a:buFont typeface="Courier New" panose="02070309020205020404" pitchFamily="49" charset="0"/>
+              <a:buChar char="o"/>
+            </a:pPr>
+            <a:r>
+              <a:rPr lang="en-GB" sz="2400" dirty="0">
+                <a:solidFill>
+                  <a:srgbClr val="005293"/>
+                </a:solidFill>
+              </a:rPr>
+              <a:t>Compiler:</a:t>
+            </a:r>
+          </a:p>
+          <a:p>
+            <a:pPr marL="285750" indent="-285750">
+              <a:spcAft>
+                <a:spcPts val="600"/>
+              </a:spcAft>
+              <a:buFont typeface="Courier New" panose="02070309020205020404" pitchFamily="49" charset="0"/>
+              <a:buChar char="o"/>
+            </a:pPr>
+            <a:endParaRPr lang="en-GB" sz="2400" dirty="0">
+              <a:solidFill>
+                <a:srgbClr val="005293"/>
+              </a:solidFill>
+            </a:endParaRPr>
+          </a:p>
+          <a:p>
+            <a:pPr marL="342900" indent="-342900">
+              <a:spcAft>
+                <a:spcPts val="600"/>
+              </a:spcAft>
+              <a:buFont typeface="Wingdings" panose="05000000000000000000" pitchFamily="2" charset="2"/>
+              <a:buChar char="Ø"/>
+            </a:pPr>
+            <a:r>
+              <a:rPr lang="de-DE" dirty="0"/>
+              <a:t>GCC 9.3.0 mit Option -03</a:t>
+            </a:r>
+            <a:endParaRPr lang="en-GB" dirty="0"/>
+          </a:p>
+          <a:p>
+            <a:pPr marL="285750" indent="-285750">
+              <a:spcAft>
+                <a:spcPts val="600"/>
+              </a:spcAft>
+              <a:buFont typeface="Wingdings" panose="05000000000000000000" pitchFamily="2" charset="2"/>
+              <a:buChar char="Ø"/>
+            </a:pPr>
+            <a:endParaRPr lang="en-GB" dirty="0"/>
+          </a:p>
+          <a:p>
+            <a:pPr marL="457200" indent="-457200">
+              <a:spcAft>
+                <a:spcPts val="600"/>
+              </a:spcAft>
+              <a:buFont typeface="Courier New" panose="02070309020205020404" pitchFamily="49" charset="0"/>
+              <a:buChar char="o"/>
+            </a:pPr>
+            <a:endParaRPr lang="en-GB" dirty="0">
               <a:solidFill>
                 <a:srgbClr val="FF0000"/>
               </a:solidFill>
@@ -12923,7 +14259,7 @@
               <a:buFont typeface="Courier New" panose="02070309020205020404" pitchFamily="49" charset="0"/>
               <a:buChar char="o"/>
             </a:pPr>
-            <a:endParaRPr lang="en-US">
+            <a:endParaRPr lang="en-US" dirty="0">
               <a:solidFill>
                 <a:srgbClr val="FF0000"/>
               </a:solidFill>
@@ -12931,40 +14267,10 @@
           </a:p>
         </p:txBody>
       </p:sp>
-      <p:pic>
-        <p:nvPicPr>
-          <p:cNvPr id="5" name="Picture 4" descr="Table&#10;&#10;Description automatically generated">
-            <a:extLst>
-              <a:ext uri="{FF2B5EF4-FFF2-40B4-BE49-F238E27FC236}">
-                <a16:creationId xmlns:a16="http://schemas.microsoft.com/office/drawing/2014/main" id="{65799A29-2797-4FED-B8F4-BE803AD3B5C6}"/>
-              </a:ext>
-            </a:extLst>
-          </p:cNvPr>
-          <p:cNvPicPr>
-            <a:picLocks noChangeAspect="1"/>
-          </p:cNvPicPr>
-          <p:nvPr/>
-        </p:nvPicPr>
-        <p:blipFill>
-          <a:blip r:embed="rId2"/>
-          <a:stretch>
-            <a:fillRect/>
-          </a:stretch>
-        </p:blipFill>
-        <p:spPr>
-          <a:xfrm>
-            <a:off x="613810" y="2176287"/>
-            <a:ext cx="7916380" cy="2505425"/>
-          </a:xfrm>
-          <a:prstGeom prst="rect">
-            <a:avLst/>
-          </a:prstGeom>
-        </p:spPr>
-      </p:pic>
     </p:spTree>
     <p:extLst>
       <p:ext uri="{BB962C8B-B14F-4D97-AF65-F5344CB8AC3E}">
-        <p14:creationId xmlns:p14="http://schemas.microsoft.com/office/powerpoint/2010/main" val="444073437"/>
+        <p14:creationId xmlns:p14="http://schemas.microsoft.com/office/powerpoint/2010/main" val="2239404565"/>
       </p:ext>
     </p:extLst>
   </p:cSld>
@@ -13010,7 +14316,7 @@
             <a:spLocks noGrp="1"/>
           </p:cNvSpPr>
           <p:nvPr>
-            <p:ph type="sldNum" sz="quarter" idx="16"/>
+            <p:ph type="sldNum" sz="quarter" idx="11"/>
           </p:nvPr>
         </p:nvSpPr>
         <p:spPr>
@@ -13039,66 +14345,16 @@
               </a:pPr>
               <a:t>9</a:t>
             </a:fld>
-            <a:endParaRPr lang="de-DE"/>
+            <a:endParaRPr lang="de-DE" dirty="0"/>
           </a:p>
         </p:txBody>
       </p:sp>
       <p:sp>
         <p:nvSpPr>
-          <p:cNvPr id="3" name="Titel 2"/>
-          <p:cNvSpPr>
-            <a:spLocks noGrp="1"/>
-          </p:cNvSpPr>
-          <p:nvPr>
-            <p:ph type="title"/>
-          </p:nvPr>
-        </p:nvSpPr>
-        <p:spPr>
-          <a:xfrm>
-            <a:off x="311162" y="878427"/>
-            <a:ext cx="8508999" cy="410369"/>
-          </a:xfrm>
-        </p:spPr>
-        <p:txBody>
-          <a:bodyPr wrap="square" anchor="t">
-            <a:noAutofit/>
-          </a:bodyPr>
-          <a:lstStyle/>
-          <a:p>
-            <a:r>
-              <a:rPr lang="en-US" sz="3200" dirty="0"/>
-              <a:t> </a:t>
-            </a:r>
-            <a:r>
-              <a:rPr lang="en-US" sz="3200" dirty="0" err="1">
-                <a:solidFill>
-                  <a:schemeClr val="bg2">
-                    <a:lumMod val="75000"/>
-                  </a:schemeClr>
-                </a:solidFill>
-              </a:rPr>
-              <a:t>Performanzanalyse</a:t>
-            </a:r>
-            <a:r>
-              <a:rPr lang="en-US" sz="3200" dirty="0">
-                <a:solidFill>
-                  <a:schemeClr val="bg2">
-                    <a:lumMod val="75000"/>
-                  </a:schemeClr>
-                </a:solidFill>
-              </a:rPr>
-              <a:t>: </a:t>
-            </a:r>
-            <a:endParaRPr lang="de-DE" sz="3200" dirty="0"/>
-          </a:p>
-        </p:txBody>
-      </p:sp>
-      <p:sp>
-        <p:nvSpPr>
-          <p:cNvPr id="12" name="Content Placeholder 13">
+          <p:cNvPr id="7" name="Titel 2">
             <a:extLst>
               <a:ext uri="{FF2B5EF4-FFF2-40B4-BE49-F238E27FC236}">
-                <a16:creationId xmlns:a16="http://schemas.microsoft.com/office/drawing/2014/main" id="{BD0F1FD7-B55C-4C88-940C-DE7178B6A3B2}"/>
+                <a16:creationId xmlns:a16="http://schemas.microsoft.com/office/drawing/2014/main" id="{B24129D1-E71B-47E0-9724-460D627BC21D}"/>
               </a:ext>
             </a:extLst>
           </p:cNvPr>
@@ -13109,8 +14365,8 @@
         </p:nvSpPr>
         <p:spPr>
           <a:xfrm>
-            <a:off x="5607513" y="1816689"/>
-            <a:ext cx="3161878" cy="4632879"/>
+            <a:off x="311162" y="878427"/>
+            <a:ext cx="8508999" cy="410369"/>
           </a:xfrm>
           <a:prstGeom prst="rect">
             <a:avLst/>
@@ -13128,12 +14384,12 @@
             <a:prstTxWarp prst="textNoShape">
               <a:avLst/>
             </a:prstTxWarp>
-            <a:normAutofit/>
+            <a:noAutofit/>
           </a:bodyPr>
           <a:lstStyle>
             <a:lvl1pPr algn="l" rtl="0" eaLnBrk="0" fontAlgn="base" hangingPunct="0">
               <a:lnSpc>
-                <a:spcPct val="114000"/>
+                <a:spcPts val="3200"/>
               </a:lnSpc>
               <a:spcBef>
                 <a:spcPct val="0"/>
@@ -13141,239 +14397,187 @@
               <a:spcAft>
                 <a:spcPct val="0"/>
               </a:spcAft>
-              <a:defRPr lang="de-DE" sz="1600" kern="1200" noProof="0" dirty="0" smtClean="0">
+              <a:defRPr lang="de-DE" sz="3000" b="0" kern="1200" noProof="0" dirty="0">
                 <a:solidFill>
                   <a:schemeClr val="tx1"/>
                 </a:solidFill>
-                <a:latin typeface="+mn-lt"/>
-                <a:ea typeface="+mn-ea"/>
-                <a:cs typeface="+mn-cs"/>
+                <a:latin typeface="+mj-lt"/>
+                <a:ea typeface="+mj-ea"/>
+                <a:cs typeface="+mj-cs"/>
               </a:defRPr>
             </a:lvl1pPr>
-            <a:lvl2pPr marL="176213" indent="-176213" algn="l" rtl="0" eaLnBrk="0" fontAlgn="base" hangingPunct="0">
-              <a:lnSpc>
-                <a:spcPct val="114000"/>
-              </a:lnSpc>
+            <a:lvl2pPr algn="l" rtl="0" eaLnBrk="0" fontAlgn="base" hangingPunct="0">
               <a:spcBef>
                 <a:spcPct val="0"/>
               </a:spcBef>
               <a:spcAft>
                 <a:spcPct val="0"/>
               </a:spcAft>
-              <a:buFont typeface="Arial" charset="0"/>
-              <a:buChar char="•"/>
-              <a:defRPr lang="de-DE" sz="1600" kern="1200" noProof="0" dirty="0" smtClean="0">
+              <a:defRPr sz="2000" b="1">
                 <a:solidFill>
-                  <a:schemeClr val="tx1"/>
+                  <a:schemeClr val="tx2"/>
                 </a:solidFill>
-                <a:latin typeface="+mn-lt"/>
-                <a:ea typeface="+mn-ea"/>
-                <a:cs typeface="+mn-cs"/>
+                <a:latin typeface="Arial" charset="0"/>
+                <a:cs typeface="Arial" charset="0"/>
               </a:defRPr>
             </a:lvl2pPr>
-            <a:lvl3pPr marL="360363" indent="-184150" algn="l" rtl="0" eaLnBrk="0" fontAlgn="base" hangingPunct="0">
-              <a:lnSpc>
-                <a:spcPct val="125000"/>
-              </a:lnSpc>
+            <a:lvl3pPr algn="l" rtl="0" eaLnBrk="0" fontAlgn="base" hangingPunct="0">
               <a:spcBef>
                 <a:spcPct val="0"/>
               </a:spcBef>
               <a:spcAft>
                 <a:spcPct val="0"/>
               </a:spcAft>
-              <a:buFont typeface="Symbol" pitchFamily="18" charset="2"/>
-              <a:buChar char="-"/>
-              <a:defRPr sz="1600" kern="1200">
+              <a:defRPr sz="2000" b="1">
                 <a:solidFill>
-                  <a:schemeClr val="tx1"/>
+                  <a:schemeClr val="tx2"/>
                 </a:solidFill>
-                <a:latin typeface="+mn-lt"/>
-                <a:ea typeface="+mn-ea"/>
-                <a:cs typeface="+mn-cs"/>
+                <a:latin typeface="Arial" charset="0"/>
+                <a:cs typeface="Arial" charset="0"/>
               </a:defRPr>
             </a:lvl3pPr>
-            <a:lvl4pPr marL="538163" indent="-177800" algn="l" rtl="0" eaLnBrk="0" fontAlgn="base" hangingPunct="0">
-              <a:lnSpc>
-                <a:spcPct val="125000"/>
-              </a:lnSpc>
+            <a:lvl4pPr algn="l" rtl="0" eaLnBrk="0" fontAlgn="base" hangingPunct="0">
               <a:spcBef>
                 <a:spcPct val="0"/>
               </a:spcBef>
               <a:spcAft>
                 <a:spcPct val="0"/>
               </a:spcAft>
-              <a:buFont typeface="Symbol" pitchFamily="18" charset="2"/>
-              <a:buChar char="-"/>
-              <a:defRPr sz="1400" kern="1200">
+              <a:defRPr sz="2000" b="1">
                 <a:solidFill>
-                  <a:schemeClr val="tx1"/>
+                  <a:schemeClr val="tx2"/>
                 </a:solidFill>
-                <a:latin typeface="+mn-lt"/>
-                <a:ea typeface="+mn-ea"/>
-                <a:cs typeface="+mn-cs"/>
+                <a:latin typeface="Arial" charset="0"/>
+                <a:cs typeface="Arial" charset="0"/>
               </a:defRPr>
             </a:lvl4pPr>
-            <a:lvl5pPr marL="714375" indent="-176213" algn="l" rtl="0" eaLnBrk="0" fontAlgn="base" hangingPunct="0">
-              <a:lnSpc>
-                <a:spcPct val="125000"/>
-              </a:lnSpc>
+            <a:lvl5pPr algn="l" rtl="0" eaLnBrk="0" fontAlgn="base" hangingPunct="0">
               <a:spcBef>
                 <a:spcPct val="0"/>
               </a:spcBef>
               <a:spcAft>
                 <a:spcPct val="0"/>
               </a:spcAft>
-              <a:buFont typeface="Symbol" pitchFamily="18" charset="2"/>
-              <a:buChar char="-"/>
-              <a:defRPr sz="1400" kern="1200">
+              <a:defRPr sz="2000" b="1">
                 <a:solidFill>
-                  <a:schemeClr val="tx1"/>
+                  <a:schemeClr val="tx2"/>
                 </a:solidFill>
-                <a:latin typeface="+mn-lt"/>
-                <a:ea typeface="+mn-ea"/>
-                <a:cs typeface="+mn-cs"/>
+                <a:latin typeface="Arial" charset="0"/>
+                <a:cs typeface="Arial" charset="0"/>
               </a:defRPr>
             </a:lvl5pPr>
-            <a:lvl6pPr marL="2514600" indent="-228600" algn="l" defTabSz="914400" rtl="0" eaLnBrk="1" latinLnBrk="0" hangingPunct="1">
+            <a:lvl6pPr marL="457200" algn="l" rtl="0" fontAlgn="base">
               <a:spcBef>
-                <a:spcPct val="20000"/>
+                <a:spcPct val="0"/>
               </a:spcBef>
-              <a:buFont typeface="Arial" pitchFamily="34" charset="0"/>
-              <a:buChar char="•"/>
-              <a:defRPr sz="2000" kern="1200">
+              <a:spcAft>
+                <a:spcPct val="0"/>
+              </a:spcAft>
+              <a:defRPr sz="2000" b="1">
                 <a:solidFill>
-                  <a:schemeClr val="tx1"/>
+                  <a:schemeClr val="tx2"/>
                 </a:solidFill>
-                <a:latin typeface="+mn-lt"/>
-                <a:ea typeface="+mn-ea"/>
-                <a:cs typeface="+mn-cs"/>
+                <a:latin typeface="Arial" charset="0"/>
+                <a:cs typeface="Arial" charset="0"/>
               </a:defRPr>
             </a:lvl6pPr>
-            <a:lvl7pPr marL="2971800" indent="-228600" algn="l" defTabSz="914400" rtl="0" eaLnBrk="1" latinLnBrk="0" hangingPunct="1">
+            <a:lvl7pPr marL="914400" algn="l" rtl="0" fontAlgn="base">
               <a:spcBef>
-                <a:spcPct val="20000"/>
+                <a:spcPct val="0"/>
               </a:spcBef>
-              <a:buFont typeface="Arial" pitchFamily="34" charset="0"/>
-              <a:buChar char="•"/>
-              <a:defRPr sz="2000" kern="1200">
+              <a:spcAft>
+                <a:spcPct val="0"/>
+              </a:spcAft>
+              <a:defRPr sz="2000" b="1">
                 <a:solidFill>
-                  <a:schemeClr val="tx1"/>
+                  <a:schemeClr val="tx2"/>
                 </a:solidFill>
-                <a:latin typeface="+mn-lt"/>
-                <a:ea typeface="+mn-ea"/>
-                <a:cs typeface="+mn-cs"/>
+                <a:latin typeface="Arial" charset="0"/>
+                <a:cs typeface="Arial" charset="0"/>
               </a:defRPr>
             </a:lvl7pPr>
-            <a:lvl8pPr marL="3429000" indent="-228600" algn="l" defTabSz="914400" rtl="0" eaLnBrk="1" latinLnBrk="0" hangingPunct="1">
+            <a:lvl8pPr marL="1371600" algn="l" rtl="0" fontAlgn="base">
               <a:spcBef>
-                <a:spcPct val="20000"/>
+                <a:spcPct val="0"/>
               </a:spcBef>
-              <a:buFont typeface="Arial" pitchFamily="34" charset="0"/>
-              <a:buChar char="•"/>
-              <a:defRPr sz="2000" kern="1200">
+              <a:spcAft>
+                <a:spcPct val="0"/>
+              </a:spcAft>
+              <a:defRPr sz="2000" b="1">
                 <a:solidFill>
-                  <a:schemeClr val="tx1"/>
+                  <a:schemeClr val="tx2"/>
                 </a:solidFill>
-                <a:latin typeface="+mn-lt"/>
-                <a:ea typeface="+mn-ea"/>
-                <a:cs typeface="+mn-cs"/>
+                <a:latin typeface="Arial" charset="0"/>
+                <a:cs typeface="Arial" charset="0"/>
               </a:defRPr>
             </a:lvl8pPr>
-            <a:lvl9pPr marL="3886200" indent="-228600" algn="l" defTabSz="914400" rtl="0" eaLnBrk="1" latinLnBrk="0" hangingPunct="1">
+            <a:lvl9pPr marL="1828800" algn="l" rtl="0" fontAlgn="base">
               <a:spcBef>
-                <a:spcPct val="20000"/>
+                <a:spcPct val="0"/>
               </a:spcBef>
-              <a:buFont typeface="Arial" pitchFamily="34" charset="0"/>
-              <a:buChar char="•"/>
-              <a:defRPr sz="2000" kern="1200">
+              <a:spcAft>
+                <a:spcPct val="0"/>
+              </a:spcAft>
+              <a:defRPr sz="2000" b="1">
                 <a:solidFill>
-                  <a:schemeClr val="tx1"/>
+                  <a:schemeClr val="tx2"/>
                 </a:solidFill>
-                <a:latin typeface="+mn-lt"/>
-                <a:ea typeface="+mn-ea"/>
-                <a:cs typeface="+mn-cs"/>
+                <a:latin typeface="Arial" charset="0"/>
+                <a:cs typeface="Arial" charset="0"/>
               </a:defRPr>
             </a:lvl9pPr>
           </a:lstStyle>
           <a:p>
-            <a:pPr>
-              <a:spcAft>
-                <a:spcPts val="600"/>
-              </a:spcAft>
-            </a:pPr>
-            <a:r>
-              <a:rPr lang="en-GB" dirty="0"/>
-              <a:t>•</a:t>
-            </a:r>
-          </a:p>
-          <a:p>
-            <a:pPr>
-              <a:spcAft>
-                <a:spcPts val="600"/>
-              </a:spcAft>
-            </a:pPr>
-            <a:endParaRPr lang="en-GB" dirty="0"/>
-          </a:p>
-          <a:p>
-            <a:pPr>
-              <a:spcAft>
-                <a:spcPts val="600"/>
-              </a:spcAft>
-            </a:pPr>
-            <a:endParaRPr lang="en-GB" dirty="0"/>
-          </a:p>
-          <a:p>
-            <a:pPr>
-              <a:spcAft>
-                <a:spcPts val="600"/>
-              </a:spcAft>
-            </a:pPr>
-            <a:endParaRPr lang="en-GB" dirty="0"/>
-          </a:p>
-          <a:p>
-            <a:pPr>
-              <a:spcAft>
-                <a:spcPts val="600"/>
-              </a:spcAft>
-            </a:pPr>
-            <a:endParaRPr lang="en-GB" dirty="0"/>
-          </a:p>
-          <a:p>
-            <a:pPr marL="457200" indent="-457200">
-              <a:spcAft>
-                <a:spcPts val="600"/>
-              </a:spcAft>
-              <a:buFont typeface="Courier New" panose="02070309020205020404" pitchFamily="49" charset="0"/>
-              <a:buChar char="o"/>
-            </a:pPr>
-            <a:endParaRPr lang="en-GB" dirty="0">
-              <a:solidFill>
-                <a:srgbClr val="FF0000"/>
-              </a:solidFill>
-            </a:endParaRPr>
-          </a:p>
-          <a:p>
-            <a:pPr marL="285750" indent="-285750">
-              <a:spcAft>
-                <a:spcPts val="600"/>
-              </a:spcAft>
-              <a:buFont typeface="Courier New" panose="02070309020205020404" pitchFamily="49" charset="0"/>
-              <a:buChar char="o"/>
-            </a:pPr>
-            <a:endParaRPr lang="en-US" dirty="0">
-              <a:solidFill>
-                <a:srgbClr val="FF0000"/>
-              </a:solidFill>
-            </a:endParaRPr>
+            <a:r>
+              <a:rPr lang="en-US" sz="3200" dirty="0"/>
+              <a:t> </a:t>
+            </a:r>
+            <a:r>
+              <a:rPr lang="en-US" sz="3200" dirty="0" err="1">
+                <a:solidFill>
+                  <a:schemeClr val="bg2">
+                    <a:lumMod val="75000"/>
+                  </a:schemeClr>
+                </a:solidFill>
+              </a:rPr>
+              <a:t>Performanzanalyse</a:t>
+            </a:r>
+            <a:r>
+              <a:rPr lang="en-US" sz="3200" dirty="0">
+                <a:solidFill>
+                  <a:schemeClr val="bg2">
+                    <a:lumMod val="75000"/>
+                  </a:schemeClr>
+                </a:solidFill>
+              </a:rPr>
+              <a:t>: </a:t>
+            </a:r>
+            <a:r>
+              <a:rPr lang="en-US" sz="3200" dirty="0">
+                <a:solidFill>
+                  <a:srgbClr val="005293"/>
+                </a:solidFill>
+              </a:rPr>
+              <a:t>SIMD-</a:t>
+            </a:r>
+            <a:r>
+              <a:rPr lang="en-US" sz="3200" dirty="0" err="1">
+                <a:solidFill>
+                  <a:srgbClr val="005293"/>
+                </a:solidFill>
+              </a:rPr>
+              <a:t>Instruktionen</a:t>
+            </a:r>
+            <a:endParaRPr lang="en-US" sz="3200" dirty="0"/>
           </a:p>
         </p:txBody>
       </p:sp>
       <p:pic>
         <p:nvPicPr>
-          <p:cNvPr id="5" name="Picture 4" descr="Chart, bar chart&#10;&#10;Description automatically generated">
+          <p:cNvPr id="10" name="Picture 9" descr="Table&#10;&#10;Description automatically generated">
             <a:extLst>
               <a:ext uri="{FF2B5EF4-FFF2-40B4-BE49-F238E27FC236}">
-                <a16:creationId xmlns:a16="http://schemas.microsoft.com/office/drawing/2014/main" id="{547B83D1-95EE-4F7E-8B63-DE0AAF710199}"/>
+                <a16:creationId xmlns:a16="http://schemas.microsoft.com/office/drawing/2014/main" id="{1419B984-9DED-4B28-95AC-4B074D22B4CA}"/>
               </a:ext>
             </a:extLst>
           </p:cNvPr>
@@ -13390,8 +14594,8 @@
         </p:blipFill>
         <p:spPr>
           <a:xfrm>
-            <a:off x="425093" y="1925690"/>
-            <a:ext cx="4963218" cy="3463820"/>
+            <a:off x="442659" y="2398029"/>
+            <a:ext cx="8333530" cy="3118148"/>
           </a:xfrm>
           <a:prstGeom prst="rect">
             <a:avLst/>
@@ -13401,7 +14605,7 @@
     </p:spTree>
     <p:extLst>
       <p:ext uri="{BB962C8B-B14F-4D97-AF65-F5344CB8AC3E}">
-        <p14:creationId xmlns:p14="http://schemas.microsoft.com/office/powerpoint/2010/main" val="288213369"/>
+        <p14:creationId xmlns:p14="http://schemas.microsoft.com/office/powerpoint/2010/main" val="1685893145"/>
       </p:ext>
     </p:extLst>
   </p:cSld>

</xml_diff>

<commit_message>
16GB -> 16GB RAM
</commit_message>
<xml_diff>
--- a/Ausarbeitung/präzi.pptx
+++ b/Ausarbeitung/präzi.pptx
@@ -393,7 +393,7 @@
               <a:pPr>
                 <a:defRPr/>
               </a:pPr>
-              <a:t>‹#›</a:t>
+              <a:t>‹Nr.›</a:t>
             </a:fld>
             <a:endParaRPr lang="en-GB"/>
           </a:p>
@@ -769,7 +769,7 @@
               <a:pPr>
                 <a:defRPr/>
               </a:pPr>
-              <a:t>‹#›</a:t>
+              <a:t>‹Nr.›</a:t>
             </a:fld>
             <a:endParaRPr lang="en-GB"/>
           </a:p>
@@ -1160,7 +1160,7 @@
             <a:fld id="{CE58CB1E-F828-4F11-99E0-327109AF9DA4}" type="slidenum">
               <a:rPr lang="de-DE" smtClean="0"/>
               <a:pPr/>
-              <a:t>‹#›</a:t>
+              <a:t>‹Nr.›</a:t>
             </a:fld>
             <a:endParaRPr lang="de-DE" dirty="0"/>
           </a:p>
@@ -1379,7 +1379,7 @@
             <a:fld id="{CE58CB1E-F828-4F11-99E0-327109AF9DA4}" type="slidenum">
               <a:rPr lang="de-DE" smtClean="0"/>
               <a:pPr/>
-              <a:t>‹#›</a:t>
+              <a:t>‹Nr.›</a:t>
             </a:fld>
             <a:endParaRPr lang="de-DE" dirty="0"/>
           </a:p>
@@ -1724,7 +1724,7 @@
             <a:fld id="{CE58CB1E-F828-4F11-99E0-327109AF9DA4}" type="slidenum">
               <a:rPr lang="de-DE" smtClean="0"/>
               <a:pPr/>
-              <a:t>‹#›</a:t>
+              <a:t>‹Nr.›</a:t>
             </a:fld>
             <a:endParaRPr lang="de-DE" dirty="0"/>
           </a:p>
@@ -1923,7 +1923,7 @@
             <a:fld id="{CE58CB1E-F828-4F11-99E0-327109AF9DA4}" type="slidenum">
               <a:rPr lang="de-DE" smtClean="0"/>
               <a:pPr/>
-              <a:t>‹#›</a:t>
+              <a:t>‹Nr.›</a:t>
             </a:fld>
             <a:endParaRPr lang="de-DE" dirty="0"/>
           </a:p>
@@ -2122,7 +2122,7 @@
             <a:fld id="{CE58CB1E-F828-4F11-99E0-327109AF9DA4}" type="slidenum">
               <a:rPr lang="de-DE" smtClean="0"/>
               <a:pPr/>
-              <a:t>‹#›</a:t>
+              <a:t>‹Nr.›</a:t>
             </a:fld>
             <a:endParaRPr lang="de-DE" dirty="0"/>
           </a:p>
@@ -2443,7 +2443,7 @@
             <a:fld id="{CE58CB1E-F828-4F11-99E0-327109AF9DA4}" type="slidenum">
               <a:rPr lang="de-DE" smtClean="0"/>
               <a:pPr/>
-              <a:t>‹#›</a:t>
+              <a:t>‹Nr.›</a:t>
             </a:fld>
             <a:endParaRPr lang="de-DE" dirty="0"/>
           </a:p>
@@ -2619,7 +2619,7 @@
             <a:fld id="{CE58CB1E-F828-4F11-99E0-327109AF9DA4}" type="slidenum">
               <a:rPr lang="de-DE" smtClean="0"/>
               <a:pPr/>
-              <a:t>‹#›</a:t>
+              <a:t>‹Nr.›</a:t>
             </a:fld>
             <a:endParaRPr lang="de-DE" dirty="0"/>
           </a:p>
@@ -2934,7 +2934,7 @@
             <a:fld id="{CE58CB1E-F828-4F11-99E0-327109AF9DA4}" type="slidenum">
               <a:rPr lang="de-DE" smtClean="0"/>
               <a:pPr/>
-              <a:t>‹#›</a:t>
+              <a:t>‹Nr.›</a:t>
             </a:fld>
             <a:endParaRPr lang="de-DE" dirty="0"/>
           </a:p>
@@ -3206,7 +3206,7 @@
             <a:fld id="{CE58CB1E-F828-4F11-99E0-327109AF9DA4}" type="slidenum">
               <a:rPr lang="de-DE" smtClean="0"/>
               <a:pPr/>
-              <a:t>‹#›</a:t>
+              <a:t>‹Nr.›</a:t>
             </a:fld>
             <a:endParaRPr lang="de-DE" dirty="0"/>
           </a:p>
@@ -3393,7 +3393,7 @@
             <a:fld id="{CE58CB1E-F828-4F11-99E0-327109AF9DA4}" type="slidenum">
               <a:rPr lang="de-DE" smtClean="0"/>
               <a:pPr/>
-              <a:t>‹#›</a:t>
+              <a:t>‹Nr.›</a:t>
             </a:fld>
             <a:endParaRPr lang="de-DE" dirty="0"/>
           </a:p>
@@ -3592,7 +3592,7 @@
             <a:fld id="{CE58CB1E-F828-4F11-99E0-327109AF9DA4}" type="slidenum">
               <a:rPr lang="de-DE" smtClean="0"/>
               <a:pPr/>
-              <a:t>‹#›</a:t>
+              <a:t>‹Nr.›</a:t>
             </a:fld>
             <a:endParaRPr lang="de-DE" dirty="0"/>
           </a:p>
@@ -3793,7 +3793,7 @@
             <a:fld id="{CE58CB1E-F828-4F11-99E0-327109AF9DA4}" type="slidenum">
               <a:rPr lang="de-DE" smtClean="0"/>
               <a:pPr/>
-              <a:t>‹#›</a:t>
+              <a:t>‹Nr.›</a:t>
             </a:fld>
             <a:endParaRPr lang="de-DE" dirty="0"/>
           </a:p>
@@ -3886,7 +3886,7 @@
             <a:fld id="{CE58CB1E-F828-4F11-99E0-327109AF9DA4}" type="slidenum">
               <a:rPr lang="de-DE" smtClean="0"/>
               <a:pPr/>
-              <a:t>‹#›</a:t>
+              <a:t>‹Nr.›</a:t>
             </a:fld>
             <a:endParaRPr lang="de-DE" dirty="0"/>
           </a:p>
@@ -4169,7 +4169,7 @@
             <a:fld id="{CE58CB1E-F828-4F11-99E0-327109AF9DA4}" type="slidenum">
               <a:rPr lang="de-DE" smtClean="0"/>
               <a:pPr/>
-              <a:t>‹#›</a:t>
+              <a:t>‹Nr.›</a:t>
             </a:fld>
             <a:endParaRPr lang="de-DE" dirty="0"/>
           </a:p>
@@ -4368,7 +4368,7 @@
             <a:fld id="{CE58CB1E-F828-4F11-99E0-327109AF9DA4}" type="slidenum">
               <a:rPr lang="de-DE" smtClean="0"/>
               <a:pPr/>
-              <a:t>‹#›</a:t>
+              <a:t>‹Nr.›</a:t>
             </a:fld>
             <a:endParaRPr lang="de-DE" dirty="0"/>
           </a:p>
@@ -4544,7 +4544,7 @@
             <a:fld id="{CE58CB1E-F828-4F11-99E0-327109AF9DA4}" type="slidenum">
               <a:rPr lang="de-DE" smtClean="0"/>
               <a:pPr/>
-              <a:t>‹#›</a:t>
+              <a:t>‹Nr.›</a:t>
             </a:fld>
             <a:endParaRPr lang="de-DE" dirty="0"/>
           </a:p>
@@ -4913,7 +4913,7 @@
             <a:fld id="{CE58CB1E-F828-4F11-99E0-327109AF9DA4}" type="slidenum">
               <a:rPr lang="de-DE" smtClean="0"/>
               <a:pPr/>
-              <a:t>‹#›</a:t>
+              <a:t>‹Nr.›</a:t>
             </a:fld>
             <a:endParaRPr lang="de-DE" dirty="0"/>
           </a:p>
@@ -5112,7 +5112,7 @@
             <a:fld id="{CE58CB1E-F828-4F11-99E0-327109AF9DA4}" type="slidenum">
               <a:rPr lang="de-DE" smtClean="0"/>
               <a:pPr/>
-              <a:t>‹#›</a:t>
+              <a:t>‹Nr.›</a:t>
             </a:fld>
             <a:endParaRPr lang="de-DE" dirty="0"/>
           </a:p>
@@ -5336,7 +5336,7 @@
             <a:fld id="{CE58CB1E-F828-4F11-99E0-327109AF9DA4}" type="slidenum">
               <a:rPr lang="de-DE" smtClean="0"/>
               <a:pPr/>
-              <a:t>‹#›</a:t>
+              <a:t>‹Nr.›</a:t>
             </a:fld>
             <a:endParaRPr lang="de-DE" dirty="0"/>
           </a:p>
@@ -5523,7 +5523,7 @@
             <a:fld id="{CE58CB1E-F828-4F11-99E0-327109AF9DA4}" type="slidenum">
               <a:rPr lang="de-DE" smtClean="0"/>
               <a:pPr/>
-              <a:t>‹#›</a:t>
+              <a:t>‹Nr.›</a:t>
             </a:fld>
             <a:endParaRPr lang="de-DE" dirty="0"/>
           </a:p>
@@ -5734,7 +5734,7 @@
             <a:fld id="{CE58CB1E-F828-4F11-99E0-327109AF9DA4}" type="slidenum">
               <a:rPr lang="de-DE" smtClean="0"/>
               <a:pPr/>
-              <a:t>‹#›</a:t>
+              <a:t>‹Nr.›</a:t>
             </a:fld>
             <a:endParaRPr lang="de-DE" dirty="0"/>
           </a:p>
@@ -6211,7 +6211,7 @@
                   <a:spcPct val="114000"/>
                 </a:lnSpc>
               </a:pPr>
-              <a:t>‹#›</a:t>
+              <a:t>‹Nr.›</a:t>
             </a:fld>
             <a:endParaRPr lang="de-DE" sz="1200" dirty="0">
               <a:latin typeface="+mn-lt"/>
@@ -6303,7 +6303,7 @@
             <a:fld id="{CE58CB1E-F828-4F11-99E0-327109AF9DA4}" type="slidenum">
               <a:rPr lang="de-DE" noProof="0" smtClean="0"/>
               <a:pPr/>
-              <a:t>‹#›</a:t>
+              <a:t>‹Nr.›</a:t>
             </a:fld>
             <a:endParaRPr lang="de-DE" noProof="0"/>
           </a:p>
@@ -6817,7 +6817,7 @@
             <a:fld id="{CE58CB1E-F828-4F11-99E0-327109AF9DA4}" type="slidenum">
               <a:rPr lang="de-DE" smtClean="0"/>
               <a:pPr/>
-              <a:t>‹#›</a:t>
+              <a:t>‹Nr.›</a:t>
             </a:fld>
             <a:endParaRPr lang="de-DE" dirty="0"/>
           </a:p>
@@ -7475,7 +7475,7 @@
             <a:fld id="{CE58CB1E-F828-4F11-99E0-327109AF9DA4}" type="slidenum">
               <a:rPr lang="de-DE" smtClean="0"/>
               <a:pPr/>
-              <a:t>‹#›</a:t>
+              <a:t>‹Nr.›</a:t>
             </a:fld>
             <a:endParaRPr lang="de-DE" dirty="0"/>
           </a:p>
@@ -8072,7 +8072,7 @@
             <a:fld id="{CE58CB1E-F828-4F11-99E0-327109AF9DA4}" type="slidenum">
               <a:rPr lang="de-DE" smtClean="0"/>
               <a:pPr/>
-              <a:t>‹#›</a:t>
+              <a:t>‹Nr.›</a:t>
             </a:fld>
             <a:endParaRPr lang="de-DE" dirty="0"/>
           </a:p>
@@ -8669,7 +8669,7 @@
             <a:fld id="{CE58CB1E-F828-4F11-99E0-327109AF9DA4}" type="slidenum">
               <a:rPr lang="de-DE" smtClean="0"/>
               <a:pPr/>
-              <a:t>‹#›</a:t>
+              <a:t>‹Nr.›</a:t>
             </a:fld>
             <a:endParaRPr lang="de-DE" dirty="0"/>
           </a:p>
@@ -14130,7 +14130,7 @@
             </a:pPr>
             <a:r>
               <a:rPr lang="en-GB" sz="1800" dirty="0"/>
-              <a:t> I</a:t>
+              <a:t>I</a:t>
             </a:r>
             <a:r>
               <a:rPr lang="en-US" sz="1800" dirty="0" err="1"/>
@@ -14151,7 +14151,7 @@
             </a:pPr>
             <a:r>
               <a:rPr lang="en-US" sz="1800" dirty="0"/>
-              <a:t>16GB</a:t>
+              <a:t>16GB RAM</a:t>
             </a:r>
             <a:endParaRPr lang="de-DE" sz="1800" dirty="0"/>
           </a:p>

</xml_diff>